<commit_message>
Updated presentation with new information and fixed some minor mistakes in the readme file
</commit_message>
<xml_diff>
--- a/Workshop_1/Presentasjon/Azureskolen-Workshop#1.pptx
+++ b/Workshop_1/Presentasjon/Azureskolen-Workshop#1.pptx
@@ -247,7 +247,7 @@
           <a:p>
             <a:fld id="{54C52192-B826-4AE0-9CD6-BEA9467D12B3}" type="datetimeFigureOut">
               <a:rPr lang="nb-NO" smtClean="0"/>
-              <a:t>19.09.2019</a:t>
+              <a:t>11.02.2020</a:t>
             </a:fld>
             <a:endParaRPr lang="nb-NO"/>
           </a:p>
@@ -412,7 +412,7 @@
           <a:p>
             <a:fld id="{2696BCB2-2760-41B1-A1BE-7886EF110FCB}" type="datetimeFigureOut">
               <a:rPr lang="nb-NO" smtClean="0"/>
-              <a:t>19.09.2019</a:t>
+              <a:t>11.02.2020</a:t>
             </a:fld>
             <a:endParaRPr lang="nb-NO"/>
           </a:p>
@@ -1931,10 +1931,7 @@
           <a:bodyPr/>
           <a:lstStyle/>
           <a:p>
-            <a:r>
-              <a:rPr lang="nb-NO" dirty="0"/>
-              <a:t>Foreløpig agenda - </a:t>
-            </a:r>
+            <a:endParaRPr lang="nb-NO" dirty="0"/>
           </a:p>
         </p:txBody>
       </p:sp>
@@ -21963,91 +21960,6 @@
       </p:grpSpPr>
       <p:sp>
         <p:nvSpPr>
-          <p:cNvPr id="5" name="Content Placeholder 4">
-            <a:extLst>
-              <a:ext uri="{FF2B5EF4-FFF2-40B4-BE49-F238E27FC236}">
-                <a16:creationId xmlns:a16="http://schemas.microsoft.com/office/drawing/2014/main" id="{4955DD50-67FE-4D7E-9392-9BA3C3C1D560}"/>
-              </a:ext>
-            </a:extLst>
-          </p:cNvPr>
-          <p:cNvSpPr>
-            <a:spLocks noGrp="1"/>
-          </p:cNvSpPr>
-          <p:nvPr>
-            <p:ph idx="1"/>
-          </p:nvPr>
-        </p:nvSpPr>
-        <p:spPr/>
-        <p:txBody>
-          <a:bodyPr/>
-          <a:lstStyle/>
-          <a:p>
-            <a:r>
-              <a:rPr lang="nb-NO" b="1" dirty="0"/>
-              <a:t>Workshop #1</a:t>
-            </a:r>
-          </a:p>
-          <a:p>
-            <a:pPr lvl="1"/>
-            <a:r>
-              <a:rPr lang="nb-NO" dirty="0"/>
-              <a:t>Introduksjon Azure</a:t>
-            </a:r>
-          </a:p>
-          <a:p>
-            <a:pPr lvl="1"/>
-            <a:r>
-              <a:rPr lang="nb-NO" dirty="0"/>
-              <a:t>App Service, Azure Storage, Bonus: Key Vault</a:t>
-            </a:r>
-          </a:p>
-          <a:p>
-            <a:r>
-              <a:rPr lang="nb-NO" dirty="0"/>
-              <a:t>Workshop #2</a:t>
-            </a:r>
-          </a:p>
-          <a:p>
-            <a:pPr lvl="1"/>
-            <a:r>
-              <a:rPr lang="nb-NO" dirty="0" err="1"/>
-              <a:t>DevOps</a:t>
-            </a:r>
-            <a:endParaRPr lang="nb-NO" dirty="0"/>
-          </a:p>
-          <a:p>
-            <a:r>
-              <a:rPr lang="nb-NO" dirty="0"/>
-              <a:t>Workshop #3</a:t>
-            </a:r>
-          </a:p>
-          <a:p>
-            <a:pPr lvl="1"/>
-            <a:r>
-              <a:rPr lang="nb-NO" dirty="0"/>
-              <a:t>TBD (Hot tips: Serverless)</a:t>
-            </a:r>
-          </a:p>
-          <a:p>
-            <a:r>
-              <a:rPr lang="nb-NO" dirty="0"/>
-              <a:t>Workshop #4</a:t>
-            </a:r>
-          </a:p>
-          <a:p>
-            <a:pPr lvl="1"/>
-            <a:r>
-              <a:rPr lang="nb-NO" dirty="0"/>
-              <a:t>TBD</a:t>
-            </a:r>
-          </a:p>
-          <a:p>
-            <a:endParaRPr lang="nb-NO" dirty="0"/>
-          </a:p>
-        </p:txBody>
-      </p:sp>
-      <p:sp>
-        <p:nvSpPr>
           <p:cNvPr id="4" name="Title 3">
             <a:extLst>
               <a:ext uri="{FF2B5EF4-FFF2-40B4-BE49-F238E27FC236}">
@@ -22074,6 +21986,222 @@
             <a:r>
               <a:rPr lang="nb-NO" dirty="0"/>
               <a:t> Workshop – Foreløpig plan</a:t>
+            </a:r>
+          </a:p>
+        </p:txBody>
+      </p:sp>
+      <p:sp>
+        <p:nvSpPr>
+          <p:cNvPr id="2" name="Content Placeholder 1">
+            <a:extLst>
+              <a:ext uri="{FF2B5EF4-FFF2-40B4-BE49-F238E27FC236}">
+                <a16:creationId xmlns:a16="http://schemas.microsoft.com/office/drawing/2014/main" id="{49BE38AA-87B0-4838-BE71-9193F9BED242}"/>
+              </a:ext>
+            </a:extLst>
+          </p:cNvPr>
+          <p:cNvSpPr>
+            <a:spLocks noGrp="1"/>
+          </p:cNvSpPr>
+          <p:nvPr>
+            <p:ph idx="1"/>
+          </p:nvPr>
+        </p:nvSpPr>
+        <p:spPr/>
+        <p:txBody>
+          <a:bodyPr/>
+          <a:lstStyle/>
+          <a:p>
+            <a:r>
+              <a:rPr lang="nb-NO" sz="2200" dirty="0"/>
+              <a:t>Workshop #1</a:t>
+            </a:r>
+          </a:p>
+          <a:p>
+            <a:pPr lvl="1"/>
+            <a:r>
+              <a:rPr lang="en-US" sz="1800" dirty="0"/>
+              <a:t>Azure basics</a:t>
+            </a:r>
+          </a:p>
+          <a:p>
+            <a:pPr lvl="1"/>
+            <a:r>
+              <a:rPr lang="en-US" sz="1800" dirty="0"/>
+              <a:t>App Services</a:t>
+            </a:r>
+          </a:p>
+          <a:p>
+            <a:pPr lvl="1"/>
+            <a:r>
+              <a:rPr lang="en-US" sz="1800" dirty="0"/>
+              <a:t>Key Vault</a:t>
+            </a:r>
+          </a:p>
+          <a:p>
+            <a:pPr lvl="1"/>
+            <a:r>
+              <a:rPr lang="en-US" sz="1800" dirty="0"/>
+              <a:t>Storage</a:t>
+            </a:r>
+          </a:p>
+          <a:p>
+            <a:r>
+              <a:rPr lang="nb-NO" sz="2200" dirty="0"/>
+              <a:t>Workshop #2</a:t>
+            </a:r>
+          </a:p>
+          <a:p>
+            <a:pPr lvl="1"/>
+            <a:r>
+              <a:rPr lang="nb-NO" sz="1800" dirty="0" err="1"/>
+              <a:t>Azure</a:t>
+            </a:r>
+            <a:r>
+              <a:rPr lang="nb-NO" sz="1800" dirty="0"/>
+              <a:t> </a:t>
+            </a:r>
+            <a:r>
+              <a:rPr lang="nb-NO" sz="1800" dirty="0" err="1"/>
+              <a:t>DevOps</a:t>
+            </a:r>
+            <a:endParaRPr lang="nb-NO" sz="1800" dirty="0"/>
+          </a:p>
+          <a:p>
+            <a:pPr lvl="2"/>
+            <a:r>
+              <a:rPr lang="nb-NO" dirty="0" err="1"/>
+              <a:t>Continuous</a:t>
+            </a:r>
+            <a:r>
+              <a:rPr lang="nb-NO" dirty="0"/>
+              <a:t> Delivery pipeline</a:t>
+            </a:r>
+          </a:p>
+          <a:p>
+            <a:pPr lvl="1"/>
+            <a:r>
+              <a:rPr lang="nb-NO" sz="1800" dirty="0"/>
+              <a:t>ARM-</a:t>
+            </a:r>
+            <a:r>
+              <a:rPr lang="nb-NO" sz="1800" dirty="0" err="1"/>
+              <a:t>templates</a:t>
+            </a:r>
+            <a:r>
+              <a:rPr lang="nb-NO" sz="1800" dirty="0"/>
+              <a:t> / </a:t>
+            </a:r>
+            <a:r>
+              <a:rPr lang="nb-NO" sz="1800" dirty="0" err="1"/>
+              <a:t>Infrastructure</a:t>
+            </a:r>
+            <a:r>
+              <a:rPr lang="nb-NO" sz="1800" dirty="0"/>
+              <a:t> as Code</a:t>
+            </a:r>
+          </a:p>
+          <a:p>
+            <a:pPr lvl="1"/>
+            <a:r>
+              <a:rPr lang="nb-NO" sz="1800" dirty="0"/>
+              <a:t>Application Insights</a:t>
+            </a:r>
+          </a:p>
+          <a:p>
+            <a:endParaRPr lang="nb-NO" dirty="0"/>
+          </a:p>
+        </p:txBody>
+      </p:sp>
+      <p:sp>
+        <p:nvSpPr>
+          <p:cNvPr id="3" name="Content Placeholder 2">
+            <a:extLst>
+              <a:ext uri="{FF2B5EF4-FFF2-40B4-BE49-F238E27FC236}">
+                <a16:creationId xmlns:a16="http://schemas.microsoft.com/office/drawing/2014/main" id="{174F88C6-B6DB-4212-9E7A-23B4621F093A}"/>
+              </a:ext>
+            </a:extLst>
+          </p:cNvPr>
+          <p:cNvSpPr>
+            <a:spLocks noGrp="1"/>
+          </p:cNvSpPr>
+          <p:nvPr>
+            <p:ph idx="13"/>
+          </p:nvPr>
+        </p:nvSpPr>
+        <p:spPr/>
+        <p:txBody>
+          <a:bodyPr/>
+          <a:lstStyle/>
+          <a:p>
+            <a:r>
+              <a:rPr lang="nb-NO" sz="2200" b="1" dirty="0"/>
+              <a:t>Workshop #3</a:t>
+            </a:r>
+          </a:p>
+          <a:p>
+            <a:pPr lvl="1"/>
+            <a:r>
+              <a:rPr lang="nb-NO" sz="1800" dirty="0"/>
+              <a:t>Introduksjon til </a:t>
+            </a:r>
+            <a:r>
+              <a:rPr lang="nb-NO" sz="1800" dirty="0" err="1"/>
+              <a:t>sikkerthet</a:t>
+            </a:r>
+            <a:r>
+              <a:rPr lang="nb-NO" sz="1800" dirty="0"/>
+              <a:t> i </a:t>
+            </a:r>
+            <a:r>
+              <a:rPr lang="nb-NO" sz="1800" dirty="0" err="1"/>
+              <a:t>Azure</a:t>
+            </a:r>
+            <a:endParaRPr lang="nb-NO" sz="1800" dirty="0"/>
+          </a:p>
+          <a:p>
+            <a:pPr lvl="1"/>
+            <a:r>
+              <a:rPr lang="nb-NO" sz="1800" dirty="0" err="1"/>
+              <a:t>Azure</a:t>
+            </a:r>
+            <a:r>
+              <a:rPr lang="nb-NO" sz="1800" dirty="0"/>
+              <a:t> Active Directory - autentisering.</a:t>
+            </a:r>
+          </a:p>
+          <a:p>
+            <a:pPr lvl="1"/>
+            <a:r>
+              <a:rPr lang="nb-NO" sz="1800" dirty="0"/>
+              <a:t>SAS-tokens i </a:t>
+            </a:r>
+            <a:r>
+              <a:rPr lang="nb-NO" sz="1800" dirty="0" err="1"/>
+              <a:t>Azure</a:t>
+            </a:r>
+            <a:r>
+              <a:rPr lang="nb-NO" sz="1800" dirty="0"/>
+              <a:t> Storage</a:t>
+            </a:r>
+          </a:p>
+          <a:p>
+            <a:pPr lvl="1"/>
+            <a:r>
+              <a:rPr lang="nb-NO" sz="1800" dirty="0"/>
+              <a:t>Introduksjon til infrastruktur-sikkerhet</a:t>
+            </a:r>
+          </a:p>
+          <a:p>
+            <a:r>
+              <a:rPr lang="nb-NO" sz="2200" dirty="0"/>
+              <a:t>Workshop #4</a:t>
+            </a:r>
+          </a:p>
+          <a:p>
+            <a:pPr lvl="1"/>
+            <a:r>
+              <a:rPr lang="nb-NO" sz="1800" dirty="0"/>
+              <a:t>TBD</a:t>
             </a:r>
           </a:p>
         </p:txBody>
@@ -22349,7 +22477,14 @@
           <a:bodyPr/>
           <a:lstStyle/>
           <a:p>
-            <a:endParaRPr lang="nb-NO"/>
+            <a:r>
+              <a:rPr lang="nb-NO" dirty="0"/>
+              <a:t>Gå til </a:t>
+            </a:r>
+            <a:r>
+              <a:rPr lang="nb-NO"/>
+              <a:t>bonus leksjonen</a:t>
+            </a:r>
           </a:p>
         </p:txBody>
       </p:sp>
@@ -22375,17 +22510,14 @@
           <a:lstStyle/>
           <a:p>
             <a:r>
-              <a:rPr lang="nb-NO" dirty="0"/>
-              <a:t>Key </a:t>
+              <a:rPr lang="nb-NO"/>
+              <a:t>Bonus Leksjon: Key </a:t>
             </a:r>
             <a:r>
               <a:rPr lang="nb-NO" dirty="0" err="1"/>
               <a:t>Vault</a:t>
             </a:r>
-            <a:r>
-              <a:rPr lang="nb-NO" dirty="0"/>
-              <a:t> Demo</a:t>
-            </a:r>
+            <a:endParaRPr lang="nb-NO" dirty="0"/>
           </a:p>
         </p:txBody>
       </p:sp>
@@ -22922,7 +23054,7 @@
           <a:p>
             <a:r>
               <a:rPr lang="nb-NO" dirty="0"/>
-              <a:t>West/North Europe – Snart 2 i Norge (øst + vest)</a:t>
+              <a:t>West/North Norway</a:t>
             </a:r>
           </a:p>
         </p:txBody>
@@ -24638,15 +24770,6 @@
 </file>
 
 <file path=customXml/item1.xml><?xml version="1.0" encoding="utf-8"?>
-<?mso-contentType ?>
-<FormTemplates xmlns="http://schemas.microsoft.com/sharepoint/v3/contenttype/forms">
-  <Display>DocumentLibraryForm</Display>
-  <Edit>DocumentLibraryForm</Edit>
-  <New>DocumentLibraryForm</New>
-</FormTemplates>
-</file>
-
-<file path=customXml/item2.xml><?xml version="1.0" encoding="utf-8"?>
 <ct:contentTypeSchema xmlns:ct="http://schemas.microsoft.com/office/2006/metadata/contentType" xmlns:ma="http://schemas.microsoft.com/office/2006/metadata/properties/metaAttributes" ct:_="" ma:_="" ma:contentTypeName="Document" ma:contentTypeID="0x0101005D3CE5A03C88D04F8FE0CC8617320B29" ma:contentTypeVersion="2" ma:contentTypeDescription="Create a new document." ma:contentTypeScope="" ma:versionID="23c508fadb5761cd27fdc7efc393bb78">
   <xsd:schema xmlns:xsd="http://www.w3.org/2001/XMLSchema" xmlns:xs="http://www.w3.org/2001/XMLSchema" xmlns:p="http://schemas.microsoft.com/office/2006/metadata/properties" xmlns:ns2="323bcd62-7d27-4513-9df1-9bc20f03554b" targetNamespace="http://schemas.microsoft.com/office/2006/metadata/properties" ma:root="true" ma:fieldsID="4120a6a9df7c81c23a4d646d2ccf1355" ns2:_="">
     <xsd:import namespace="323bcd62-7d27-4513-9df1-9bc20f03554b"/>
@@ -24778,21 +24901,22 @@
 </ct:contentTypeSchema>
 </file>
 
-<file path=customXml/item3.xml><?xml version="1.0" encoding="utf-8"?>
+<file path=customXml/item2.xml><?xml version="1.0" encoding="utf-8"?>
 <p:properties xmlns:p="http://schemas.microsoft.com/office/2006/metadata/properties" xmlns:xsi="http://www.w3.org/2001/XMLSchema-instance" xmlns:pc="http://schemas.microsoft.com/office/infopath/2007/PartnerControls">
   <documentManagement/>
 </p:properties>
 </file>
 
-<file path=customXml/itemProps1.xml><?xml version="1.0" encoding="utf-8"?>
-<ds:datastoreItem xmlns:ds="http://schemas.openxmlformats.org/officeDocument/2006/customXml" ds:itemID="{BB82CC63-55FC-4D22-9ED3-DB88AF6228E1}">
-  <ds:schemaRefs>
-    <ds:schemaRef ds:uri="http://schemas.microsoft.com/sharepoint/v3/contenttype/forms"/>
-  </ds:schemaRefs>
-</ds:datastoreItem>
+<file path=customXml/item3.xml><?xml version="1.0" encoding="utf-8"?>
+<?mso-contentType ?>
+<FormTemplates xmlns="http://schemas.microsoft.com/sharepoint/v3/contenttype/forms">
+  <Display>DocumentLibraryForm</Display>
+  <Edit>DocumentLibraryForm</Edit>
+  <New>DocumentLibraryForm</New>
+</FormTemplates>
 </file>
 
-<file path=customXml/itemProps2.xml><?xml version="1.0" encoding="utf-8"?>
+<file path=customXml/itemProps1.xml><?xml version="1.0" encoding="utf-8"?>
 <ds:datastoreItem xmlns:ds="http://schemas.openxmlformats.org/officeDocument/2006/customXml" ds:itemID="{0377EA4A-9170-43AD-A052-6EABC948F73F}">
   <ds:schemaRefs>
     <ds:schemaRef ds:uri="http://schemas.microsoft.com/office/2006/metadata/contentType"/>
@@ -24810,7 +24934,7 @@
 </ds:datastoreItem>
 </file>
 
-<file path=customXml/itemProps3.xml><?xml version="1.0" encoding="utf-8"?>
+<file path=customXml/itemProps2.xml><?xml version="1.0" encoding="utf-8"?>
 <ds:datastoreItem xmlns:ds="http://schemas.openxmlformats.org/officeDocument/2006/customXml" ds:itemID="{9D2CB842-18D5-4EEF-9009-B0CAFCE7AC3E}">
   <ds:schemaRefs>
     <ds:schemaRef ds:uri="http://schemas.microsoft.com/office/2006/metadata/properties"/>
@@ -24824,4 +24948,12 @@
     <ds:schemaRef ds:uri="http://www.w3.org/XML/1998/namespace"/>
   </ds:schemaRefs>
 </ds:datastoreItem>
+</file>
+
+<file path=customXml/itemProps3.xml><?xml version="1.0" encoding="utf-8"?>
+<ds:datastoreItem xmlns:ds="http://schemas.openxmlformats.org/officeDocument/2006/customXml" ds:itemID="{BB82CC63-55FC-4D22-9ED3-DB88AF6228E1}">
+  <ds:schemaRefs>
+    <ds:schemaRef ds:uri="http://schemas.microsoft.com/sharepoint/v3/contenttype/forms"/>
+  </ds:schemaRefs>
+</ds:datastoreItem>
 </file>
</xml_diff>

<commit_message>
Oppdatert PPTX og MD for L1 og L2
</commit_message>
<xml_diff>
--- a/Workshop_1/Presentasjon/Azureskolen-Workshop#1.pptx
+++ b/Workshop_1/Presentasjon/Azureskolen-Workshop#1.pptx
@@ -258,7 +258,7 @@
           <a:p>
             <a:fld id="{54C52192-B826-4AE0-9CD6-BEA9467D12B3}" type="datetimeFigureOut">
               <a:rPr lang="nb-NO" smtClean="0"/>
-              <a:t>03.06.2021</a:t>
+              <a:t>11.08.2022</a:t>
             </a:fld>
             <a:endParaRPr lang="nb-NO"/>
           </a:p>
@@ -423,7 +423,7 @@
           <a:p>
             <a:fld id="{2696BCB2-2760-41B1-A1BE-7886EF110FCB}" type="datetimeFigureOut">
               <a:rPr lang="nb-NO" smtClean="0"/>
-              <a:t>03.06.2021</a:t>
+              <a:t>11.08.2022</a:t>
             </a:fld>
             <a:endParaRPr lang="nb-NO"/>
           </a:p>
@@ -1552,47 +1552,47 @@
               <a:defRPr/>
             </a:pPr>
             <a:r>
-              <a:rPr lang="nb-NO"/>
+              <a:rPr lang="nb-NO" dirty="0"/>
               <a:t>Alt dette er egentlig beskrevet i </a:t>
             </a:r>
             <a:r>
-              <a:rPr lang="nb-NO" err="1"/>
+              <a:rPr lang="nb-NO" dirty="0" err="1"/>
               <a:t>SLAen</a:t>
             </a:r>
             <a:r>
-              <a:rPr lang="nb-NO"/>
+              <a:rPr lang="nb-NO" dirty="0"/>
               <a:t>. Dette er i all hovedsak en kontrakt mellom </a:t>
             </a:r>
             <a:r>
-              <a:rPr lang="nb-NO" err="1"/>
+              <a:rPr lang="nb-NO" dirty="0" err="1"/>
               <a:t>Azure</a:t>
             </a:r>
             <a:r>
-              <a:rPr lang="nb-NO"/>
+              <a:rPr lang="nb-NO" dirty="0"/>
               <a:t> og deg som kunde. Hvor </a:t>
             </a:r>
             <a:r>
-              <a:rPr lang="nb-NO" err="1"/>
+              <a:rPr lang="nb-NO" dirty="0" err="1"/>
               <a:t>Azure</a:t>
             </a:r>
             <a:r>
-              <a:rPr lang="nb-NO"/>
+              <a:rPr lang="nb-NO" dirty="0"/>
               <a:t> beskriver alt det de lover ifb. Med tjenesten. Om servicen din har </a:t>
             </a:r>
             <a:r>
-              <a:rPr lang="nb-NO" err="1"/>
+              <a:rPr lang="nb-NO" dirty="0" err="1"/>
               <a:t>retention</a:t>
             </a:r>
             <a:r>
-              <a:rPr lang="nb-NO"/>
+              <a:rPr lang="nb-NO" dirty="0"/>
               <a:t> f.eks. eller hvor lang </a:t>
             </a:r>
             <a:r>
-              <a:rPr lang="nb-NO" err="1"/>
+              <a:rPr lang="nb-NO" dirty="0" err="1"/>
               <a:t>maximum</a:t>
             </a:r>
             <a:r>
-              <a:rPr lang="nb-NO"/>
+              <a:rPr lang="nb-NO" dirty="0"/>
               <a:t> nedetid er. Hva du har krav på. Uten at jeg har nilest disse, så tror jeg også det sikkert står noe om hva du kan bruke deres tjenester til. F.eks. terrorfinansiering, hvitvasking, osv.</a:t>
             </a:r>
           </a:p>
@@ -1614,7 +1614,7 @@
               <a:tabLst/>
               <a:defRPr/>
             </a:pPr>
-            <a:endParaRPr lang="nb-NO"/>
+            <a:endParaRPr lang="nb-NO" dirty="0"/>
           </a:p>
           <a:p>
             <a:pPr marL="0" marR="0" lvl="0" indent="0" algn="l" defTabSz="914400" rtl="0" eaLnBrk="1" fontAlgn="auto" latinLnBrk="0" hangingPunct="1">
@@ -1635,23 +1635,23 @@
               <a:defRPr/>
             </a:pPr>
             <a:r>
-              <a:rPr lang="nb-NO"/>
+              <a:rPr lang="nb-NO" dirty="0"/>
               <a:t>Et eksempel er </a:t>
             </a:r>
             <a:r>
-              <a:rPr lang="nb-NO" err="1"/>
+              <a:rPr lang="nb-NO" dirty="0" err="1"/>
               <a:t>Azure</a:t>
             </a:r>
             <a:r>
-              <a:rPr lang="nb-NO"/>
+              <a:rPr lang="nb-NO" dirty="0"/>
               <a:t> AD og App service. I </a:t>
             </a:r>
             <a:r>
-              <a:rPr lang="nb-NO" err="1"/>
+              <a:rPr lang="nb-NO" dirty="0" err="1"/>
               <a:t>SLAen</a:t>
             </a:r>
             <a:r>
-              <a:rPr lang="nb-NO"/>
+              <a:rPr lang="nb-NO" dirty="0"/>
               <a:t> så lover de 99.9 og 99.95% oppetid på de servicene, dvs. de har lov til å ha 43 og 22min nedetid ila. måneden for hver av de tjenestene. </a:t>
             </a:r>
           </a:p>
@@ -1673,7 +1673,7 @@
               <a:tabLst/>
               <a:defRPr/>
             </a:pPr>
-            <a:endParaRPr lang="nb-NO"/>
+            <a:endParaRPr lang="nb-NO" dirty="0"/>
           </a:p>
           <a:p>
             <a:pPr marL="0" marR="0" lvl="0" indent="0" algn="l" defTabSz="914400" rtl="0" eaLnBrk="1" fontAlgn="auto" latinLnBrk="0" hangingPunct="1">
@@ -1694,21 +1694,21 @@
               <a:defRPr/>
             </a:pPr>
             <a:r>
-              <a:rPr lang="nb-NO"/>
+              <a:rPr lang="nb-NO" dirty="0"/>
               <a:t>Gir kun tilbake </a:t>
             </a:r>
             <a:r>
-              <a:rPr lang="nb-NO" err="1"/>
+              <a:rPr lang="nb-NO" dirty="0" err="1"/>
               <a:t>credits</a:t>
             </a:r>
             <a:r>
-              <a:rPr lang="nb-NO"/>
+              <a:rPr lang="nb-NO" dirty="0"/>
               <a:t> – ikke hva det faktiske tapet har blitt påført.</a:t>
             </a:r>
           </a:p>
           <a:p>
             <a:r>
-              <a:rPr lang="nb-NO"/>
+              <a:rPr lang="nb-NO" dirty="0"/>
               <a:t>Ingen automatikk i at man får tilbake, må be om det.</a:t>
             </a:r>
           </a:p>
@@ -8087,19 +8087,25 @@
               <a:defRPr/>
             </a:pPr>
             <a:r>
-              <a:rPr lang="nb-NO">
+              <a:rPr lang="nb-NO" dirty="0" err="1">
                 <a:cs typeface="Calibri" panose="020F0502020204030204"/>
               </a:rPr>
-              <a:t>Azure har </a:t>
-            </a:r>
-            <a:r>
-              <a:rPr lang="nb-NO" err="1">
+              <a:t>Azure</a:t>
+            </a:r>
+            <a:r>
+              <a:rPr lang="nb-NO" dirty="0">
+                <a:cs typeface="Calibri" panose="020F0502020204030204"/>
+              </a:rPr>
+              <a:t> har </a:t>
+            </a:r>
+            <a:r>
+              <a:rPr lang="nb-NO" dirty="0" err="1">
                 <a:cs typeface="Calibri" panose="020F0502020204030204"/>
               </a:rPr>
               <a:t>datasantre</a:t>
             </a:r>
             <a:r>
-              <a:rPr lang="nb-NO">
+              <a:rPr lang="nb-NO" dirty="0">
                 <a:cs typeface="Calibri" panose="020F0502020204030204"/>
               </a:rPr>
               <a:t> i hele 57 regioner, av disse 57 regionene forholder vi oss for det meste til datasentrene i</a:t>
@@ -8110,7 +8116,7 @@
               <a:defRPr/>
             </a:pPr>
             <a:r>
-              <a:rPr lang="nb-NO">
+              <a:rPr lang="nb-NO" dirty="0">
                 <a:cs typeface="Calibri" panose="020F0502020204030204"/>
               </a:rPr>
               <a:t>- West Europe (Nederland)</a:t>
@@ -8121,7 +8127,7 @@
               <a:defRPr/>
             </a:pPr>
             <a:r>
-              <a:rPr lang="nb-NO">
+              <a:rPr lang="nb-NO" dirty="0">
                 <a:cs typeface="Calibri" panose="020F0502020204030204"/>
               </a:rPr>
               <a:t>- North Europe (Irland)</a:t>
@@ -8131,7 +8137,7 @@
             <a:pPr>
               <a:defRPr/>
             </a:pPr>
-            <a:endParaRPr lang="nb-NO">
+            <a:endParaRPr lang="nb-NO" dirty="0">
               <a:cs typeface="Calibri" panose="020F0502020204030204"/>
             </a:endParaRPr>
           </a:p>
@@ -8140,19 +8146,19 @@
               <a:defRPr/>
             </a:pPr>
             <a:r>
-              <a:rPr lang="nb-NO">
+              <a:rPr lang="nb-NO" dirty="0">
                 <a:cs typeface="Calibri" panose="020F0502020204030204"/>
               </a:rPr>
               <a:t>Men i slutten av 2019 ble det </a:t>
             </a:r>
             <a:r>
-              <a:rPr lang="nb-NO" err="1">
+              <a:rPr lang="nb-NO" dirty="0" err="1">
                 <a:cs typeface="Calibri" panose="020F0502020204030204"/>
               </a:rPr>
               <a:t>driftsatt</a:t>
             </a:r>
             <a:r>
-              <a:rPr lang="nb-NO">
+              <a:rPr lang="nb-NO" dirty="0">
                 <a:cs typeface="Calibri" panose="020F0502020204030204"/>
               </a:rPr>
               <a:t> to datasentre i Norge.</a:t>
@@ -8162,7 +8168,7 @@
             <a:pPr>
               <a:defRPr/>
             </a:pPr>
-            <a:endParaRPr lang="nb-NO">
+            <a:endParaRPr lang="nb-NO" dirty="0">
               <a:cs typeface="Calibri" panose="020F0502020204030204"/>
             </a:endParaRPr>
           </a:p>
@@ -8171,7 +8177,7 @@
               <a:defRPr/>
             </a:pPr>
             <a:r>
-              <a:rPr lang="nb-NO">
+              <a:rPr lang="nb-NO" dirty="0">
                 <a:cs typeface="Calibri" panose="020F0502020204030204"/>
               </a:rPr>
               <a:t>- Norway East som ligger i Oslo</a:t>
@@ -8182,7 +8188,7 @@
               <a:defRPr/>
             </a:pPr>
             <a:r>
-              <a:rPr lang="nb-NO">
+              <a:rPr lang="nb-NO" dirty="0">
                 <a:cs typeface="Calibri" panose="020F0502020204030204"/>
               </a:rPr>
               <a:t>- Norway West som ligger i Stavanger</a:t>
@@ -8192,7 +8198,7 @@
             <a:pPr>
               <a:defRPr/>
             </a:pPr>
-            <a:endParaRPr lang="nb-NO">
+            <a:endParaRPr lang="nb-NO" dirty="0">
               <a:cs typeface="Calibri" panose="020F0502020204030204"/>
             </a:endParaRPr>
           </a:p>
@@ -8201,17 +8207,29 @@
               <a:defRPr/>
             </a:pPr>
             <a:r>
-              <a:rPr lang="nb-NO">
+              <a:rPr lang="nb-NO" dirty="0">
                 <a:cs typeface="Calibri" panose="020F0502020204030204"/>
               </a:rPr>
-              <a:t>Dette setter Azure i en unik posisjon, da de er den eneste av de tre store skyleverandørende som har etablert datasentre i Norge. </a:t>
+              <a:t>Dette setter </a:t>
+            </a:r>
+            <a:r>
+              <a:rPr lang="nb-NO" dirty="0" err="1">
+                <a:cs typeface="Calibri" panose="020F0502020204030204"/>
+              </a:rPr>
+              <a:t>Azure</a:t>
+            </a:r>
+            <a:r>
+              <a:rPr lang="nb-NO" dirty="0">
+                <a:cs typeface="Calibri" panose="020F0502020204030204"/>
+              </a:rPr>
+              <a:t> i en unik posisjon, da de er den eneste av de tre store skyleverandørende som har etablert datasentre i Norge. </a:t>
             </a:r>
           </a:p>
           <a:p>
             <a:pPr>
               <a:defRPr/>
             </a:pPr>
-            <a:endParaRPr lang="nb-NO">
+            <a:endParaRPr lang="nb-NO" dirty="0">
               <a:cs typeface="Calibri" panose="020F0502020204030204"/>
             </a:endParaRPr>
           </a:p>
@@ -8220,10 +8238,18 @@
               <a:defRPr/>
             </a:pPr>
             <a:r>
-              <a:rPr lang="nb-NO"/>
-              <a:t>Noe av grunnen til disse to nye datasentrene er for at Azure skal kunne hjelpe kundene til å oppfylle norske personvernregler.</a:t>
-            </a:r>
-            <a:endParaRPr lang="nb-NO">
+              <a:rPr lang="nb-NO" dirty="0"/>
+              <a:t>Noe av grunnen til disse to nye datasentrene er for at </a:t>
+            </a:r>
+            <a:r>
+              <a:rPr lang="nb-NO" dirty="0" err="1"/>
+              <a:t>Azure</a:t>
+            </a:r>
+            <a:r>
+              <a:rPr lang="nb-NO" dirty="0"/>
+              <a:t> skal kunne hjelpe kundene til å oppfylle norske personvernregler.</a:t>
+            </a:r>
+            <a:endParaRPr lang="nb-NO" dirty="0">
               <a:cs typeface="Calibri" panose="020F0502020204030204"/>
             </a:endParaRPr>
           </a:p>
@@ -8231,7 +8257,7 @@
             <a:pPr>
               <a:defRPr/>
             </a:pPr>
-            <a:endParaRPr lang="nb-NO">
+            <a:endParaRPr lang="nb-NO" dirty="0">
               <a:cs typeface="Calibri" panose="020F0502020204030204"/>
             </a:endParaRPr>
           </a:p>
@@ -8240,17 +8266,29 @@
               <a:defRPr/>
             </a:pPr>
             <a:r>
-              <a:rPr lang="nb-NO">
+              <a:rPr lang="nb-NO" dirty="0">
                 <a:cs typeface="Calibri" panose="020F0502020204030204"/>
               </a:rPr>
-              <a:t>Og det ser ut som at det virker. Norges største bank sa i 2019 at de kom til å migrere mange av sine tjenester til skyen i Azure.</a:t>
+              <a:t>Og det ser ut som at det virker. Norges største bank sa i 2019 at de kom til å migrere mange av sine tjenester til skyen i </a:t>
+            </a:r>
+            <a:r>
+              <a:rPr lang="nb-NO" dirty="0" err="1">
+                <a:cs typeface="Calibri" panose="020F0502020204030204"/>
+              </a:rPr>
+              <a:t>Azure</a:t>
+            </a:r>
+            <a:r>
+              <a:rPr lang="nb-NO" dirty="0">
+                <a:cs typeface="Calibri" panose="020F0502020204030204"/>
+              </a:rPr>
+              <a:t>.</a:t>
             </a:r>
           </a:p>
           <a:p>
             <a:pPr>
               <a:defRPr/>
             </a:pPr>
-            <a:endParaRPr lang="nb-NO">
+            <a:endParaRPr lang="nb-NO" dirty="0">
               <a:cs typeface="Calibri" panose="020F0502020204030204"/>
             </a:endParaRPr>
           </a:p>
@@ -8259,7 +8297,7 @@
               <a:defRPr/>
             </a:pPr>
             <a:r>
-              <a:rPr lang="nb-NO">
+              <a:rPr lang="nb-NO" dirty="0">
                 <a:cs typeface="Calibri" panose="020F0502020204030204"/>
               </a:rPr>
               <a:t>Når man skal velge hvilken region man ønsker å hoste sine tjenester på er det viktig å ha to ting i bakhode</a:t>
@@ -8269,7 +8307,7 @@
             <a:pPr>
               <a:defRPr/>
             </a:pPr>
-            <a:endParaRPr lang="nb-NO">
+            <a:endParaRPr lang="nb-NO" dirty="0">
               <a:cs typeface="Calibri" panose="020F0502020204030204"/>
             </a:endParaRPr>
           </a:p>
@@ -8278,7 +8316,7 @@
               <a:defRPr/>
             </a:pPr>
             <a:r>
-              <a:rPr lang="nb-NO">
+              <a:rPr lang="nb-NO" dirty="0">
                 <a:cs typeface="Calibri" panose="020F0502020204030204"/>
               </a:rPr>
               <a:t>Tilgjengelighet av tjeneste og hastighet.</a:t>
@@ -8288,7 +8326,7 @@
             <a:pPr>
               <a:defRPr/>
             </a:pPr>
-            <a:endParaRPr lang="nb-NO">
+            <a:endParaRPr lang="nb-NO" dirty="0">
               <a:cs typeface="Calibri" panose="020F0502020204030204"/>
             </a:endParaRPr>
           </a:p>
@@ -8297,10 +8335,22 @@
               <a:defRPr/>
             </a:pPr>
             <a:r>
-              <a:rPr lang="nb-NO">
+              <a:rPr lang="nb-NO" dirty="0">
                 <a:cs typeface="Calibri" panose="020F0502020204030204"/>
               </a:rPr>
-              <a:t>Mange av Azure sine tjenester er regionbasert, det vil si at de ikke er tilgjengelig i alle de 57 datasentrene i verden.</a:t>
+              <a:t>Mange av </a:t>
+            </a:r>
+            <a:r>
+              <a:rPr lang="nb-NO" dirty="0" err="1">
+                <a:cs typeface="Calibri" panose="020F0502020204030204"/>
+              </a:rPr>
+              <a:t>Azure</a:t>
+            </a:r>
+            <a:r>
+              <a:rPr lang="nb-NO" dirty="0">
+                <a:cs typeface="Calibri" panose="020F0502020204030204"/>
+              </a:rPr>
+              <a:t> sine tjenester er regionbasert, det vil si at de ikke er tilgjengelig i alle de 57 datasentrene i verden.</a:t>
             </a:r>
           </a:p>
           <a:p>
@@ -8308,7 +8358,7 @@
               <a:defRPr/>
             </a:pPr>
             <a:r>
-              <a:rPr lang="nb-NO">
+              <a:rPr lang="nb-NO" dirty="0">
                 <a:cs typeface="Calibri" panose="020F0502020204030204"/>
               </a:rPr>
               <a:t> </a:t>
@@ -8319,17 +8369,29 @@
               <a:defRPr/>
             </a:pPr>
             <a:r>
-              <a:rPr lang="nb-NO">
+              <a:rPr lang="nb-NO" dirty="0">
                 <a:cs typeface="Calibri" panose="020F0502020204030204"/>
               </a:rPr>
-              <a:t>Spesielt for de to nye datasentrene i Norge,. ikke alle tjenestene som Azure tilbyr er tilgjengelig fra alle datasentrene, så det er viktig å undersøker dette. Samtidig kan man undersøke hast</a:t>
+              <a:t>Spesielt for de to nye datasentrene i Norge,. ikke alle tjenestene som </a:t>
+            </a:r>
+            <a:r>
+              <a:rPr lang="nb-NO" dirty="0" err="1">
+                <a:cs typeface="Calibri" panose="020F0502020204030204"/>
+              </a:rPr>
+              <a:t>Azure</a:t>
+            </a:r>
+            <a:r>
+              <a:rPr lang="nb-NO" dirty="0">
+                <a:cs typeface="Calibri" panose="020F0502020204030204"/>
+              </a:rPr>
+              <a:t> tilbyr er tilgjengelig fra alle datasentrene, så det er viktig å undersøker dette. Samtidig kan man undersøke hast</a:t>
             </a:r>
           </a:p>
           <a:p>
             <a:pPr>
               <a:defRPr/>
             </a:pPr>
-            <a:endParaRPr lang="nb-NO">
+            <a:endParaRPr lang="nb-NO" dirty="0">
               <a:cs typeface="Calibri" panose="020F0502020204030204"/>
             </a:endParaRPr>
           </a:p>
@@ -8337,7 +8399,7 @@
             <a:pPr>
               <a:defRPr/>
             </a:pPr>
-            <a:endParaRPr lang="nb-NO">
+            <a:endParaRPr lang="nb-NO" dirty="0">
               <a:cs typeface="Calibri" panose="020F0502020204030204"/>
             </a:endParaRPr>
           </a:p>
@@ -8347,7 +8409,7 @@
               <a:buChar char="-"/>
               <a:defRPr/>
             </a:pPr>
-            <a:endParaRPr lang="nb-NO"/>
+            <a:endParaRPr lang="nb-NO" dirty="0"/>
           </a:p>
           <a:p>
             <a:pPr marL="171450" marR="0" lvl="0" indent="-171450" algn="l" defTabSz="914400" rtl="0" eaLnBrk="1" fontAlgn="auto" latinLnBrk="0" hangingPunct="1">
@@ -8368,19 +8430,19 @@
               <a:defRPr/>
             </a:pPr>
             <a:r>
-              <a:rPr lang="nb-NO"/>
+              <a:rPr lang="nb-NO" dirty="0"/>
               <a:t>Speedtest: </a:t>
             </a:r>
           </a:p>
           <a:p>
-            <a:endParaRPr lang="nb-NO"/>
-          </a:p>
-          <a:p>
-            <a:endParaRPr lang="nb-NO"/>
-          </a:p>
-          <a:p>
-            <a:r>
-              <a:rPr lang="nb-NO"/>
+            <a:endParaRPr lang="nb-NO" dirty="0"/>
+          </a:p>
+          <a:p>
+            <a:endParaRPr lang="nb-NO" dirty="0"/>
+          </a:p>
+          <a:p>
+            <a:r>
+              <a:rPr lang="nb-NO" dirty="0"/>
               <a:t>Hvorfor har ikke alle regionene alle tjenestene tilgjengelig?</a:t>
             </a:r>
           </a:p>
@@ -23861,14 +23923,14 @@
           </a:ln>
           <a:extLst>
             <a:ext uri="{909E8E84-426E-40dd-AFC4-6F175D3DCCD1}">
-              <a14:hiddenFill xmlns="" xmlns:lc="http://schemas.openxmlformats.org/drawingml/2006/lockedCanvas" xmlns:a14="http://schemas.microsoft.com/office/drawing/2010/main">
+              <a14:hiddenFill xmlns:a14="http://schemas.microsoft.com/office/drawing/2010/main" xmlns:lc="http://schemas.openxmlformats.org/drawingml/2006/lockedCanvas" xmlns="">
                 <a:solidFill>
                   <a:srgbClr val="FFFFFF"/>
                 </a:solidFill>
               </a14:hiddenFill>
             </a:ext>
             <a:ext uri="{91240B29-F687-4f45-9708-019B960494DF}">
-              <a14:hiddenLine xmlns="" xmlns:lc="http://schemas.openxmlformats.org/drawingml/2006/lockedCanvas" xmlns:a14="http://schemas.microsoft.com/office/drawing/2010/main" w="9525">
+              <a14:hiddenLine xmlns:a14="http://schemas.microsoft.com/office/drawing/2010/main" xmlns:lc="http://schemas.openxmlformats.org/drawingml/2006/lockedCanvas" xmlns="" w="9525">
                 <a:solidFill>
                   <a:srgbClr val="000000"/>
                 </a:solidFill>
@@ -24057,14 +24119,14 @@
           </a:ln>
           <a:extLst>
             <a:ext uri="{909E8E84-426E-40dd-AFC4-6F175D3DCCD1}">
-              <a14:hiddenFill xmlns="" xmlns:lc="http://schemas.openxmlformats.org/drawingml/2006/lockedCanvas" xmlns:a14="http://schemas.microsoft.com/office/drawing/2010/main">
+              <a14:hiddenFill xmlns:a14="http://schemas.microsoft.com/office/drawing/2010/main" xmlns:lc="http://schemas.openxmlformats.org/drawingml/2006/lockedCanvas" xmlns="">
                 <a:solidFill>
                   <a:srgbClr val="FFFFFF"/>
                 </a:solidFill>
               </a14:hiddenFill>
             </a:ext>
             <a:ext uri="{91240B29-F687-4f45-9708-019B960494DF}">
-              <a14:hiddenLine xmlns="" xmlns:lc="http://schemas.openxmlformats.org/drawingml/2006/lockedCanvas" xmlns:a14="http://schemas.microsoft.com/office/drawing/2010/main" w="9525">
+              <a14:hiddenLine xmlns:a14="http://schemas.microsoft.com/office/drawing/2010/main" xmlns:lc="http://schemas.openxmlformats.org/drawingml/2006/lockedCanvas" xmlns="" w="9525">
                 <a:solidFill>
                   <a:srgbClr val="000000"/>
                 </a:solidFill>
@@ -24525,14 +24587,14 @@
           </a:ln>
           <a:extLst>
             <a:ext uri="{909E8E84-426E-40dd-AFC4-6F175D3DCCD1}">
-              <a14:hiddenFill xmlns="" xmlns:lc="http://schemas.openxmlformats.org/drawingml/2006/lockedCanvas" xmlns:a14="http://schemas.microsoft.com/office/drawing/2010/main">
+              <a14:hiddenFill xmlns:a14="http://schemas.microsoft.com/office/drawing/2010/main" xmlns:lc="http://schemas.openxmlformats.org/drawingml/2006/lockedCanvas" xmlns="">
                 <a:solidFill>
                   <a:srgbClr val="FFFFFF"/>
                 </a:solidFill>
               </a14:hiddenFill>
             </a:ext>
             <a:ext uri="{91240B29-F687-4f45-9708-019B960494DF}">
-              <a14:hiddenLine xmlns="" xmlns:lc="http://schemas.openxmlformats.org/drawingml/2006/lockedCanvas" xmlns:a14="http://schemas.microsoft.com/office/drawing/2010/main" w="9525">
+              <a14:hiddenLine xmlns:a14="http://schemas.microsoft.com/office/drawing/2010/main" xmlns:lc="http://schemas.openxmlformats.org/drawingml/2006/lockedCanvas" xmlns="" w="9525">
                 <a:solidFill>
                   <a:srgbClr val="000000"/>
                 </a:solidFill>
@@ -25238,14 +25300,14 @@
           </a:ln>
           <a:extLst>
             <a:ext uri="{909E8E84-426E-40dd-AFC4-6F175D3DCCD1}">
-              <a14:hiddenFill xmlns="" xmlns:lc="http://schemas.openxmlformats.org/drawingml/2006/lockedCanvas" xmlns:a14="http://schemas.microsoft.com/office/drawing/2010/main">
+              <a14:hiddenFill xmlns:a14="http://schemas.microsoft.com/office/drawing/2010/main" xmlns:lc="http://schemas.openxmlformats.org/drawingml/2006/lockedCanvas" xmlns="">
                 <a:solidFill>
                   <a:srgbClr val="FFFFFF"/>
                 </a:solidFill>
               </a14:hiddenFill>
             </a:ext>
             <a:ext uri="{91240B29-F687-4f45-9708-019B960494DF}">
-              <a14:hiddenLine xmlns="" xmlns:lc="http://schemas.openxmlformats.org/drawingml/2006/lockedCanvas" xmlns:a14="http://schemas.microsoft.com/office/drawing/2010/main" w="9525">
+              <a14:hiddenLine xmlns:a14="http://schemas.microsoft.com/office/drawing/2010/main" xmlns:lc="http://schemas.openxmlformats.org/drawingml/2006/lockedCanvas" xmlns="" w="9525">
                 <a:solidFill>
                   <a:srgbClr val="000000"/>
                 </a:solidFill>
@@ -25298,14 +25360,14 @@
           </a:ln>
           <a:extLst>
             <a:ext uri="{909E8E84-426E-40dd-AFC4-6F175D3DCCD1}">
-              <a14:hiddenFill xmlns="" xmlns:lc="http://schemas.openxmlformats.org/drawingml/2006/lockedCanvas" xmlns:a14="http://schemas.microsoft.com/office/drawing/2010/main">
+              <a14:hiddenFill xmlns:a14="http://schemas.microsoft.com/office/drawing/2010/main" xmlns:lc="http://schemas.openxmlformats.org/drawingml/2006/lockedCanvas" xmlns="">
                 <a:solidFill>
                   <a:srgbClr val="FFFFFF"/>
                 </a:solidFill>
               </a14:hiddenFill>
             </a:ext>
             <a:ext uri="{91240B29-F687-4f45-9708-019B960494DF}">
-              <a14:hiddenLine xmlns="" xmlns:lc="http://schemas.openxmlformats.org/drawingml/2006/lockedCanvas" xmlns:a14="http://schemas.microsoft.com/office/drawing/2010/main" w="9525">
+              <a14:hiddenLine xmlns:a14="http://schemas.microsoft.com/office/drawing/2010/main" xmlns:lc="http://schemas.openxmlformats.org/drawingml/2006/lockedCanvas" xmlns="" w="9525">
                 <a:solidFill>
                   <a:srgbClr val="000000"/>
                 </a:solidFill>
@@ -25846,16 +25908,16 @@
           <a:lstStyle/>
           <a:p>
             <a:r>
-              <a:rPr lang="nb-NO"/>
+              <a:rPr lang="nb-NO" dirty="0"/>
               <a:t>Gå til Leksjon_2</a:t>
             </a:r>
           </a:p>
           <a:p>
-            <a:endParaRPr lang="nb-NO"/>
-          </a:p>
-          <a:p>
-            <a:r>
-              <a:rPr lang="nb-NO"/>
+            <a:endParaRPr lang="nb-NO" dirty="0"/>
+          </a:p>
+          <a:p>
+            <a:r>
+              <a:rPr lang="nb-NO" dirty="0"/>
               <a:t>For å klone ut koden: </a:t>
             </a:r>
           </a:p>
@@ -25864,8 +25926,24 @@
               <a:buNone/>
             </a:pPr>
             <a:r>
-              <a:rPr lang="nb-NO"/>
-              <a:t>     git clone https://github.com/bouvet/azure-workshops.git</a:t>
+              <a:rPr lang="nb-NO" dirty="0"/>
+              <a:t>     </a:t>
+            </a:r>
+            <a:r>
+              <a:rPr lang="nb-NO" dirty="0" err="1"/>
+              <a:t>git</a:t>
+            </a:r>
+            <a:r>
+              <a:rPr lang="nb-NO" dirty="0"/>
+              <a:t> </a:t>
+            </a:r>
+            <a:r>
+              <a:rPr lang="nb-NO" dirty="0" err="1"/>
+              <a:t>clone</a:t>
+            </a:r>
+            <a:r>
+              <a:rPr lang="nb-NO" dirty="0"/>
+              <a:t> https://github.com/bouvet/azure-workshops.git</a:t>
             </a:r>
           </a:p>
         </p:txBody>
@@ -26987,12 +27065,12 @@
           <a:lstStyle/>
           <a:p>
             <a:r>
-              <a:rPr lang="nb-NO" err="1"/>
+              <a:rPr lang="nb-NO" dirty="0" err="1"/>
               <a:t>Azureskolen</a:t>
             </a:r>
             <a:r>
-              <a:rPr lang="nb-NO"/>
-              <a:t> Workshop – Foreløpig plan</a:t>
+              <a:rPr lang="nb-NO" dirty="0"/>
+              <a:t> Workshop</a:t>
             </a:r>
           </a:p>
         </p:txBody>
@@ -27019,103 +27097,103 @@
           <a:lstStyle/>
           <a:p>
             <a:r>
-              <a:rPr lang="nb-NO" sz="2200"/>
+              <a:rPr lang="nb-NO" sz="2200" dirty="0"/>
               <a:t>Workshop #1</a:t>
             </a:r>
           </a:p>
           <a:p>
             <a:pPr lvl="1"/>
             <a:r>
-              <a:rPr lang="en-US" sz="1800"/>
+              <a:rPr lang="en-US" sz="1800" dirty="0"/>
               <a:t>Azure basics</a:t>
             </a:r>
           </a:p>
           <a:p>
             <a:pPr lvl="1"/>
             <a:r>
-              <a:rPr lang="en-US" sz="1800"/>
+              <a:rPr lang="en-US" sz="1800" dirty="0"/>
               <a:t>App Services</a:t>
             </a:r>
           </a:p>
           <a:p>
             <a:pPr lvl="1"/>
             <a:r>
-              <a:rPr lang="en-US" sz="1800"/>
+              <a:rPr lang="en-US" sz="1800" dirty="0"/>
               <a:t>Key Vault</a:t>
             </a:r>
           </a:p>
           <a:p>
             <a:pPr lvl="1"/>
             <a:r>
-              <a:rPr lang="en-US" sz="1800"/>
+              <a:rPr lang="en-US" sz="1800" dirty="0"/>
               <a:t>Storage</a:t>
             </a:r>
           </a:p>
           <a:p>
             <a:r>
-              <a:rPr lang="nb-NO" sz="2200"/>
+              <a:rPr lang="nb-NO" sz="2200" dirty="0"/>
               <a:t>Workshop #2</a:t>
             </a:r>
           </a:p>
           <a:p>
             <a:pPr lvl="1"/>
             <a:r>
-              <a:rPr lang="nb-NO" sz="1800" err="1"/>
+              <a:rPr lang="nb-NO" sz="1800" dirty="0" err="1"/>
               <a:t>Azure</a:t>
             </a:r>
             <a:r>
-              <a:rPr lang="nb-NO" sz="1800"/>
+              <a:rPr lang="nb-NO" sz="1800" dirty="0"/>
               <a:t> </a:t>
             </a:r>
             <a:r>
-              <a:rPr lang="nb-NO" sz="1800" err="1"/>
+              <a:rPr lang="nb-NO" sz="1800" dirty="0" err="1"/>
               <a:t>DevOps</a:t>
             </a:r>
-            <a:endParaRPr lang="nb-NO" sz="1800"/>
+            <a:endParaRPr lang="nb-NO" sz="1800" dirty="0"/>
           </a:p>
           <a:p>
             <a:pPr lvl="2"/>
             <a:r>
-              <a:rPr lang="nb-NO" err="1"/>
+              <a:rPr lang="nb-NO" dirty="0" err="1"/>
               <a:t>Continuous</a:t>
             </a:r>
             <a:r>
-              <a:rPr lang="nb-NO"/>
+              <a:rPr lang="nb-NO" dirty="0"/>
               <a:t> Delivery pipeline</a:t>
             </a:r>
           </a:p>
           <a:p>
             <a:pPr lvl="1"/>
             <a:r>
-              <a:rPr lang="nb-NO" sz="1800"/>
+              <a:rPr lang="nb-NO" sz="1800" dirty="0"/>
               <a:t>ARM-</a:t>
             </a:r>
             <a:r>
-              <a:rPr lang="nb-NO" sz="1800" err="1"/>
+              <a:rPr lang="nb-NO" sz="1800" dirty="0" err="1"/>
               <a:t>templates</a:t>
             </a:r>
             <a:r>
-              <a:rPr lang="nb-NO" sz="1800"/>
+              <a:rPr lang="nb-NO" sz="1800" dirty="0"/>
               <a:t> / </a:t>
             </a:r>
             <a:r>
-              <a:rPr lang="nb-NO" sz="1800" err="1"/>
+              <a:rPr lang="nb-NO" sz="1800" dirty="0" err="1"/>
               <a:t>Infrastructure</a:t>
             </a:r>
             <a:r>
-              <a:rPr lang="nb-NO" sz="1800"/>
+              <a:rPr lang="nb-NO" sz="1800" dirty="0"/>
               <a:t> as Code</a:t>
             </a:r>
           </a:p>
           <a:p>
             <a:pPr lvl="1"/>
             <a:r>
-              <a:rPr lang="nb-NO" sz="1800"/>
+              <a:rPr lang="nb-NO" sz="1800" dirty="0"/>
               <a:t>Application Insights</a:t>
             </a:r>
           </a:p>
           <a:p>
-            <a:endParaRPr lang="nb-NO"/>
+            <a:endParaRPr lang="nb-NO" dirty="0"/>
           </a:p>
         </p:txBody>
       </p:sp>
@@ -27141,74 +27219,101 @@
           <a:lstStyle/>
           <a:p>
             <a:r>
-              <a:rPr lang="nb-NO" sz="2200" b="1"/>
-              <a:t>Workshop #3</a:t>
+              <a:rPr lang="nb-NO" sz="2200" dirty="0"/>
+              <a:t>Workshop</a:t>
+            </a:r>
+            <a:r>
+              <a:rPr lang="nb-NO" sz="2200" b="1" dirty="0"/>
+              <a:t> #3</a:t>
             </a:r>
           </a:p>
           <a:p>
             <a:pPr lvl="1"/>
             <a:r>
-              <a:rPr lang="nb-NO" sz="1800"/>
-              <a:t>Introduksjon til </a:t>
-            </a:r>
-            <a:r>
-              <a:rPr lang="nb-NO" sz="1800" err="1"/>
-              <a:t>sikkerthet</a:t>
-            </a:r>
-            <a:r>
-              <a:rPr lang="nb-NO" sz="1800"/>
-              <a:t> i </a:t>
-            </a:r>
-            <a:r>
-              <a:rPr lang="nb-NO" sz="1800" err="1"/>
+              <a:rPr lang="nb-NO" sz="1800" dirty="0"/>
+              <a:t>Introduksjon til sikkerhet i </a:t>
+            </a:r>
+            <a:r>
+              <a:rPr lang="nb-NO" sz="1800" dirty="0" err="1"/>
               <a:t>Azure</a:t>
             </a:r>
-            <a:endParaRPr lang="nb-NO" sz="1800"/>
+            <a:endParaRPr lang="nb-NO" sz="1800" dirty="0"/>
           </a:p>
           <a:p>
             <a:pPr lvl="1"/>
             <a:r>
-              <a:rPr lang="nb-NO" sz="1800" err="1"/>
+              <a:rPr lang="nb-NO" sz="1800" dirty="0" err="1"/>
               <a:t>Azure</a:t>
             </a:r>
             <a:r>
-              <a:rPr lang="nb-NO" sz="1800"/>
+              <a:rPr lang="nb-NO" sz="1800" dirty="0"/>
               <a:t> Active Directory - autentisering.</a:t>
             </a:r>
           </a:p>
           <a:p>
             <a:pPr lvl="1"/>
             <a:r>
-              <a:rPr lang="nb-NO" sz="1800"/>
+              <a:rPr lang="nb-NO" sz="1800" dirty="0"/>
               <a:t>SAS-tokens i </a:t>
             </a:r>
             <a:r>
-              <a:rPr lang="nb-NO" sz="1800" err="1"/>
+              <a:rPr lang="nb-NO" sz="1800" dirty="0" err="1"/>
               <a:t>Azure</a:t>
             </a:r>
             <a:r>
-              <a:rPr lang="nb-NO" sz="1800"/>
+              <a:rPr lang="nb-NO" sz="1800" dirty="0"/>
               <a:t> Storage</a:t>
             </a:r>
           </a:p>
           <a:p>
             <a:pPr lvl="1"/>
             <a:r>
-              <a:rPr lang="nb-NO" sz="1800"/>
+              <a:rPr lang="nb-NO" sz="1800" dirty="0"/>
               <a:t>Introduksjon til infrastruktur-sikkerhet</a:t>
             </a:r>
           </a:p>
           <a:p>
             <a:r>
-              <a:rPr lang="nb-NO" sz="2200"/>
+              <a:rPr lang="nb-NO" sz="2200" dirty="0"/>
               <a:t>Workshop #4</a:t>
             </a:r>
           </a:p>
           <a:p>
             <a:pPr lvl="1"/>
             <a:r>
-              <a:rPr lang="nb-NO" sz="1800"/>
-              <a:t>TBD</a:t>
+              <a:rPr lang="nb-NO" sz="1800" dirty="0"/>
+              <a:t>Skyarkitektur</a:t>
+            </a:r>
+          </a:p>
+          <a:p>
+            <a:pPr lvl="1"/>
+            <a:r>
+              <a:rPr lang="nb-NO" sz="1800" dirty="0" err="1"/>
+              <a:t>Serverless</a:t>
+            </a:r>
+            <a:r>
+              <a:rPr lang="nb-NO" sz="1800" dirty="0"/>
+              <a:t> og </a:t>
+            </a:r>
+            <a:r>
+              <a:rPr lang="nb-NO" sz="1800" dirty="0" err="1"/>
+              <a:t>Azure</a:t>
+            </a:r>
+            <a:r>
+              <a:rPr lang="nb-NO" sz="1800" dirty="0"/>
+              <a:t> </a:t>
+            </a:r>
+            <a:r>
+              <a:rPr lang="nb-NO" sz="1800" dirty="0" err="1"/>
+              <a:t>Functions</a:t>
+            </a:r>
+            <a:endParaRPr lang="nb-NO" sz="1800" dirty="0"/>
+          </a:p>
+          <a:p>
+            <a:pPr lvl="2"/>
+            <a:r>
+              <a:rPr lang="nb-NO" sz="1600" dirty="0"/>
+              <a:t>Triggers</a:t>
             </a:r>
           </a:p>
         </p:txBody>
@@ -34636,73 +34741,67 @@
           </a:bodyPr>
           <a:lstStyle/>
           <a:p>
-            <a:endParaRPr lang="nb-NO"/>
-          </a:p>
-          <a:p>
-            <a:r>
-              <a:rPr lang="nb-NO"/>
-              <a:t>Antall regioner: 57</a:t>
-            </a:r>
-            <a:endParaRPr lang="nb-NO">
+            <a:endParaRPr lang="nb-NO" dirty="0"/>
+          </a:p>
+          <a:p>
+            <a:r>
+              <a:rPr lang="nb-NO" dirty="0"/>
+              <a:t>Over 60 regioner, og flere </a:t>
+            </a:r>
+            <a:endParaRPr lang="nb-NO" dirty="0">
               <a:cs typeface="Calibri"/>
             </a:endParaRPr>
           </a:p>
           <a:p>
             <a:r>
-              <a:rPr lang="nb-NO">
+              <a:rPr lang="nb-NO" dirty="0">
                 <a:cs typeface="Calibri"/>
               </a:rPr>
-              <a:t>Oversikt: </a:t>
-            </a:r>
-            <a:r>
-              <a:rPr lang="nb-NO">
+              <a:t>Oversikt: </a:t>
+            </a:r>
+            <a:r>
+              <a:rPr lang="nb-NO" dirty="0">
                 <a:cs typeface="Calibri"/>
-                <a:hlinkClick r:id="rId3">
-                  <a:extLst>
-                    <a:ext uri="{A12FA001-AC4F-418D-AE19-62706E023703}">
-                      <ahyp:hlinkClr xmlns:ahyp="http://schemas.microsoft.com/office/drawing/2018/hyperlinkcolor" val="tx"/>
-                    </a:ext>
-                  </a:extLst>
-                </a:hlinkClick>
-              </a:rPr>
-              <a:t>https</a:t>
-            </a:r>
-            <a:r>
-              <a:rPr lang="nb-NO">
                 <a:hlinkClick r:id="rId3"/>
               </a:rPr>
-              <a:t>://azure.microsoft.com/en/global-infrastructure/regions/</a:t>
-            </a:r>
-            <a:endParaRPr lang="nb-NO"/>
-          </a:p>
-          <a:p>
-            <a:r>
-              <a:rPr lang="nb-NO"/>
+              <a:t>https://azure.microsoft.com/en/global-infrastructure</a:t>
+            </a:r>
+            <a:r>
+              <a:rPr lang="nb-NO" dirty="0">
+                <a:cs typeface="Calibri"/>
+              </a:rPr>
+              <a:t>  </a:t>
+            </a:r>
+            <a:endParaRPr lang="nb-NO" dirty="0"/>
+          </a:p>
+          <a:p>
+            <a:r>
+              <a:rPr lang="nb-NO" dirty="0"/>
               <a:t>Speedtest: </a:t>
             </a:r>
             <a:r>
-              <a:rPr lang="nb-NO">
+              <a:rPr lang="nb-NO" dirty="0">
                 <a:hlinkClick r:id="rId4"/>
               </a:rPr>
               <a:t>http://www.azurespeed.com/</a:t>
             </a:r>
-            <a:endParaRPr lang="nb-NO"/>
-          </a:p>
-          <a:p>
-            <a:r>
-              <a:rPr lang="nb-NO"/>
+            <a:endParaRPr lang="nb-NO" dirty="0"/>
+          </a:p>
+          <a:p>
+            <a:r>
+              <a:rPr lang="nb-NO" dirty="0"/>
               <a:t>West/North Norway</a:t>
             </a:r>
           </a:p>
           <a:p>
             <a:r>
-              <a:rPr lang="nb-NO">
+              <a:rPr lang="nb-NO" dirty="0">
                 <a:cs typeface="Calibri"/>
               </a:rPr>
               <a:t>Tilgjengelige tjenester i Norge: </a:t>
             </a:r>
             <a:r>
-              <a:rPr lang="nb-NO">
+              <a:rPr lang="nb-NO" dirty="0">
                 <a:ea typeface="+mn-lt"/>
                 <a:cs typeface="+mn-lt"/>
                 <a:hlinkClick r:id="rId5"/>
@@ -34711,7 +34810,7 @@
             </a:r>
           </a:p>
           <a:p>
-            <a:endParaRPr lang="nb-NO">
+            <a:endParaRPr lang="nb-NO" dirty="0">
               <a:ea typeface="+mn-lt"/>
               <a:cs typeface="+mn-lt"/>
             </a:endParaRPr>
@@ -36291,18 +36390,18 @@
 </file>
 
 <file path=customXml/item1.xml><?xml version="1.0" encoding="utf-8"?>
+<p:properties xmlns:p="http://schemas.microsoft.com/office/2006/metadata/properties" xmlns:xsi="http://www.w3.org/2001/XMLSchema-instance" xmlns:pc="http://schemas.microsoft.com/office/infopath/2007/PartnerControls">
+  <documentManagement/>
+</p:properties>
+</file>
+
+<file path=customXml/item2.xml><?xml version="1.0" encoding="utf-8"?>
 <?mso-contentType ?>
 <FormTemplates xmlns="http://schemas.microsoft.com/sharepoint/v3/contenttype/forms">
   <Display>DocumentLibraryForm</Display>
   <Edit>DocumentLibraryForm</Edit>
   <New>DocumentLibraryForm</New>
 </FormTemplates>
-</file>
-
-<file path=customXml/item2.xml><?xml version="1.0" encoding="utf-8"?>
-<p:properties xmlns:p="http://schemas.microsoft.com/office/2006/metadata/properties" xmlns:xsi="http://www.w3.org/2001/XMLSchema-instance" xmlns:pc="http://schemas.microsoft.com/office/infopath/2007/PartnerControls">
-  <documentManagement/>
-</p:properties>
 </file>
 
 <file path=customXml/item3.xml><?xml version="1.0" encoding="utf-8"?>
@@ -36515,14 +36614,6 @@
 </file>
 
 <file path=customXml/itemProps1.xml><?xml version="1.0" encoding="utf-8"?>
-<ds:datastoreItem xmlns:ds="http://schemas.openxmlformats.org/officeDocument/2006/customXml" ds:itemID="{BB82CC63-55FC-4D22-9ED3-DB88AF6228E1}">
-  <ds:schemaRefs>
-    <ds:schemaRef ds:uri="http://schemas.microsoft.com/sharepoint/v3/contenttype/forms"/>
-  </ds:schemaRefs>
-</ds:datastoreItem>
-</file>
-
-<file path=customXml/itemProps2.xml><?xml version="1.0" encoding="utf-8"?>
 <ds:datastoreItem xmlns:ds="http://schemas.openxmlformats.org/officeDocument/2006/customXml" ds:itemID="{9D2CB842-18D5-4EEF-9009-B0CAFCE7AC3E}">
   <ds:schemaRefs>
     <ds:schemaRef ds:uri="7ba49632-979e-4ee1-aefd-7896aa63ba9e"/>
@@ -36535,6 +36626,14 @@
     <ds:schemaRef ds:uri="http://schemas.microsoft.com/office/infopath/2007/PartnerControls"/>
     <ds:schemaRef ds:uri="http://schemas.openxmlformats.org/package/2006/metadata/core-properties"/>
     <ds:schemaRef ds:uri="http://www.w3.org/XML/1998/namespace"/>
+  </ds:schemaRefs>
+</ds:datastoreItem>
+</file>
+
+<file path=customXml/itemProps2.xml><?xml version="1.0" encoding="utf-8"?>
+<ds:datastoreItem xmlns:ds="http://schemas.openxmlformats.org/officeDocument/2006/customXml" ds:itemID="{BB82CC63-55FC-4D22-9ED3-DB88AF6228E1}">
+  <ds:schemaRefs>
+    <ds:schemaRef ds:uri="http://schemas.microsoft.com/sharepoint/v3/contenttype/forms"/>
   </ds:schemaRefs>
 </ds:datastoreItem>
 </file>

</xml_diff>

<commit_message>
Oppdatert fra PR + PPT-gjennomgang
</commit_message>
<xml_diff>
--- a/Workshop_1/Presentasjon/Azureskolen-Workshop#1.pptx
+++ b/Workshop_1/Presentasjon/Azureskolen-Workshop#1.pptx
@@ -258,7 +258,7 @@
           <a:p>
             <a:fld id="{54C52192-B826-4AE0-9CD6-BEA9467D12B3}" type="datetimeFigureOut">
               <a:rPr lang="nb-NO" smtClean="0"/>
-              <a:t>11.08.2022</a:t>
+              <a:t>02.09.2022</a:t>
             </a:fld>
             <a:endParaRPr lang="nb-NO"/>
           </a:p>
@@ -423,7 +423,7 @@
           <a:p>
             <a:fld id="{2696BCB2-2760-41B1-A1BE-7886EF110FCB}" type="datetimeFigureOut">
               <a:rPr lang="nb-NO" smtClean="0"/>
-              <a:t>11.08.2022</a:t>
+              <a:t>02.09.2022</a:t>
             </a:fld>
             <a:endParaRPr lang="nb-NO"/>
           </a:p>
@@ -820,70 +820,70 @@
           <a:lstStyle/>
           <a:p>
             <a:r>
-              <a:rPr lang="nb-NO"/>
+              <a:rPr lang="nb-NO" dirty="0"/>
               <a:t>Nå har vi snakket en del om Servicer. Også er det kanskje litt vanskelig å </a:t>
             </a:r>
             <a:r>
-              <a:rPr lang="nb-NO" err="1"/>
+              <a:rPr lang="nb-NO" dirty="0" err="1"/>
               <a:t>graspe</a:t>
             </a:r>
             <a:r>
-              <a:rPr lang="nb-NO"/>
+              <a:rPr lang="nb-NO" dirty="0"/>
               <a:t> </a:t>
             </a:r>
             <a:r>
-              <a:rPr lang="nb-NO" err="1"/>
+              <a:rPr lang="nb-NO" dirty="0" err="1"/>
               <a:t>heelt</a:t>
             </a:r>
             <a:r>
-              <a:rPr lang="nb-NO"/>
+              <a:rPr lang="nb-NO" dirty="0"/>
               <a:t> hva det er. </a:t>
             </a:r>
           </a:p>
           <a:p>
             <a:r>
-              <a:rPr lang="nb-NO"/>
+              <a:rPr lang="nb-NO" dirty="0"/>
               <a:t>Så la meg gjøre et lite forsøk, men hvis dere derimot er 100% fortrolig med servicer så skrik ut, så går vi litt raskere frem, evt. Skrik ut om det motsatte så prøver vi å forklare på en annen måte.</a:t>
             </a:r>
           </a:p>
           <a:p>
-            <a:endParaRPr lang="nb-NO"/>
-          </a:p>
-          <a:p>
-            <a:r>
-              <a:rPr lang="nb-NO"/>
+            <a:endParaRPr lang="nb-NO" dirty="0"/>
+          </a:p>
+          <a:p>
+            <a:r>
+              <a:rPr lang="nb-NO" dirty="0"/>
               <a:t>Servicer, eller </a:t>
             </a:r>
             <a:r>
-              <a:rPr lang="nb-NO" err="1"/>
+              <a:rPr lang="nb-NO" dirty="0" err="1"/>
               <a:t>tjenster</a:t>
             </a:r>
             <a:r>
-              <a:rPr lang="nb-NO"/>
+              <a:rPr lang="nb-NO" dirty="0"/>
               <a:t> på norsk, er i all hovedsak deler av applikasjonen din som du slipper å gjøre noe med selv fordi noen andre har gjort det for deg. Bildet her viser et utsnitt av de mange servicene som </a:t>
             </a:r>
             <a:r>
-              <a:rPr lang="nb-NO" err="1"/>
+              <a:rPr lang="nb-NO" dirty="0" err="1"/>
               <a:t>Azure</a:t>
             </a:r>
             <a:r>
-              <a:rPr lang="nb-NO"/>
+              <a:rPr lang="nb-NO" dirty="0"/>
               <a:t> tilbyr innen for disse ulike kategoriene. Hvor mye av din applikasjon, </a:t>
             </a:r>
             <a:r>
-              <a:rPr lang="nb-NO" err="1"/>
+              <a:rPr lang="nb-NO" dirty="0" err="1"/>
               <a:t>azure</a:t>
             </a:r>
             <a:r>
-              <a:rPr lang="nb-NO"/>
+              <a:rPr lang="nb-NO" dirty="0"/>
               <a:t> servicen utgjør avhenger litt av hvilke(n) service du velger. Og her kommer dette med </a:t>
             </a:r>
             <a:r>
-              <a:rPr lang="nb-NO" err="1"/>
+              <a:rPr lang="nb-NO" dirty="0" err="1"/>
               <a:t>Infrastructure</a:t>
             </a:r>
             <a:r>
-              <a:rPr lang="nb-NO"/>
+              <a:rPr lang="nb-NO" dirty="0"/>
               <a:t>, Plattform og Software som en service.</a:t>
             </a:r>
           </a:p>
@@ -1268,60 +1268,54 @@
           <a:bodyPr/>
           <a:lstStyle/>
           <a:p>
-            <a:r>
-              <a:rPr lang="nb-NO"/>
-              <a:t>Når alt kommer til stykket, så</a:t>
-            </a:r>
-          </a:p>
-          <a:p>
-            <a:endParaRPr lang="nb-NO"/>
-          </a:p>
-          <a:p>
-            <a:endParaRPr lang="nb-NO"/>
-          </a:p>
-          <a:p>
-            <a:r>
-              <a:rPr lang="nb-NO"/>
+            <a:endParaRPr lang="nb-NO" dirty="0"/>
+          </a:p>
+          <a:p>
+            <a:endParaRPr lang="nb-NO" dirty="0"/>
+          </a:p>
+          <a:p>
+            <a:r>
+              <a:rPr lang="nb-NO" dirty="0"/>
               <a:t>Man kan også velge å bruke en del gratistjenester ved siden av tjenesten for å forbedre den. </a:t>
             </a:r>
           </a:p>
           <a:p>
             <a:r>
-              <a:rPr lang="nb-NO" err="1"/>
+              <a:rPr lang="nb-NO" dirty="0" err="1"/>
               <a:t>Azure</a:t>
             </a:r>
             <a:r>
-              <a:rPr lang="nb-NO"/>
+              <a:rPr lang="nb-NO" dirty="0"/>
               <a:t> Monitor og </a:t>
             </a:r>
             <a:r>
-              <a:rPr lang="nb-NO" err="1"/>
+              <a:rPr lang="nb-NO" dirty="0" err="1"/>
               <a:t>Azure</a:t>
             </a:r>
             <a:r>
-              <a:rPr lang="nb-NO"/>
+              <a:rPr lang="nb-NO" dirty="0"/>
               <a:t> Advisor er noe av det man kan ta i bruk. Advisor vil gi deg tips til forbedringer og overvåker alle tjenester ved hjelp av AI.</a:t>
             </a:r>
           </a:p>
           <a:p>
             <a:r>
-              <a:rPr lang="nb-NO"/>
+              <a:rPr lang="nb-NO" dirty="0"/>
               <a:t>Monitor gir deg mulighet for </a:t>
             </a:r>
             <a:r>
-              <a:rPr lang="nb-NO" err="1"/>
+              <a:rPr lang="nb-NO" dirty="0" err="1"/>
               <a:t>monitorering</a:t>
             </a:r>
             <a:r>
-              <a:rPr lang="nb-NO"/>
+              <a:rPr lang="nb-NO" dirty="0"/>
               <a:t> av </a:t>
             </a:r>
             <a:r>
-              <a:rPr lang="nb-NO" err="1"/>
+              <a:rPr lang="nb-NO" dirty="0" err="1"/>
               <a:t>Vmer</a:t>
             </a:r>
             <a:r>
-              <a:rPr lang="nb-NO"/>
+              <a:rPr lang="nb-NO" dirty="0"/>
               <a:t>, nettverk og du kan lage spørringer på dataene den</a:t>
             </a:r>
           </a:p>
@@ -2667,12 +2661,18 @@
           <a:lstStyle/>
           <a:p>
             <a:r>
-              <a:rPr lang="nb-NO" err="1"/>
+              <a:rPr lang="nb-NO" dirty="0" err="1"/>
               <a:t>Slots</a:t>
             </a:r>
             <a:r>
-              <a:rPr lang="nb-NO"/>
+              <a:rPr lang="nb-NO" dirty="0"/>
               <a:t> er fint å bruke for eksempel til Production og Staging, så de ligger på samme og kan enkelt og raskt endre fra en til den andre og tilbake igjen</a:t>
+            </a:r>
+          </a:p>
+          <a:p>
+            <a:r>
+              <a:rPr lang="nb-NO" dirty="0"/>
+              <a:t>Bør ikke brukes til å kjøre flere miljøer i samme web app, ingen isolasjon mellom miljøer.</a:t>
             </a:r>
           </a:p>
         </p:txBody>
@@ -2762,16 +2762,8 @@
               <a:buChar char="-"/>
             </a:pPr>
             <a:r>
-              <a:rPr lang="nb-NO"/>
-              <a:t>Web </a:t>
-            </a:r>
-            <a:r>
-              <a:rPr lang="nb-NO" err="1"/>
-              <a:t>Apps</a:t>
-            </a:r>
-            <a:r>
-              <a:rPr lang="nb-NO"/>
-              <a:t> demo:</a:t>
+              <a:rPr lang="nb-NO" dirty="0"/>
+              <a:t>Web Apps demo:</a:t>
             </a:r>
           </a:p>
           <a:p>
@@ -2780,8 +2772,16 @@
               <a:buChar char="-"/>
             </a:pPr>
             <a:r>
-              <a:rPr lang="nb-NO"/>
-              <a:t>Hvis en webapps.</a:t>
+              <a:rPr lang="nb-NO" dirty="0"/>
+              <a:t>Hvis en </a:t>
+            </a:r>
+            <a:r>
+              <a:rPr lang="nb-NO" dirty="0" err="1"/>
+              <a:t>webapps</a:t>
+            </a:r>
+            <a:r>
+              <a:rPr lang="nb-NO" dirty="0"/>
+              <a:t>.</a:t>
             </a:r>
           </a:p>
         </p:txBody>
@@ -3354,121 +3354,145 @@
           <a:lstStyle/>
           <a:p>
             <a:r>
-              <a:rPr lang="nb-NO"/>
+              <a:rPr lang="nb-NO" dirty="0"/>
               <a:t>Ja som </a:t>
             </a:r>
             <a:r>
-              <a:rPr lang="nb-NO" err="1"/>
+              <a:rPr lang="nb-NO" dirty="0" err="1"/>
               <a:t>Sharukh</a:t>
             </a:r>
             <a:r>
-              <a:rPr lang="nb-NO"/>
-              <a:t> nevnte, skal vi i dag snakke litt om en av Azure sine </a:t>
-            </a:r>
-            <a:r>
-              <a:rPr lang="nb-NO" err="1"/>
+              <a:rPr lang="nb-NO" dirty="0"/>
+              <a:t> nevnte, skal vi i dag snakke litt om en av </a:t>
+            </a:r>
+            <a:r>
+              <a:rPr lang="nb-NO" dirty="0" err="1"/>
+              <a:t>Azure</a:t>
+            </a:r>
+            <a:r>
+              <a:rPr lang="nb-NO" dirty="0"/>
+              <a:t> sine </a:t>
+            </a:r>
+            <a:r>
+              <a:rPr lang="nb-NO" dirty="0" err="1"/>
               <a:t>lagringsstjenester</a:t>
             </a:r>
             <a:r>
-              <a:rPr lang="nb-NO"/>
+              <a:rPr lang="nb-NO" dirty="0"/>
               <a:t>. Mer </a:t>
             </a:r>
             <a:r>
-              <a:rPr lang="nb-NO" err="1"/>
+              <a:rPr lang="nb-NO" dirty="0" err="1"/>
               <a:t>nøyaktiv</a:t>
             </a:r>
             <a:r>
-              <a:rPr lang="nb-NO"/>
-              <a:t> Azure Storage </a:t>
-            </a:r>
-            <a:r>
-              <a:rPr lang="nb-NO" err="1"/>
+              <a:rPr lang="nb-NO" dirty="0"/>
+              <a:t> </a:t>
+            </a:r>
+            <a:r>
+              <a:rPr lang="nb-NO" dirty="0" err="1"/>
+              <a:t>Azure</a:t>
+            </a:r>
+            <a:r>
+              <a:rPr lang="nb-NO" dirty="0"/>
+              <a:t> Storage </a:t>
+            </a:r>
+            <a:r>
+              <a:rPr lang="nb-NO" dirty="0" err="1"/>
               <a:t>Account</a:t>
             </a:r>
             <a:r>
-              <a:rPr lang="nb-NO"/>
+              <a:rPr lang="nb-NO" dirty="0"/>
               <a:t>.</a:t>
             </a:r>
           </a:p>
           <a:p>
-            <a:endParaRPr lang="nb-NO"/>
-          </a:p>
-          <a:p>
-            <a:r>
-              <a:rPr lang="nb-NO"/>
+            <a:endParaRPr lang="nb-NO" dirty="0"/>
+          </a:p>
+          <a:p>
+            <a:r>
+              <a:rPr lang="nb-NO" dirty="0"/>
               <a:t>I løpet av </a:t>
             </a:r>
             <a:r>
-              <a:rPr lang="nb-NO" err="1"/>
+              <a:rPr lang="nb-NO" dirty="0" err="1"/>
               <a:t>workshoppen</a:t>
             </a:r>
             <a:r>
-              <a:rPr lang="nb-NO"/>
+              <a:rPr lang="nb-NO" dirty="0"/>
               <a:t> skal samtlige her ha fått satt opp en Storage </a:t>
             </a:r>
             <a:r>
-              <a:rPr lang="nb-NO" err="1"/>
+              <a:rPr lang="nb-NO" dirty="0" err="1"/>
               <a:t>Account</a:t>
             </a:r>
             <a:r>
-              <a:rPr lang="nb-NO"/>
+              <a:rPr lang="nb-NO" dirty="0"/>
               <a:t>, og tatt i bruk </a:t>
             </a:r>
             <a:r>
-              <a:rPr lang="nb-NO" err="1"/>
+              <a:rPr lang="nb-NO" dirty="0" err="1"/>
               <a:t>Blob</a:t>
             </a:r>
             <a:r>
-              <a:rPr lang="nb-NO"/>
+              <a:rPr lang="nb-NO" dirty="0"/>
               <a:t> Storage tjenesten. Denne skal så kodes inn i </a:t>
             </a:r>
             <a:r>
-              <a:rPr lang="nb-NO" err="1"/>
+              <a:rPr lang="nb-NO" dirty="0" err="1"/>
               <a:t>katteopplasteren</a:t>
             </a:r>
             <a:r>
-              <a:rPr lang="nb-NO"/>
-              <a:t> fra forrige workshop, slik at vi får muligheten til å laste opp bilder. Vi skal også ta i bruk av Azure </a:t>
-            </a:r>
-            <a:r>
-              <a:rPr lang="nb-NO" err="1"/>
+              <a:rPr lang="nb-NO" dirty="0"/>
+              <a:t> fra forrige workshop, slik at vi får muligheten til å laste opp bilder. Vi skal også ta i bruk av </a:t>
+            </a:r>
+            <a:r>
+              <a:rPr lang="nb-NO" dirty="0" err="1"/>
+              <a:t>Azure</a:t>
+            </a:r>
+            <a:r>
+              <a:rPr lang="nb-NO" dirty="0"/>
+              <a:t> </a:t>
+            </a:r>
+            <a:r>
+              <a:rPr lang="nb-NO" dirty="0" err="1"/>
               <a:t>Keyvault</a:t>
             </a:r>
             <a:r>
-              <a:rPr lang="nb-NO"/>
+              <a:rPr lang="nb-NO" dirty="0"/>
               <a:t> for å ikke ha noen </a:t>
             </a:r>
             <a:r>
-              <a:rPr lang="nb-NO" err="1"/>
+              <a:rPr lang="nb-NO" dirty="0" err="1"/>
               <a:t>hemmlige</a:t>
             </a:r>
             <a:r>
-              <a:rPr lang="nb-NO"/>
+              <a:rPr lang="nb-NO" dirty="0"/>
               <a:t> nøkler i </a:t>
             </a:r>
             <a:r>
-              <a:rPr lang="nb-NO" err="1"/>
+              <a:rPr lang="nb-NO" dirty="0" err="1"/>
               <a:t>plaintekst</a:t>
             </a:r>
             <a:r>
-              <a:rPr lang="nb-NO"/>
+              <a:rPr lang="nb-NO" dirty="0"/>
               <a:t> i koden vår.</a:t>
             </a:r>
           </a:p>
           <a:p>
-            <a:endParaRPr lang="nb-NO"/>
-          </a:p>
-          <a:p>
-            <a:r>
-              <a:rPr lang="nb-NO"/>
+            <a:endParaRPr lang="nb-NO" dirty="0"/>
+          </a:p>
+          <a:p>
+            <a:r>
+              <a:rPr lang="nb-NO" dirty="0"/>
               <a:t>En Storage </a:t>
             </a:r>
             <a:r>
-              <a:rPr lang="nb-NO" err="1"/>
+              <a:rPr lang="nb-NO" dirty="0" err="1"/>
               <a:t>Account</a:t>
             </a:r>
             <a:r>
-              <a:rPr lang="nb-NO"/>
+              <a:rPr lang="nb-NO" dirty="0"/>
               <a:t> tilbyr </a:t>
             </a:r>
           </a:p>
@@ -3478,15 +3502,15 @@
               <a:buChar char="•"/>
             </a:pPr>
             <a:r>
-              <a:rPr lang="nb-NO"/>
+              <a:rPr lang="nb-NO" dirty="0"/>
               <a:t>Et filsystem i skyen. (</a:t>
             </a:r>
             <a:r>
-              <a:rPr lang="nb-NO" err="1"/>
+              <a:rPr lang="nb-NO" dirty="0" err="1"/>
               <a:t>f.eks</a:t>
             </a:r>
             <a:r>
-              <a:rPr lang="nb-NO"/>
+              <a:rPr lang="nb-NO" dirty="0"/>
               <a:t> en disk du kan koble til over nettet)</a:t>
             </a:r>
           </a:p>
@@ -3496,15 +3520,15 @@
               <a:buChar char="•"/>
             </a:pPr>
             <a:r>
-              <a:rPr lang="nb-NO"/>
+              <a:rPr lang="nb-NO" dirty="0"/>
               <a:t>En </a:t>
             </a:r>
             <a:r>
-              <a:rPr lang="nb-NO" err="1"/>
+              <a:rPr lang="nb-NO" dirty="0" err="1"/>
               <a:t>køtjeneste</a:t>
             </a:r>
             <a:r>
-              <a:rPr lang="nb-NO"/>
+              <a:rPr lang="nb-NO" dirty="0"/>
               <a:t>, (Implementeres ofte inn i eksisterende løsninger for å hindre flaskehalser ved mye trafikk.)</a:t>
             </a:r>
           </a:p>
@@ -3514,15 +3538,15 @@
               <a:buChar char="•"/>
             </a:pPr>
             <a:r>
-              <a:rPr lang="nb-NO"/>
+              <a:rPr lang="nb-NO" dirty="0"/>
               <a:t>En tabell lagring (et sted for å lagre </a:t>
             </a:r>
             <a:r>
-              <a:rPr lang="nb-NO" err="1"/>
+              <a:rPr lang="nb-NO" dirty="0" err="1"/>
               <a:t>semi</a:t>
             </a:r>
             <a:r>
-              <a:rPr lang="nb-NO"/>
+              <a:rPr lang="nb-NO" dirty="0"/>
               <a:t> strukturert data)</a:t>
             </a:r>
           </a:p>
@@ -3532,40 +3556,40 @@
               <a:buChar char="•"/>
             </a:pPr>
             <a:r>
-              <a:rPr lang="nb-NO"/>
+              <a:rPr lang="nb-NO" dirty="0"/>
               <a:t>Og lagring av data objekter (Virtuell katalogstruktur)</a:t>
             </a:r>
           </a:p>
           <a:p>
-            <a:endParaRPr lang="nb-NO"/>
-          </a:p>
-          <a:p>
-            <a:r>
-              <a:rPr lang="nb-NO"/>
+            <a:endParaRPr lang="nb-NO" dirty="0"/>
+          </a:p>
+          <a:p>
+            <a:r>
+              <a:rPr lang="nb-NO" dirty="0"/>
               <a:t>Vi skal gå nærmere inn på disse fire tjenestene som er tilgjengelig fra en Storage </a:t>
             </a:r>
             <a:r>
-              <a:rPr lang="nb-NO" err="1"/>
+              <a:rPr lang="nb-NO" dirty="0" err="1"/>
               <a:t>Account</a:t>
             </a:r>
             <a:r>
-              <a:rPr lang="nb-NO"/>
+              <a:rPr lang="nb-NO" dirty="0"/>
               <a:t>, i løpet av de neste </a:t>
             </a:r>
             <a:r>
-              <a:rPr lang="nb-NO" err="1"/>
+              <a:rPr lang="nb-NO" dirty="0" err="1"/>
               <a:t>slidene</a:t>
             </a:r>
             <a:r>
-              <a:rPr lang="nb-NO"/>
+              <a:rPr lang="nb-NO" dirty="0"/>
               <a:t>.</a:t>
             </a:r>
           </a:p>
           <a:p>
-            <a:endParaRPr lang="nb-NO"/>
-          </a:p>
-          <a:p>
-            <a:endParaRPr lang="nb-NO"/>
+            <a:endParaRPr lang="nb-NO" dirty="0"/>
+          </a:p>
+          <a:p>
+            <a:endParaRPr lang="nb-NO" dirty="0"/>
           </a:p>
           <a:p>
             <a:pPr marL="171450" indent="-171450">
@@ -3573,7 +3597,7 @@
               <a:buChar char="•"/>
             </a:pPr>
             <a:r>
-              <a:rPr lang="nb-NO"/>
+              <a:rPr lang="nb-NO" dirty="0"/>
               <a:t>Tjenesten er holdbar, Microsoft håndterer all maskinvarefeil. </a:t>
             </a:r>
           </a:p>
@@ -3582,7 +3606,7 @@
               <a:buFont typeface="Arial" panose="020B0604020202020204" pitchFamily="34" charset="0"/>
               <a:buChar char="•"/>
             </a:pPr>
-            <a:endParaRPr lang="nb-NO"/>
+            <a:endParaRPr lang="nb-NO" dirty="0"/>
           </a:p>
           <a:p>
             <a:pPr marL="171450" indent="-171450">
@@ -3590,23 +3614,23 @@
               <a:buChar char="•"/>
             </a:pPr>
             <a:r>
-              <a:rPr lang="nb-NO"/>
+              <a:rPr lang="nb-NO" dirty="0"/>
               <a:t>Den er sikker, siden all dataen er kryptert, typ BitLocker </a:t>
             </a:r>
             <a:r>
-              <a:rPr lang="nb-NO" err="1"/>
+              <a:rPr lang="nb-NO" dirty="0" err="1"/>
               <a:t>krpytering</a:t>
             </a:r>
             <a:r>
-              <a:rPr lang="nb-NO"/>
+              <a:rPr lang="nb-NO" dirty="0"/>
               <a:t> på Windows (256-bit AES kryptering). Denne krypteringen er påslått by </a:t>
             </a:r>
             <a:r>
-              <a:rPr lang="nb-NO" err="1"/>
+              <a:rPr lang="nb-NO" dirty="0" err="1"/>
               <a:t>default</a:t>
             </a:r>
             <a:r>
-              <a:rPr lang="nb-NO"/>
+              <a:rPr lang="nb-NO" dirty="0"/>
               <a:t>, og det er ikke mulig å deaktivere denne. </a:t>
             </a:r>
           </a:p>
@@ -3615,7 +3639,7 @@
               <a:buFont typeface="Arial" panose="020B0604020202020204" pitchFamily="34" charset="0"/>
               <a:buChar char="•"/>
             </a:pPr>
-            <a:endParaRPr lang="nb-NO"/>
+            <a:endParaRPr lang="nb-NO" dirty="0"/>
           </a:p>
           <a:p>
             <a:pPr marL="171450" indent="-171450">
@@ -3623,15 +3647,15 @@
               <a:buChar char="•"/>
             </a:pPr>
             <a:r>
-              <a:rPr lang="nb-NO"/>
+              <a:rPr lang="nb-NO" dirty="0"/>
               <a:t>Den er skalerbar siden den kan håndtere opp til </a:t>
             </a:r>
             <a:r>
-              <a:rPr lang="nb-NO" err="1"/>
+              <a:rPr lang="nb-NO" dirty="0" err="1"/>
               <a:t>petabytes</a:t>
             </a:r>
             <a:r>
-              <a:rPr lang="nb-NO"/>
+              <a:rPr lang="nb-NO" dirty="0"/>
               <a:t> av data </a:t>
             </a:r>
           </a:p>
@@ -3640,7 +3664,7 @@
               <a:buFont typeface="Arial" panose="020B0604020202020204" pitchFamily="34" charset="0"/>
               <a:buChar char="•"/>
             </a:pPr>
-            <a:endParaRPr lang="nb-NO"/>
+            <a:endParaRPr lang="nb-NO" dirty="0"/>
           </a:p>
           <a:p>
             <a:pPr marL="171450" indent="-171450">
@@ -3648,15 +3672,15 @@
               <a:buChar char="•"/>
             </a:pPr>
             <a:r>
-              <a:rPr lang="nb-NO"/>
+              <a:rPr lang="nb-NO" dirty="0"/>
               <a:t>Sist men ikke minst så er tjenesten tilgjengelig.  Man har muligheten til å ha en kopi av dataen sin på et datasenter i </a:t>
             </a:r>
             <a:r>
-              <a:rPr lang="nb-NO" err="1"/>
+              <a:rPr lang="nb-NO" dirty="0" err="1"/>
               <a:t>samma</a:t>
             </a:r>
             <a:r>
-              <a:rPr lang="nb-NO"/>
+              <a:rPr lang="nb-NO" dirty="0"/>
               <a:t> region, eller på tvers av regioner osv. Dette er litt avhengig av virksomhetens krav til redundans av dataen.  Når man skal bestemme seg for hvilket redundansalternativ som er best, bør man vurdere avveiningen mellom lavere kostnader og høyere tilgjengelighet. </a:t>
             </a:r>
           </a:p>
@@ -3666,15 +3690,15 @@
               <a:buChar char="•"/>
             </a:pPr>
             <a:r>
-              <a:rPr lang="nb-NO"/>
+              <a:rPr lang="nb-NO" dirty="0"/>
               <a:t>Vi skal ikke gå så mye inn på detalj vedrørende redundans av dataen lagret i Storage </a:t>
             </a:r>
             <a:r>
-              <a:rPr lang="nb-NO" err="1"/>
+              <a:rPr lang="nb-NO" dirty="0" err="1"/>
               <a:t>accounten</a:t>
             </a:r>
             <a:r>
-              <a:rPr lang="nb-NO"/>
+              <a:rPr lang="nb-NO" dirty="0"/>
               <a:t>, men det er verdt å nevne at Microsoft har veldig god informasjon om dette, og hvilke avveiningen man bør ta på deres sider.</a:t>
             </a:r>
           </a:p>
@@ -3683,14 +3707,14 @@
               <a:buFont typeface="Arial" panose="020B0604020202020204" pitchFamily="34" charset="0"/>
               <a:buChar char="•"/>
             </a:pPr>
-            <a:endParaRPr lang="nb-NO"/>
+            <a:endParaRPr lang="nb-NO" dirty="0"/>
           </a:p>
           <a:p>
             <a:pPr marL="171450" indent="-171450">
               <a:buFont typeface="Arial" panose="020B0604020202020204" pitchFamily="34" charset="0"/>
               <a:buChar char="•"/>
             </a:pPr>
-            <a:endParaRPr lang="nb-NO"/>
+            <a:endParaRPr lang="nb-NO" dirty="0"/>
           </a:p>
           <a:p>
             <a:pPr marL="0" indent="0">
@@ -3698,42 +3722,42 @@
               <a:buNone/>
             </a:pPr>
             <a:r>
-              <a:rPr lang="nb-NO"/>
+              <a:rPr lang="nb-NO" dirty="0"/>
               <a:t>Det er en rekke </a:t>
             </a:r>
             <a:r>
-              <a:rPr lang="nb-NO" err="1"/>
+              <a:rPr lang="nb-NO" dirty="0" err="1"/>
               <a:t>API’er</a:t>
             </a:r>
             <a:r>
-              <a:rPr lang="nb-NO"/>
+              <a:rPr lang="nb-NO" dirty="0"/>
               <a:t> og </a:t>
             </a:r>
             <a:r>
-              <a:rPr lang="nb-NO" err="1"/>
+              <a:rPr lang="nb-NO" dirty="0" err="1"/>
               <a:t>SDK’er</a:t>
             </a:r>
             <a:r>
-              <a:rPr lang="nb-NO"/>
+              <a:rPr lang="nb-NO" dirty="0"/>
               <a:t> som gjør det mulig å lett koble til og kommunisere med Storage </a:t>
             </a:r>
             <a:r>
-              <a:rPr lang="nb-NO" err="1"/>
+              <a:rPr lang="nb-NO" dirty="0" err="1"/>
               <a:t>Accounten</a:t>
             </a:r>
             <a:r>
-              <a:rPr lang="nb-NO"/>
+              <a:rPr lang="nb-NO" dirty="0"/>
               <a:t>.</a:t>
             </a:r>
           </a:p>
           <a:p>
-            <a:endParaRPr lang="nb-NO"/>
-          </a:p>
-          <a:p>
-            <a:endParaRPr lang="nb-NO"/>
-          </a:p>
-          <a:p>
-            <a:endParaRPr lang="nb-NO"/>
+            <a:endParaRPr lang="nb-NO" dirty="0"/>
+          </a:p>
+          <a:p>
+            <a:endParaRPr lang="nb-NO" dirty="0"/>
+          </a:p>
+          <a:p>
+            <a:endParaRPr lang="nb-NO" dirty="0"/>
           </a:p>
         </p:txBody>
       </p:sp>
@@ -3818,48 +3842,48 @@
           <a:lstStyle/>
           <a:p>
             <a:r>
-              <a:rPr lang="nb-NO"/>
+              <a:rPr lang="nb-NO" dirty="0"/>
               <a:t>SAS-tokens: Key-</a:t>
             </a:r>
             <a:r>
-              <a:rPr lang="nb-NO" err="1"/>
+              <a:rPr lang="nb-NO" dirty="0" err="1"/>
               <a:t>Valet</a:t>
             </a:r>
             <a:r>
-              <a:rPr lang="nb-NO"/>
+              <a:rPr lang="nb-NO" dirty="0"/>
               <a:t> </a:t>
             </a:r>
             <a:r>
-              <a:rPr lang="nb-NO" err="1"/>
+              <a:rPr lang="nb-NO" dirty="0" err="1"/>
               <a:t>pattern</a:t>
             </a:r>
             <a:r>
-              <a:rPr lang="nb-NO"/>
+              <a:rPr lang="nb-NO" dirty="0"/>
               <a:t>, kan lages </a:t>
             </a:r>
             <a:r>
-              <a:rPr lang="nb-NO" err="1"/>
+              <a:rPr lang="nb-NO" dirty="0" err="1"/>
               <a:t>programatisk</a:t>
             </a:r>
             <a:r>
-              <a:rPr lang="nb-NO"/>
+              <a:rPr lang="nb-NO" dirty="0"/>
               <a:t> i </a:t>
             </a:r>
             <a:r>
-              <a:rPr lang="nb-NO" err="1"/>
+              <a:rPr lang="nb-NO" dirty="0" err="1"/>
               <a:t>APIer</a:t>
             </a:r>
-            <a:endParaRPr lang="nb-NO"/>
-          </a:p>
-          <a:p>
-            <a:endParaRPr lang="nb-NO"/>
-          </a:p>
-          <a:p>
-            <a:endParaRPr lang="nb-NO"/>
-          </a:p>
-          <a:p>
-            <a:r>
-              <a:rPr lang="nb-NO" b="0" i="0">
+            <a:endParaRPr lang="nb-NO" dirty="0"/>
+          </a:p>
+          <a:p>
+            <a:endParaRPr lang="nb-NO" dirty="0"/>
+          </a:p>
+          <a:p>
+            <a:endParaRPr lang="nb-NO" dirty="0"/>
+          </a:p>
+          <a:p>
+            <a:r>
+              <a:rPr lang="nb-NO" b="0" i="0" dirty="0">
                 <a:solidFill>
                   <a:srgbClr val="202124"/>
                 </a:solidFill>
@@ -3869,7 +3893,7 @@
               <a:t> </a:t>
             </a:r>
             <a:r>
-              <a:rPr lang="nb-NO" b="0" i="0" err="1">
+              <a:rPr lang="nb-NO" b="0" i="0" dirty="0" err="1">
                 <a:solidFill>
                   <a:srgbClr val="202124"/>
                 </a:solidFill>
@@ -3879,7 +3903,7 @@
               <a:t>Binary</a:t>
             </a:r>
             <a:r>
-              <a:rPr lang="nb-NO" b="0" i="0">
+              <a:rPr lang="nb-NO" b="0" i="0" dirty="0">
                 <a:solidFill>
                   <a:srgbClr val="202124"/>
                 </a:solidFill>
@@ -3889,7 +3913,7 @@
               <a:t> Large </a:t>
             </a:r>
             <a:r>
-              <a:rPr lang="nb-NO" b="0" i="0" err="1">
+              <a:rPr lang="nb-NO" b="0" i="0" dirty="0" err="1">
                 <a:solidFill>
                   <a:srgbClr val="202124"/>
                 </a:solidFill>
@@ -3899,7 +3923,7 @@
               <a:t>OBject</a:t>
             </a:r>
             <a:r>
-              <a:rPr lang="nb-NO" b="0" i="0">
+              <a:rPr lang="nb-NO" b="0" i="0" dirty="0">
                 <a:solidFill>
                   <a:srgbClr val="202124"/>
                 </a:solidFill>
@@ -3910,7 +3934,7 @@
             </a:r>
           </a:p>
           <a:p>
-            <a:endParaRPr lang="nb-NO" b="0" i="0">
+            <a:endParaRPr lang="nb-NO" b="0" i="0" dirty="0">
               <a:solidFill>
                 <a:srgbClr val="202124"/>
               </a:solidFill>
@@ -3919,11 +3943,11 @@
             </a:endParaRPr>
           </a:p>
           <a:p>
-            <a:endParaRPr lang="nb-NO"/>
-          </a:p>
-          <a:p>
-            <a:r>
-              <a:rPr lang="en-US" b="1" i="0">
+            <a:endParaRPr lang="nb-NO" dirty="0"/>
+          </a:p>
+          <a:p>
+            <a:r>
+              <a:rPr lang="en-US" b="1" i="0" dirty="0">
                 <a:solidFill>
                   <a:srgbClr val="202124"/>
                 </a:solidFill>
@@ -3933,7 +3957,7 @@
               <a:t>Azure Blob storage</a:t>
             </a:r>
             <a:r>
-              <a:rPr lang="en-US" b="0" i="0">
+              <a:rPr lang="en-US" b="0" i="0" dirty="0">
                 <a:solidFill>
                   <a:srgbClr val="202124"/>
                 </a:solidFill>
@@ -3945,7 +3969,7 @@
           </a:p>
           <a:p>
             <a:r>
-              <a:rPr lang="en-US" b="0" i="0" err="1">
+              <a:rPr lang="en-US" b="0" i="0" dirty="0" err="1">
                 <a:solidFill>
                   <a:srgbClr val="202124"/>
                 </a:solidFill>
@@ -3955,7 +3979,7 @@
               <a:t>Veldig</a:t>
             </a:r>
             <a:r>
-              <a:rPr lang="en-US" b="0" i="0">
+              <a:rPr lang="en-US" b="0" i="0" dirty="0">
                 <a:solidFill>
                   <a:srgbClr val="202124"/>
                 </a:solidFill>
@@ -3965,7 +3989,7 @@
               <a:t> </a:t>
             </a:r>
             <a:r>
-              <a:rPr lang="en-US" b="0" i="0" err="1">
+              <a:rPr lang="en-US" b="0" i="0" dirty="0" err="1">
                 <a:solidFill>
                   <a:srgbClr val="202124"/>
                 </a:solidFill>
@@ -3975,7 +3999,7 @@
               <a:t>typisk</a:t>
             </a:r>
             <a:r>
-              <a:rPr lang="en-US" b="0" i="0">
+              <a:rPr lang="en-US" b="0" i="0" dirty="0">
                 <a:solidFill>
                   <a:srgbClr val="202124"/>
                 </a:solidFill>
@@ -3985,7 +4009,7 @@
               <a:t> å </a:t>
             </a:r>
             <a:r>
-              <a:rPr lang="en-US" b="0" i="0" err="1">
+              <a:rPr lang="en-US" b="0" i="0" dirty="0" err="1">
                 <a:solidFill>
                   <a:srgbClr val="202124"/>
                 </a:solidFill>
@@ -3995,27 +4019,67 @@
               <a:t>bruke</a:t>
             </a:r>
             <a:r>
-              <a:rPr lang="en-US" b="0" i="0">
+              <a:rPr lang="en-US" b="0" i="0" dirty="0">
                 <a:solidFill>
                   <a:srgbClr val="202124"/>
                 </a:solidFill>
                 <a:effectLst/>
                 <a:latin typeface="arial" panose="020B0604020202020204" pitchFamily="34" charset="0"/>
               </a:rPr>
-              <a:t> for streaming av video </a:t>
-            </a:r>
-            <a:r>
-              <a:rPr lang="en-US" b="0" i="0" err="1">
+              <a:t> for streaming av video og </a:t>
+            </a:r>
+            <a:r>
+              <a:rPr lang="en-US" b="0" i="0" dirty="0" err="1">
                 <a:solidFill>
                   <a:srgbClr val="202124"/>
                 </a:solidFill>
                 <a:effectLst/>
                 <a:latin typeface="arial" panose="020B0604020202020204" pitchFamily="34" charset="0"/>
               </a:rPr>
-              <a:t>og</a:t>
-            </a:r>
-            <a:r>
-              <a:rPr lang="en-US" b="0" i="0">
+              <a:t>bilder</a:t>
+            </a:r>
+            <a:r>
+              <a:rPr lang="en-US" b="0" i="0" dirty="0">
+                <a:solidFill>
+                  <a:srgbClr val="202124"/>
+                </a:solidFill>
+                <a:effectLst/>
+                <a:latin typeface="arial" panose="020B0604020202020204" pitchFamily="34" charset="0"/>
+              </a:rPr>
+              <a:t>, og </a:t>
+            </a:r>
+            <a:r>
+              <a:rPr lang="en-US" b="0" i="0" dirty="0" err="1">
+                <a:solidFill>
+                  <a:srgbClr val="202124"/>
+                </a:solidFill>
+                <a:effectLst/>
+                <a:latin typeface="arial" panose="020B0604020202020204" pitchFamily="34" charset="0"/>
+              </a:rPr>
+              <a:t>andre</a:t>
+            </a:r>
+            <a:r>
+              <a:rPr lang="en-US" b="0" i="0" dirty="0">
+                <a:solidFill>
+                  <a:srgbClr val="202124"/>
+                </a:solidFill>
+                <a:effectLst/>
+                <a:latin typeface="arial" panose="020B0604020202020204" pitchFamily="34" charset="0"/>
+              </a:rPr>
+              <a:t> type documenter </a:t>
+            </a:r>
+            <a:r>
+              <a:rPr lang="en-US" b="0" i="0" dirty="0" err="1">
+                <a:solidFill>
+                  <a:srgbClr val="202124"/>
+                </a:solidFill>
+                <a:effectLst/>
+                <a:latin typeface="arial" panose="020B0604020202020204" pitchFamily="34" charset="0"/>
+              </a:rPr>
+              <a:t>i</a:t>
+            </a:r>
+            <a:r>
+              <a:rPr lang="en-US" b="0" i="0" dirty="0">
                 <a:solidFill>
                   <a:srgbClr val="202124"/>
                 </a:solidFill>
@@ -4025,37 +4089,17 @@
               <a:t> </a:t>
             </a:r>
             <a:r>
-              <a:rPr lang="en-US" b="0" i="0" err="1">
+              <a:rPr lang="en-US" b="0" i="0" dirty="0" err="1">
                 <a:solidFill>
                   <a:srgbClr val="202124"/>
                 </a:solidFill>
                 <a:effectLst/>
                 <a:latin typeface="arial" panose="020B0604020202020204" pitchFamily="34" charset="0"/>
               </a:rPr>
-              <a:t>bilder</a:t>
-            </a:r>
-            <a:r>
-              <a:rPr lang="en-US" b="0" i="0">
-                <a:solidFill>
-                  <a:srgbClr val="202124"/>
-                </a:solidFill>
-                <a:effectLst/>
-                <a:latin typeface="arial" panose="020B0604020202020204" pitchFamily="34" charset="0"/>
-              </a:rPr>
-              <a:t>, </a:t>
-            </a:r>
-            <a:r>
-              <a:rPr lang="en-US" b="0" i="0" err="1">
-                <a:solidFill>
-                  <a:srgbClr val="202124"/>
-                </a:solidFill>
-                <a:effectLst/>
-                <a:latin typeface="arial" panose="020B0604020202020204" pitchFamily="34" charset="0"/>
-              </a:rPr>
-              <a:t>og</a:t>
-            </a:r>
-            <a:r>
-              <a:rPr lang="en-US" b="0" i="0">
+              <a:t>en</a:t>
+            </a:r>
+            <a:r>
+              <a:rPr lang="en-US" b="0" i="0" dirty="0">
                 <a:solidFill>
                   <a:srgbClr val="202124"/>
                 </a:solidFill>
@@ -4065,37 +4109,17 @@
               <a:t> </a:t>
             </a:r>
             <a:r>
-              <a:rPr lang="en-US" b="0" i="0" err="1">
+              <a:rPr lang="en-US" b="0" i="0" dirty="0" err="1">
                 <a:solidFill>
                   <a:srgbClr val="202124"/>
                 </a:solidFill>
                 <a:effectLst/>
                 <a:latin typeface="arial" panose="020B0604020202020204" pitchFamily="34" charset="0"/>
               </a:rPr>
-              <a:t>andre</a:t>
-            </a:r>
-            <a:r>
-              <a:rPr lang="en-US" b="0" i="0">
-                <a:solidFill>
-                  <a:srgbClr val="202124"/>
-                </a:solidFill>
-                <a:effectLst/>
-                <a:latin typeface="arial" panose="020B0604020202020204" pitchFamily="34" charset="0"/>
-              </a:rPr>
-              <a:t> type documenter </a:t>
-            </a:r>
-            <a:r>
-              <a:rPr lang="en-US" b="0" i="0" err="1">
-                <a:solidFill>
-                  <a:srgbClr val="202124"/>
-                </a:solidFill>
-                <a:effectLst/>
-                <a:latin typeface="arial" panose="020B0604020202020204" pitchFamily="34" charset="0"/>
-              </a:rPr>
-              <a:t>i</a:t>
-            </a:r>
-            <a:r>
-              <a:rPr lang="en-US" b="0" i="0">
+              <a:t>nettside</a:t>
+            </a:r>
+            <a:r>
+              <a:rPr lang="en-US" b="0" i="0" dirty="0">
                 <a:solidFill>
                   <a:srgbClr val="202124"/>
                 </a:solidFill>
@@ -4105,47 +4129,7 @@
               <a:t> </a:t>
             </a:r>
             <a:r>
-              <a:rPr lang="en-US" b="0" i="0" err="1">
-                <a:solidFill>
-                  <a:srgbClr val="202124"/>
-                </a:solidFill>
-                <a:effectLst/>
-                <a:latin typeface="arial" panose="020B0604020202020204" pitchFamily="34" charset="0"/>
-              </a:rPr>
-              <a:t>en</a:t>
-            </a:r>
-            <a:r>
-              <a:rPr lang="en-US" b="0" i="0">
-                <a:solidFill>
-                  <a:srgbClr val="202124"/>
-                </a:solidFill>
-                <a:effectLst/>
-                <a:latin typeface="arial" panose="020B0604020202020204" pitchFamily="34" charset="0"/>
-              </a:rPr>
-              <a:t> </a:t>
-            </a:r>
-            <a:r>
-              <a:rPr lang="en-US" b="0" i="0" err="1">
-                <a:solidFill>
-                  <a:srgbClr val="202124"/>
-                </a:solidFill>
-                <a:effectLst/>
-                <a:latin typeface="arial" panose="020B0604020202020204" pitchFamily="34" charset="0"/>
-              </a:rPr>
-              <a:t>nettside</a:t>
-            </a:r>
-            <a:r>
-              <a:rPr lang="en-US" b="0" i="0">
-                <a:solidFill>
-                  <a:srgbClr val="202124"/>
-                </a:solidFill>
-                <a:effectLst/>
-                <a:latin typeface="arial" panose="020B0604020202020204" pitchFamily="34" charset="0"/>
-              </a:rPr>
-              <a:t> </a:t>
-            </a:r>
-            <a:r>
-              <a:rPr lang="en-US" b="0" i="0" err="1">
+              <a:rPr lang="en-US" b="0" i="0" dirty="0" err="1">
                 <a:solidFill>
                   <a:srgbClr val="202124"/>
                 </a:solidFill>
@@ -4155,7 +4139,7 @@
               <a:t>f.eks</a:t>
             </a:r>
             <a:r>
-              <a:rPr lang="en-US" b="0" i="0">
+              <a:rPr lang="en-US" b="0" i="0" dirty="0">
                 <a:solidFill>
                   <a:srgbClr val="202124"/>
                 </a:solidFill>
@@ -4166,7 +4150,7 @@
             </a:r>
           </a:p>
           <a:p>
-            <a:endParaRPr lang="en-US" b="0" i="0">
+            <a:endParaRPr lang="en-US" b="0" i="0" dirty="0">
               <a:solidFill>
                 <a:srgbClr val="202124"/>
               </a:solidFill>
@@ -4193,15 +4177,15 @@
               <a:defRPr/>
             </a:pPr>
             <a:r>
-              <a:rPr lang="nb-NO"/>
+              <a:rPr lang="nb-NO" dirty="0"/>
               <a:t>Virtuell katalogstruktur. Dvs. sånn som mappestrukturen på </a:t>
             </a:r>
             <a:r>
-              <a:rPr lang="nb-NO" err="1"/>
+              <a:rPr lang="nb-NO" dirty="0" err="1"/>
               <a:t>pcen</a:t>
             </a:r>
             <a:r>
-              <a:rPr lang="nb-NO"/>
+              <a:rPr lang="nb-NO" dirty="0"/>
               <a:t>.</a:t>
             </a:r>
           </a:p>
@@ -4223,18 +4207,18 @@
               <a:tabLst/>
               <a:defRPr/>
             </a:pPr>
-            <a:endParaRPr lang="nb-NO"/>
+            <a:endParaRPr lang="nb-NO" dirty="0"/>
           </a:p>
           <a:p>
             <a:pPr algn="l"/>
             <a:r>
-              <a:rPr lang="nb-NO"/>
+              <a:rPr lang="nb-NO" dirty="0"/>
               <a:t>Den har støtte for SAS tokens </a:t>
             </a:r>
           </a:p>
           <a:p>
             <a:pPr algn="l"/>
-            <a:endParaRPr lang="nb-NO" b="0" i="0">
+            <a:endParaRPr lang="nb-NO" b="0" i="0" dirty="0">
               <a:solidFill>
                 <a:srgbClr val="171717"/>
               </a:solidFill>
@@ -4244,7 +4228,7 @@
           </a:p>
           <a:p>
             <a:pPr algn="l"/>
-            <a:endParaRPr lang="nb-NO" b="0" i="0">
+            <a:endParaRPr lang="nb-NO" b="0" i="0" dirty="0">
               <a:solidFill>
                 <a:srgbClr val="171717"/>
               </a:solidFill>
@@ -4255,7 +4239,7 @@
           <a:p>
             <a:pPr algn="l"/>
             <a:r>
-              <a:rPr lang="en-US" b="0" i="0">
+              <a:rPr lang="en-US" b="0" i="0" dirty="0">
                 <a:solidFill>
                   <a:srgbClr val="171717"/>
                 </a:solidFill>
@@ -4271,7 +4255,7 @@
               <a:buChar char="•"/>
             </a:pPr>
             <a:r>
-              <a:rPr lang="en-US" b="0" i="0">
+              <a:rPr lang="en-US" b="0" i="0" dirty="0">
                 <a:solidFill>
                   <a:srgbClr val="171717"/>
                 </a:solidFill>
@@ -4287,7 +4271,7 @@
               <a:buChar char="•"/>
             </a:pPr>
             <a:r>
-              <a:rPr lang="en-US" b="0" i="0">
+              <a:rPr lang="en-US" b="0" i="0" dirty="0">
                 <a:solidFill>
                   <a:srgbClr val="171717"/>
                 </a:solidFill>
@@ -4303,7 +4287,7 @@
               <a:buChar char="•"/>
             </a:pPr>
             <a:r>
-              <a:rPr lang="en-US" b="0" i="0">
+              <a:rPr lang="en-US" b="0" i="0" dirty="0">
                 <a:solidFill>
                   <a:srgbClr val="171717"/>
                 </a:solidFill>
@@ -4331,7 +4315,7 @@
               <a:tabLst/>
               <a:defRPr/>
             </a:pPr>
-            <a:endParaRPr lang="nb-NO"/>
+            <a:endParaRPr lang="nb-NO" dirty="0"/>
           </a:p>
           <a:p>
             <a:pPr marL="0" marR="0" lvl="0" indent="0" algn="l" defTabSz="914400" rtl="0" eaLnBrk="1" fontAlgn="auto" latinLnBrk="0" hangingPunct="1">
@@ -4351,12 +4335,12 @@
               <a:tabLst/>
               <a:defRPr/>
             </a:pPr>
-            <a:endParaRPr lang="nb-NO"/>
+            <a:endParaRPr lang="nb-NO" dirty="0"/>
           </a:p>
           <a:p>
             <a:pPr algn="l"/>
             <a:r>
-              <a:rPr lang="en-US" b="0" i="0">
+              <a:rPr lang="en-US" b="0" i="0" dirty="0">
                 <a:solidFill>
                   <a:srgbClr val="171717"/>
                 </a:solidFill>
@@ -4372,7 +4356,7 @@
               <a:buChar char="•"/>
             </a:pPr>
             <a:r>
-              <a:rPr lang="en-US" b="1" i="0">
+              <a:rPr lang="en-US" b="1" i="0" dirty="0">
                 <a:solidFill>
                   <a:srgbClr val="171717"/>
                 </a:solidFill>
@@ -4382,7 +4366,7 @@
               <a:t>Block blobs</a:t>
             </a:r>
             <a:r>
-              <a:rPr lang="en-US" b="0" i="0">
+              <a:rPr lang="en-US" b="0" i="0" dirty="0">
                 <a:solidFill>
                   <a:srgbClr val="171717"/>
                 </a:solidFill>
@@ -4398,7 +4382,7 @@
               <a:buChar char="•"/>
             </a:pPr>
             <a:r>
-              <a:rPr lang="en-US" b="1" i="0">
+              <a:rPr lang="en-US" b="1" i="0" dirty="0">
                 <a:solidFill>
                   <a:srgbClr val="171717"/>
                 </a:solidFill>
@@ -4408,7 +4392,7 @@
               <a:t>Append blobs</a:t>
             </a:r>
             <a:r>
-              <a:rPr lang="en-US" b="0" i="0">
+              <a:rPr lang="en-US" b="0" i="0" dirty="0">
                 <a:solidFill>
                   <a:srgbClr val="171717"/>
                 </a:solidFill>
@@ -4424,7 +4408,7 @@
               <a:buChar char="•"/>
             </a:pPr>
             <a:r>
-              <a:rPr lang="en-US" b="1" i="0">
+              <a:rPr lang="en-US" b="1" i="0" dirty="0">
                 <a:solidFill>
                   <a:srgbClr val="171717"/>
                 </a:solidFill>
@@ -4434,7 +4418,7 @@
               <a:t>Page blobs</a:t>
             </a:r>
             <a:r>
-              <a:rPr lang="en-US" b="0" i="0">
+              <a:rPr lang="en-US" b="0" i="0" dirty="0">
                 <a:solidFill>
                   <a:srgbClr val="171717"/>
                 </a:solidFill>
@@ -4462,7 +4446,7 @@
               <a:tabLst/>
               <a:defRPr/>
             </a:pPr>
-            <a:endParaRPr lang="nb-NO"/>
+            <a:endParaRPr lang="nb-NO" dirty="0"/>
           </a:p>
           <a:p>
             <a:pPr marL="0" marR="0" lvl="0" indent="0" algn="l" defTabSz="914400" rtl="0" eaLnBrk="1" fontAlgn="auto" latinLnBrk="0" hangingPunct="1">
@@ -4482,7 +4466,7 @@
               <a:tabLst/>
               <a:defRPr/>
             </a:pPr>
-            <a:endParaRPr lang="nb-NO"/>
+            <a:endParaRPr lang="nb-NO" dirty="0"/>
           </a:p>
           <a:p>
             <a:pPr marL="0" marR="0" lvl="0" indent="0" algn="l" defTabSz="914400" rtl="0" eaLnBrk="1" fontAlgn="auto" latinLnBrk="0" hangingPunct="1">
@@ -4502,7 +4486,7 @@
               <a:tabLst/>
               <a:defRPr/>
             </a:pPr>
-            <a:endParaRPr lang="nb-NO"/>
+            <a:endParaRPr lang="nb-NO" dirty="0"/>
           </a:p>
         </p:txBody>
       </p:sp>
@@ -5482,320 +5466,304 @@
           <a:bodyPr/>
           <a:lstStyle/>
           <a:p>
-            <a:endParaRPr lang="en-US"/>
-          </a:p>
-          <a:p>
-            <a:r>
-              <a:rPr lang="en-US"/>
+            <a:endParaRPr lang="en-US" dirty="0"/>
+          </a:p>
+          <a:p>
+            <a:r>
+              <a:rPr lang="en-US" dirty="0"/>
               <a:t>Om du </a:t>
             </a:r>
             <a:r>
-              <a:rPr lang="en-US" err="1"/>
+              <a:rPr lang="en-US" dirty="0" err="1"/>
               <a:t>utvikler</a:t>
             </a:r>
             <a:r>
-              <a:rPr lang="en-US"/>
+              <a:rPr lang="en-US" dirty="0"/>
               <a:t> </a:t>
             </a:r>
             <a:r>
-              <a:rPr lang="en-US" err="1"/>
+              <a:rPr lang="en-US" dirty="0" err="1"/>
               <a:t>en</a:t>
             </a:r>
             <a:r>
-              <a:rPr lang="en-US"/>
+              <a:rPr lang="en-US" dirty="0"/>
               <a:t> </a:t>
             </a:r>
             <a:r>
-              <a:rPr lang="en-US" err="1"/>
+              <a:rPr lang="en-US" dirty="0" err="1"/>
               <a:t>applikasjon</a:t>
             </a:r>
             <a:r>
-              <a:rPr lang="en-US"/>
+              <a:rPr lang="en-US" dirty="0"/>
+              <a:t> og </a:t>
+            </a:r>
+            <a:r>
+              <a:rPr lang="en-US" dirty="0" err="1"/>
+              <a:t>trenger</a:t>
+            </a:r>
+            <a:r>
+              <a:rPr lang="en-US" dirty="0"/>
+              <a:t> å </a:t>
+            </a:r>
+            <a:r>
+              <a:rPr lang="en-US" dirty="0" err="1"/>
+              <a:t>håndtere</a:t>
+            </a:r>
+            <a:r>
+              <a:rPr lang="en-US" dirty="0"/>
               <a:t> </a:t>
             </a:r>
             <a:r>
-              <a:rPr lang="en-US" err="1"/>
-              <a:t>og</a:t>
-            </a:r>
-            <a:r>
-              <a:rPr lang="en-US"/>
+              <a:rPr lang="en-US" dirty="0" err="1"/>
+              <a:t>applikasjons-hemmeligheter</a:t>
+            </a:r>
+            <a:r>
+              <a:rPr lang="en-US" dirty="0"/>
               <a:t> </a:t>
             </a:r>
             <a:r>
-              <a:rPr lang="en-US" err="1"/>
-              <a:t>trenger</a:t>
-            </a:r>
-            <a:r>
-              <a:rPr lang="en-US"/>
+              <a:rPr lang="en-US" dirty="0" err="1"/>
+              <a:t>eller</a:t>
+            </a:r>
+            <a:r>
+              <a:rPr lang="en-US" dirty="0"/>
+              <a:t> </a:t>
+            </a:r>
+            <a:r>
+              <a:rPr lang="en-US" dirty="0" err="1"/>
+              <a:t>håndterer</a:t>
+            </a:r>
+            <a:r>
+              <a:rPr lang="en-US" dirty="0"/>
+              <a:t> </a:t>
+            </a:r>
+            <a:r>
+              <a:rPr lang="en-US" dirty="0" err="1"/>
+              <a:t>infrastruktur</a:t>
+            </a:r>
+            <a:r>
+              <a:rPr lang="en-US" dirty="0"/>
+              <a:t> og </a:t>
+            </a:r>
+            <a:r>
+              <a:rPr lang="en-US" dirty="0" err="1"/>
+              <a:t>har</a:t>
+            </a:r>
+            <a:r>
+              <a:rPr lang="en-US" dirty="0"/>
+              <a:t> </a:t>
+            </a:r>
+            <a:r>
+              <a:rPr lang="en-US" dirty="0" err="1"/>
+              <a:t>behover</a:t>
+            </a:r>
+            <a:r>
+              <a:rPr lang="en-US" dirty="0"/>
+              <a:t> for å </a:t>
+            </a:r>
+            <a:r>
+              <a:rPr lang="en-US" dirty="0" err="1"/>
+              <a:t>holde</a:t>
+            </a:r>
+            <a:r>
+              <a:rPr lang="en-US" dirty="0"/>
+              <a:t> </a:t>
+            </a:r>
+            <a:r>
+              <a:rPr lang="en-US" dirty="0" err="1"/>
+              <a:t>krypteringsnøkler</a:t>
+            </a:r>
+            <a:r>
+              <a:rPr lang="en-US" dirty="0"/>
+              <a:t> </a:t>
+            </a:r>
+            <a:r>
+              <a:rPr lang="en-US" dirty="0" err="1"/>
+              <a:t>hemmelig</a:t>
+            </a:r>
+            <a:r>
+              <a:rPr lang="en-US" dirty="0"/>
+              <a:t>, er Azure Key vault </a:t>
+            </a:r>
+            <a:r>
+              <a:rPr lang="en-US" dirty="0" err="1"/>
+              <a:t>en</a:t>
+            </a:r>
+            <a:r>
+              <a:rPr lang="en-US" dirty="0"/>
+              <a:t> god </a:t>
+            </a:r>
+            <a:r>
+              <a:rPr lang="en-US" dirty="0" err="1"/>
+              <a:t>løsning</a:t>
+            </a:r>
+            <a:r>
+              <a:rPr lang="en-US" dirty="0"/>
+              <a:t> for </a:t>
+            </a:r>
+            <a:r>
+              <a:rPr lang="en-US" dirty="0" err="1"/>
+              <a:t>dette</a:t>
+            </a:r>
+            <a:r>
+              <a:rPr lang="en-US" dirty="0"/>
+              <a:t>.</a:t>
+            </a:r>
+          </a:p>
+          <a:p>
+            <a:endParaRPr lang="en-US" dirty="0"/>
+          </a:p>
+          <a:p>
+            <a:endParaRPr lang="en-US" dirty="0"/>
+          </a:p>
+          <a:p>
+            <a:r>
+              <a:rPr lang="en-US" dirty="0" err="1"/>
+              <a:t>Hensikten</a:t>
+            </a:r>
+            <a:r>
+              <a:rPr lang="en-US" dirty="0"/>
+              <a:t> med </a:t>
+            </a:r>
+            <a:r>
+              <a:rPr lang="en-US" dirty="0" err="1"/>
+              <a:t>en</a:t>
+            </a:r>
+            <a:r>
+              <a:rPr lang="en-US" dirty="0"/>
+              <a:t> Azure Key vault er for å </a:t>
+            </a:r>
+            <a:r>
+              <a:rPr lang="en-US" dirty="0" err="1"/>
+              <a:t>hjelpe</a:t>
+            </a:r>
+            <a:r>
+              <a:rPr lang="en-US" dirty="0"/>
+              <a:t> </a:t>
+            </a:r>
+            <a:r>
+              <a:rPr lang="en-US" dirty="0" err="1"/>
+              <a:t>til</a:t>
+            </a:r>
+            <a:r>
+              <a:rPr lang="en-US" dirty="0"/>
+              <a:t> med to ting, det </a:t>
+            </a:r>
+            <a:r>
+              <a:rPr lang="en-US" dirty="0" err="1"/>
+              <a:t>ene</a:t>
+            </a:r>
+            <a:r>
+              <a:rPr lang="en-US" dirty="0"/>
+              <a:t> er </a:t>
+            </a:r>
+            <a:r>
+              <a:rPr lang="en-US" dirty="0" err="1"/>
+              <a:t>sentralisering</a:t>
+            </a:r>
+            <a:r>
+              <a:rPr lang="en-US" dirty="0"/>
+              <a:t> av </a:t>
+            </a:r>
+            <a:r>
+              <a:rPr lang="en-US" dirty="0" err="1"/>
+              <a:t>hemmeligheter</a:t>
+            </a:r>
+            <a:r>
+              <a:rPr lang="en-US" dirty="0"/>
+              <a:t> og </a:t>
+            </a:r>
+            <a:r>
+              <a:rPr lang="en-US" dirty="0" err="1"/>
+              <a:t>beskyttelse</a:t>
+            </a:r>
+            <a:r>
+              <a:rPr lang="en-US" dirty="0"/>
+              <a:t> av </a:t>
+            </a:r>
+            <a:r>
+              <a:rPr lang="en-US" dirty="0" err="1"/>
+              <a:t>kryperingsnøkler</a:t>
+            </a:r>
+            <a:r>
+              <a:rPr lang="en-US" dirty="0"/>
+              <a:t>, </a:t>
+            </a:r>
+            <a:r>
+              <a:rPr lang="en-US" dirty="0" err="1"/>
+              <a:t>sertifikater</a:t>
+            </a:r>
+            <a:r>
+              <a:rPr lang="en-US" dirty="0"/>
+              <a:t> </a:t>
+            </a:r>
+            <a:r>
+              <a:rPr lang="en-US" dirty="0" err="1"/>
+              <a:t>osv</a:t>
+            </a:r>
+            <a:r>
+              <a:rPr lang="en-US" dirty="0"/>
+              <a:t>. </a:t>
+            </a:r>
+          </a:p>
+          <a:p>
+            <a:endParaRPr lang="en-US" dirty="0"/>
+          </a:p>
+          <a:p>
+            <a:endParaRPr lang="en-US" dirty="0"/>
+          </a:p>
+          <a:p>
+            <a:r>
+              <a:rPr lang="en-US" dirty="0" err="1"/>
+              <a:t>Noen</a:t>
+            </a:r>
+            <a:r>
+              <a:rPr lang="en-US" dirty="0"/>
+              <a:t> av </a:t>
+            </a:r>
+            <a:r>
+              <a:rPr lang="en-US" dirty="0" err="1"/>
+              <a:t>nøkkelfunksjonalitetene</a:t>
+            </a:r>
+            <a:r>
+              <a:rPr lang="en-US" dirty="0"/>
+              <a:t> </a:t>
+            </a:r>
+            <a:r>
+              <a:rPr lang="en-US" dirty="0" err="1"/>
+              <a:t>til</a:t>
+            </a:r>
+            <a:r>
+              <a:rPr lang="en-US" dirty="0"/>
+              <a:t> Azure Key Vault </a:t>
+            </a:r>
+            <a:r>
+              <a:rPr lang="en-US" dirty="0" err="1"/>
+              <a:t>som</a:t>
+            </a:r>
+            <a:r>
+              <a:rPr lang="en-US" dirty="0"/>
+              <a:t> er </a:t>
+            </a:r>
+            <a:r>
+              <a:rPr lang="en-US" dirty="0" err="1"/>
+              <a:t>verdt</a:t>
+            </a:r>
+            <a:r>
+              <a:rPr lang="en-US" dirty="0"/>
               <a:t> å </a:t>
             </a:r>
             <a:r>
-              <a:rPr lang="en-US" err="1"/>
-              <a:t>håndtere</a:t>
-            </a:r>
-            <a:r>
-              <a:rPr lang="en-US"/>
-              <a:t> </a:t>
-            </a:r>
-            <a:r>
-              <a:rPr lang="en-US" err="1"/>
-              <a:t>applikasjons-hemmeligheter</a:t>
-            </a:r>
-            <a:r>
-              <a:rPr lang="en-US"/>
-              <a:t> </a:t>
-            </a:r>
-            <a:r>
-              <a:rPr lang="en-US" err="1"/>
-              <a:t>eller</a:t>
-            </a:r>
-            <a:r>
-              <a:rPr lang="en-US"/>
-              <a:t> </a:t>
-            </a:r>
-            <a:r>
-              <a:rPr lang="en-US" err="1"/>
-              <a:t>håndterer</a:t>
-            </a:r>
-            <a:r>
-              <a:rPr lang="en-US"/>
-              <a:t> </a:t>
-            </a:r>
-            <a:r>
-              <a:rPr lang="en-US" err="1"/>
-              <a:t>infrastruktur</a:t>
-            </a:r>
-            <a:r>
-              <a:rPr lang="en-US"/>
-              <a:t> </a:t>
-            </a:r>
-            <a:r>
-              <a:rPr lang="en-US" err="1"/>
-              <a:t>og</a:t>
-            </a:r>
-            <a:r>
-              <a:rPr lang="en-US"/>
-              <a:t> har </a:t>
-            </a:r>
-            <a:r>
-              <a:rPr lang="en-US" err="1"/>
-              <a:t>behover</a:t>
-            </a:r>
-            <a:r>
-              <a:rPr lang="en-US"/>
-              <a:t> for å </a:t>
-            </a:r>
-            <a:r>
-              <a:rPr lang="en-US" err="1"/>
-              <a:t>holde</a:t>
-            </a:r>
-            <a:r>
-              <a:rPr lang="en-US"/>
-              <a:t> </a:t>
-            </a:r>
-            <a:r>
-              <a:rPr lang="en-US" err="1"/>
-              <a:t>krypteringsnøkler</a:t>
-            </a:r>
-            <a:r>
-              <a:rPr lang="en-US"/>
-              <a:t> </a:t>
-            </a:r>
-            <a:r>
-              <a:rPr lang="en-US" err="1"/>
-              <a:t>hemmelig</a:t>
-            </a:r>
-            <a:r>
-              <a:rPr lang="en-US"/>
-              <a:t>, er Azure Key vault </a:t>
-            </a:r>
-            <a:r>
-              <a:rPr lang="en-US" err="1"/>
-              <a:t>en</a:t>
-            </a:r>
-            <a:r>
-              <a:rPr lang="en-US"/>
-              <a:t> god </a:t>
-            </a:r>
-            <a:r>
-              <a:rPr lang="en-US" err="1"/>
-              <a:t>løsning</a:t>
-            </a:r>
-            <a:r>
-              <a:rPr lang="en-US"/>
-              <a:t> for </a:t>
-            </a:r>
-            <a:r>
-              <a:rPr lang="en-US" err="1"/>
-              <a:t>dette</a:t>
-            </a:r>
-            <a:r>
-              <a:rPr lang="en-US"/>
-              <a:t>.</a:t>
-            </a:r>
-          </a:p>
-          <a:p>
-            <a:endParaRPr lang="en-US"/>
-          </a:p>
-          <a:p>
-            <a:endParaRPr lang="en-US"/>
-          </a:p>
-          <a:p>
-            <a:r>
-              <a:rPr lang="en-US" err="1"/>
-              <a:t>Hensikten</a:t>
-            </a:r>
-            <a:r>
-              <a:rPr lang="en-US"/>
-              <a:t> med </a:t>
-            </a:r>
-            <a:r>
-              <a:rPr lang="en-US" err="1"/>
-              <a:t>en</a:t>
-            </a:r>
-            <a:r>
-              <a:rPr lang="en-US"/>
-              <a:t> Azure Key vault er for å </a:t>
-            </a:r>
-            <a:r>
-              <a:rPr lang="en-US" err="1"/>
-              <a:t>hjelpe</a:t>
-            </a:r>
-            <a:r>
-              <a:rPr lang="en-US"/>
-              <a:t> </a:t>
-            </a:r>
-            <a:r>
-              <a:rPr lang="en-US" err="1"/>
-              <a:t>til</a:t>
-            </a:r>
-            <a:r>
-              <a:rPr lang="en-US"/>
-              <a:t> med to ting, det </a:t>
-            </a:r>
-            <a:r>
-              <a:rPr lang="en-US" err="1"/>
-              <a:t>ene</a:t>
-            </a:r>
-            <a:r>
-              <a:rPr lang="en-US"/>
+              <a:rPr lang="en-US" dirty="0" err="1"/>
+              <a:t>nevne</a:t>
+            </a:r>
+            <a:r>
+              <a:rPr lang="en-US" dirty="0"/>
               <a:t> er </a:t>
             </a:r>
-            <a:r>
-              <a:rPr lang="en-US" err="1"/>
-              <a:t>sentralisering</a:t>
-            </a:r>
-            <a:r>
-              <a:rPr lang="en-US"/>
-              <a:t> av </a:t>
-            </a:r>
-            <a:r>
-              <a:rPr lang="en-US" err="1"/>
-              <a:t>hemmeligheter</a:t>
-            </a:r>
-            <a:r>
-              <a:rPr lang="en-US"/>
-              <a:t> </a:t>
-            </a:r>
-            <a:r>
-              <a:rPr lang="en-US" err="1"/>
-              <a:t>og</a:t>
-            </a:r>
-            <a:r>
-              <a:rPr lang="en-US"/>
-              <a:t> </a:t>
-            </a:r>
-            <a:r>
-              <a:rPr lang="en-US" err="1"/>
-              <a:t>beskyttelse</a:t>
-            </a:r>
-            <a:r>
-              <a:rPr lang="en-US"/>
-              <a:t> av </a:t>
-            </a:r>
-            <a:r>
-              <a:rPr lang="en-US" err="1"/>
-              <a:t>kryperingsnøkler</a:t>
-            </a:r>
-            <a:r>
-              <a:rPr lang="en-US"/>
-              <a:t>, </a:t>
-            </a:r>
-            <a:r>
-              <a:rPr lang="en-US" err="1"/>
-              <a:t>sertifikater</a:t>
-            </a:r>
-            <a:r>
-              <a:rPr lang="en-US"/>
-              <a:t> </a:t>
-            </a:r>
-            <a:r>
-              <a:rPr lang="en-US" err="1"/>
-              <a:t>osv</a:t>
-            </a:r>
-            <a:r>
-              <a:rPr lang="en-US"/>
-              <a:t>. </a:t>
-            </a:r>
-          </a:p>
-          <a:p>
-            <a:endParaRPr lang="en-US"/>
-          </a:p>
-          <a:p>
-            <a:endParaRPr lang="en-US"/>
-          </a:p>
-          <a:p>
-            <a:r>
-              <a:rPr lang="en-US" err="1"/>
-              <a:t>Noen</a:t>
-            </a:r>
-            <a:r>
-              <a:rPr lang="en-US"/>
-              <a:t> av </a:t>
-            </a:r>
-            <a:r>
-              <a:rPr lang="en-US" err="1"/>
-              <a:t>nøkkelfunksjonalitetene</a:t>
-            </a:r>
-            <a:r>
-              <a:rPr lang="en-US"/>
-              <a:t> </a:t>
-            </a:r>
-            <a:r>
-              <a:rPr lang="en-US" err="1"/>
-              <a:t>til</a:t>
-            </a:r>
-            <a:r>
-              <a:rPr lang="en-US"/>
-              <a:t> Azure Key Vault </a:t>
-            </a:r>
-            <a:r>
-              <a:rPr lang="en-US" err="1"/>
-              <a:t>som</a:t>
-            </a:r>
-            <a:r>
-              <a:rPr lang="en-US"/>
-              <a:t> er </a:t>
-            </a:r>
-            <a:r>
-              <a:rPr lang="en-US" err="1"/>
-              <a:t>verdt</a:t>
-            </a:r>
-            <a:r>
-              <a:rPr lang="en-US"/>
-              <a:t> å </a:t>
-            </a:r>
-            <a:r>
-              <a:rPr lang="en-US" err="1"/>
-              <a:t>nevne</a:t>
-            </a:r>
-            <a:r>
-              <a:rPr lang="en-US"/>
-              <a:t> er </a:t>
-            </a:r>
-          </a:p>
-          <a:p>
-            <a:endParaRPr lang="en-US"/>
+          </a:p>
+          <a:p>
+            <a:endParaRPr lang="en-US" dirty="0"/>
           </a:p>
           <a:p>
             <a:pPr marL="171450" indent="-171450">
@@ -5803,66 +5771,66 @@
               <a:buChar char="•"/>
             </a:pPr>
             <a:r>
-              <a:rPr lang="en-US" err="1"/>
+              <a:rPr lang="en-US" dirty="0" err="1"/>
               <a:t>Brannmur</a:t>
             </a:r>
             <a:r>
-              <a:rPr lang="en-US"/>
+              <a:rPr lang="en-US" dirty="0"/>
               <a:t>, </a:t>
             </a:r>
             <a:r>
-              <a:rPr lang="en-US" err="1"/>
+              <a:rPr lang="en-US" dirty="0" err="1"/>
               <a:t>som</a:t>
             </a:r>
             <a:r>
-              <a:rPr lang="en-US"/>
+              <a:rPr lang="en-US" dirty="0"/>
               <a:t> </a:t>
             </a:r>
             <a:r>
-              <a:rPr lang="en-US" err="1"/>
+              <a:rPr lang="en-US" dirty="0" err="1"/>
               <a:t>gjør</a:t>
             </a:r>
             <a:r>
-              <a:rPr lang="en-US"/>
+              <a:rPr lang="en-US" dirty="0"/>
               <a:t> det </a:t>
             </a:r>
             <a:r>
-              <a:rPr lang="en-US" err="1"/>
+              <a:rPr lang="en-US" dirty="0" err="1"/>
               <a:t>mulig</a:t>
             </a:r>
             <a:r>
-              <a:rPr lang="en-US"/>
+              <a:rPr lang="en-US" dirty="0"/>
               <a:t> å </a:t>
             </a:r>
             <a:r>
-              <a:rPr lang="en-US" err="1"/>
+              <a:rPr lang="en-US" dirty="0" err="1"/>
               <a:t>kreve</a:t>
             </a:r>
             <a:r>
-              <a:rPr lang="en-US"/>
+              <a:rPr lang="en-US" dirty="0"/>
               <a:t> </a:t>
             </a:r>
             <a:r>
-              <a:rPr lang="en-US" err="1"/>
+              <a:rPr lang="en-US" dirty="0" err="1"/>
               <a:t>autorisert</a:t>
             </a:r>
             <a:r>
-              <a:rPr lang="en-US"/>
+              <a:rPr lang="en-US" dirty="0"/>
               <a:t> </a:t>
             </a:r>
             <a:r>
-              <a:rPr lang="en-US" err="1"/>
+              <a:rPr lang="en-US" dirty="0" err="1"/>
               <a:t>tilgang</a:t>
             </a:r>
             <a:r>
-              <a:rPr lang="en-US"/>
+              <a:rPr lang="en-US" dirty="0"/>
               <a:t> via </a:t>
             </a:r>
             <a:r>
-              <a:rPr lang="en-US" err="1"/>
+              <a:rPr lang="en-US" dirty="0" err="1"/>
               <a:t>nettverkskonfigurasjon</a:t>
             </a:r>
-            <a:endParaRPr lang="en-US"/>
+            <a:endParaRPr lang="en-US" dirty="0"/>
           </a:p>
           <a:p>
             <a:pPr marL="171450" indent="-171450">
@@ -5870,127 +5838,127 @@
               <a:buChar char="•"/>
             </a:pPr>
             <a:r>
-              <a:rPr lang="en-US"/>
+              <a:rPr lang="en-US" dirty="0"/>
               <a:t>Auditing for </a:t>
             </a:r>
             <a:r>
-              <a:rPr lang="en-US" err="1"/>
+              <a:rPr lang="en-US" dirty="0" err="1"/>
               <a:t>tilgang</a:t>
             </a:r>
             <a:r>
-              <a:rPr lang="en-US"/>
+              <a:rPr lang="en-US" dirty="0"/>
               <a:t>, </a:t>
             </a:r>
             <a:r>
-              <a:rPr lang="en-US" err="1"/>
+              <a:rPr lang="en-US" dirty="0" err="1"/>
               <a:t>altså</a:t>
             </a:r>
             <a:r>
-              <a:rPr lang="en-US"/>
+              <a:rPr lang="en-US" dirty="0"/>
               <a:t> </a:t>
             </a:r>
             <a:r>
-              <a:rPr lang="en-US" err="1"/>
+              <a:rPr lang="en-US" dirty="0" err="1"/>
               <a:t>en</a:t>
             </a:r>
             <a:r>
-              <a:rPr lang="en-US"/>
+              <a:rPr lang="en-US" dirty="0"/>
               <a:t> log av </a:t>
             </a:r>
             <a:r>
-              <a:rPr lang="en-US" err="1"/>
+              <a:rPr lang="en-US" dirty="0" err="1"/>
               <a:t>hvilke</a:t>
             </a:r>
             <a:r>
-              <a:rPr lang="en-US"/>
+              <a:rPr lang="en-US" dirty="0"/>
               <a:t> </a:t>
             </a:r>
             <a:r>
-              <a:rPr lang="en-US" err="1"/>
+              <a:rPr lang="en-US" dirty="0" err="1"/>
               <a:t>nøkler</a:t>
             </a:r>
             <a:r>
-              <a:rPr lang="en-US"/>
+              <a:rPr lang="en-US" dirty="0"/>
+              <a:t> og </a:t>
+            </a:r>
+            <a:r>
+              <a:rPr lang="en-US" dirty="0" err="1"/>
+              <a:t>hvem</a:t>
+            </a:r>
+            <a:r>
+              <a:rPr lang="en-US" dirty="0"/>
               <a:t> </a:t>
             </a:r>
             <a:r>
-              <a:rPr lang="en-US" err="1"/>
-              <a:t>og</a:t>
-            </a:r>
-            <a:r>
-              <a:rPr lang="en-US"/>
+              <a:rPr lang="en-US" dirty="0" err="1"/>
+              <a:t>som</a:t>
+            </a:r>
+            <a:r>
+              <a:rPr lang="en-US" dirty="0"/>
               <a:t> </a:t>
             </a:r>
             <a:r>
-              <a:rPr lang="en-US" err="1"/>
-              <a:t>hvem</a:t>
-            </a:r>
-            <a:r>
-              <a:rPr lang="en-US"/>
+              <a:rPr lang="en-US" dirty="0" err="1"/>
+              <a:t>har</a:t>
+            </a:r>
+            <a:r>
+              <a:rPr lang="en-US" dirty="0"/>
+              <a:t> Hentet </a:t>
+            </a:r>
+            <a:r>
+              <a:rPr lang="en-US" dirty="0" err="1"/>
+              <a:t>ut</a:t>
+            </a:r>
+            <a:r>
+              <a:rPr lang="en-US" dirty="0"/>
               <a:t> </a:t>
             </a:r>
             <a:r>
-              <a:rPr lang="en-US" err="1"/>
-              <a:t>som</a:t>
-            </a:r>
-            <a:r>
-              <a:rPr lang="en-US"/>
-              <a:t> har Hentet </a:t>
-            </a:r>
-            <a:r>
-              <a:rPr lang="en-US" err="1"/>
-              <a:t>ut</a:t>
-            </a:r>
-            <a:r>
-              <a:rPr lang="en-US"/>
+              <a:rPr lang="en-US" dirty="0" err="1"/>
+              <a:t>disse</a:t>
+            </a:r>
+            <a:r>
+              <a:rPr lang="en-US" dirty="0"/>
               <a:t> </a:t>
             </a:r>
             <a:r>
-              <a:rPr lang="en-US" err="1"/>
-              <a:t>disse</a:t>
-            </a:r>
-            <a:r>
-              <a:rPr lang="en-US"/>
+              <a:rPr lang="en-US" dirty="0" err="1"/>
+              <a:t>nøklene</a:t>
+            </a:r>
+            <a:r>
+              <a:rPr lang="en-US" dirty="0"/>
               <a:t> </a:t>
             </a:r>
             <a:r>
-              <a:rPr lang="en-US" err="1"/>
-              <a:t>nøklene</a:t>
-            </a:r>
-            <a:r>
-              <a:rPr lang="en-US"/>
+              <a:rPr lang="en-US" dirty="0" err="1"/>
+              <a:t>eller</a:t>
+            </a:r>
+            <a:r>
+              <a:rPr lang="en-US" dirty="0"/>
               <a:t> </a:t>
             </a:r>
             <a:r>
-              <a:rPr lang="en-US" err="1"/>
-              <a:t>eller</a:t>
-            </a:r>
-            <a:r>
-              <a:rPr lang="en-US"/>
+              <a:rPr lang="en-US" dirty="0" err="1"/>
+              <a:t>gjort</a:t>
+            </a:r>
+            <a:r>
+              <a:rPr lang="en-US" dirty="0"/>
               <a:t> </a:t>
             </a:r>
             <a:r>
-              <a:rPr lang="en-US" err="1"/>
-              <a:t>gjort</a:t>
-            </a:r>
-            <a:r>
-              <a:rPr lang="en-US"/>
-              <a:t> </a:t>
-            </a:r>
-            <a:r>
-              <a:rPr lang="en-US" err="1"/>
+              <a:rPr lang="en-US" dirty="0" err="1"/>
               <a:t>noe</a:t>
             </a:r>
             <a:r>
-              <a:rPr lang="en-US"/>
+              <a:rPr lang="en-US" dirty="0"/>
               <a:t> med </a:t>
             </a:r>
             <a:r>
-              <a:rPr lang="en-US" err="1"/>
+              <a:rPr lang="en-US" dirty="0" err="1"/>
               <a:t>nøkkelen</a:t>
             </a:r>
             <a:r>
-              <a:rPr lang="en-US"/>
+              <a:rPr lang="en-US" dirty="0"/>
               <a:t>.</a:t>
             </a:r>
           </a:p>
@@ -6000,71 +5968,71 @@
               <a:buChar char="•"/>
             </a:pPr>
             <a:r>
-              <a:rPr lang="en-US"/>
+              <a:rPr lang="en-US" dirty="0"/>
               <a:t>AAD </a:t>
             </a:r>
             <a:r>
-              <a:rPr lang="en-US" err="1"/>
+              <a:rPr lang="en-US" dirty="0" err="1"/>
               <a:t>Integrasjon</a:t>
             </a:r>
             <a:r>
-              <a:rPr lang="en-US"/>
+              <a:rPr lang="en-US" dirty="0"/>
               <a:t>, </a:t>
             </a:r>
             <a:r>
-              <a:rPr lang="en-US" err="1"/>
+              <a:rPr lang="en-US" dirty="0" err="1"/>
               <a:t>som</a:t>
             </a:r>
             <a:r>
-              <a:rPr lang="en-US"/>
+              <a:rPr lang="en-US" dirty="0"/>
               <a:t> </a:t>
             </a:r>
             <a:r>
-              <a:rPr lang="en-US" err="1"/>
+              <a:rPr lang="en-US" dirty="0" err="1"/>
               <a:t>gjør</a:t>
             </a:r>
             <a:r>
-              <a:rPr lang="en-US"/>
+              <a:rPr lang="en-US" dirty="0"/>
               <a:t> det </a:t>
             </a:r>
             <a:r>
-              <a:rPr lang="en-US" err="1"/>
+              <a:rPr lang="en-US" dirty="0" err="1"/>
               <a:t>lett</a:t>
             </a:r>
             <a:r>
-              <a:rPr lang="en-US"/>
+              <a:rPr lang="en-US" dirty="0"/>
               <a:t> å </a:t>
             </a:r>
             <a:r>
-              <a:rPr lang="en-US" err="1"/>
+              <a:rPr lang="en-US" dirty="0" err="1"/>
               <a:t>tildele</a:t>
             </a:r>
             <a:r>
-              <a:rPr lang="en-US"/>
+              <a:rPr lang="en-US" dirty="0"/>
               <a:t> </a:t>
             </a:r>
             <a:r>
-              <a:rPr lang="en-US" err="1"/>
+              <a:rPr lang="en-US" dirty="0" err="1"/>
               <a:t>hemmeligheter</a:t>
             </a:r>
             <a:r>
-              <a:rPr lang="en-US"/>
+              <a:rPr lang="en-US" dirty="0"/>
               <a:t> </a:t>
             </a:r>
             <a:r>
-              <a:rPr lang="en-US" err="1"/>
+              <a:rPr lang="en-US" dirty="0" err="1"/>
               <a:t>til</a:t>
             </a:r>
             <a:r>
-              <a:rPr lang="en-US"/>
+              <a:rPr lang="en-US" dirty="0"/>
               <a:t> </a:t>
             </a:r>
             <a:r>
-              <a:rPr lang="en-US" err="1"/>
+              <a:rPr lang="en-US" dirty="0" err="1"/>
               <a:t>brukere</a:t>
             </a:r>
             <a:r>
-              <a:rPr lang="en-US"/>
+              <a:rPr lang="en-US" dirty="0"/>
               <a:t> I AD</a:t>
             </a:r>
           </a:p>
@@ -6074,460 +6042,452 @@
               <a:buChar char="•"/>
             </a:pPr>
             <a:r>
-              <a:rPr lang="en-US" err="1"/>
+              <a:rPr lang="en-US" dirty="0" err="1"/>
               <a:t>Replikering</a:t>
             </a:r>
             <a:r>
-              <a:rPr lang="en-US"/>
+              <a:rPr lang="en-US" dirty="0"/>
+              <a:t> og </a:t>
+            </a:r>
+            <a:r>
+              <a:rPr lang="en-US" dirty="0" err="1"/>
+              <a:t>dynamisk</a:t>
+            </a:r>
+            <a:r>
+              <a:rPr lang="en-US" dirty="0"/>
               <a:t> </a:t>
             </a:r>
             <a:r>
-              <a:rPr lang="en-US" err="1"/>
-              <a:t>og</a:t>
-            </a:r>
-            <a:r>
-              <a:rPr lang="en-US"/>
+              <a:rPr lang="en-US" dirty="0" err="1"/>
+              <a:t>skaleringsom</a:t>
+            </a:r>
+            <a:r>
+              <a:rPr lang="en-US" dirty="0"/>
               <a:t> </a:t>
             </a:r>
             <a:r>
-              <a:rPr lang="en-US" err="1"/>
-              <a:t>dynamisk</a:t>
-            </a:r>
-            <a:r>
-              <a:rPr lang="en-US"/>
+              <a:rPr lang="en-US" dirty="0" err="1"/>
+              <a:t>gjør</a:t>
+            </a:r>
+            <a:r>
+              <a:rPr lang="en-US" dirty="0"/>
               <a:t> </a:t>
             </a:r>
-            <a:r>
-              <a:rPr lang="en-US" err="1"/>
-              <a:t>skaleringsom</a:t>
-            </a:r>
-            <a:r>
-              <a:rPr lang="en-US"/>
+          </a:p>
+          <a:p>
+            <a:endParaRPr lang="en-US" dirty="0"/>
+          </a:p>
+          <a:p>
+            <a:endParaRPr lang="en-US" dirty="0"/>
+          </a:p>
+          <a:p>
+            <a:endParaRPr lang="en-US" dirty="0"/>
+          </a:p>
+          <a:p>
+            <a:endParaRPr lang="en-US" dirty="0"/>
+          </a:p>
+          <a:p>
+            <a:r>
+              <a:rPr lang="en-US" dirty="0"/>
+              <a:t>Et scenario: </a:t>
+            </a:r>
+          </a:p>
+          <a:p>
+            <a:r>
+              <a:rPr lang="en-US" dirty="0" err="1"/>
+              <a:t>Vanligvis</a:t>
+            </a:r>
+            <a:r>
+              <a:rPr lang="en-US" dirty="0"/>
+              <a:t> I </a:t>
+            </a:r>
+            <a:r>
+              <a:rPr lang="en-US" dirty="0" err="1"/>
+              <a:t>en</a:t>
+            </a:r>
+            <a:r>
+              <a:rPr lang="en-US" dirty="0"/>
+              <a:t> web </a:t>
+            </a:r>
+            <a:r>
+              <a:rPr lang="en-US" dirty="0" err="1"/>
+              <a:t>applikasjon</a:t>
+            </a:r>
+            <a:r>
+              <a:rPr lang="en-US" dirty="0"/>
               <a:t> </a:t>
             </a:r>
             <a:r>
-              <a:rPr lang="en-US" err="1"/>
-              <a:t>gjør</a:t>
-            </a:r>
-            <a:r>
-              <a:rPr lang="en-US"/>
+              <a:rPr lang="en-US" dirty="0" err="1"/>
+              <a:t>kobler</a:t>
+            </a:r>
+            <a:r>
+              <a:rPr lang="en-US" dirty="0"/>
+              <a:t> man seg </a:t>
+            </a:r>
+            <a:r>
+              <a:rPr lang="en-US" dirty="0" err="1"/>
+              <a:t>til</a:t>
+            </a:r>
+            <a:r>
+              <a:rPr lang="en-US" dirty="0"/>
               <a:t> </a:t>
             </a:r>
-          </a:p>
-          <a:p>
-            <a:endParaRPr lang="en-US"/>
-          </a:p>
-          <a:p>
-            <a:endParaRPr lang="en-US"/>
-          </a:p>
-          <a:p>
-            <a:endParaRPr lang="en-US"/>
-          </a:p>
-          <a:p>
-            <a:endParaRPr lang="en-US"/>
-          </a:p>
-          <a:p>
-            <a:r>
-              <a:rPr lang="en-US"/>
-              <a:t>Et scenario: </a:t>
-            </a:r>
-          </a:p>
-          <a:p>
-            <a:r>
-              <a:rPr lang="en-US" err="1"/>
-              <a:t>Vanligvis</a:t>
-            </a:r>
-            <a:r>
-              <a:rPr lang="en-US"/>
+            <a:r>
+              <a:rPr lang="en-US" dirty="0" err="1"/>
+              <a:t>en</a:t>
+            </a:r>
+            <a:r>
+              <a:rPr lang="en-US" dirty="0"/>
+              <a:t> SQL database </a:t>
+            </a:r>
+            <a:r>
+              <a:rPr lang="en-US" dirty="0" err="1"/>
+              <a:t>ved</a:t>
+            </a:r>
+            <a:r>
+              <a:rPr lang="en-US" dirty="0"/>
+              <a:t> bruk av </a:t>
+            </a:r>
+            <a:r>
+              <a:rPr lang="en-US" dirty="0" err="1"/>
+              <a:t>en</a:t>
+            </a:r>
+            <a:r>
+              <a:rPr lang="en-US" dirty="0"/>
+              <a:t> connection string. I </a:t>
+            </a:r>
+            <a:r>
+              <a:rPr lang="en-US" dirty="0" err="1"/>
+              <a:t>f.eks</a:t>
+            </a:r>
+            <a:r>
+              <a:rPr lang="en-US" dirty="0"/>
+              <a:t> et C# </a:t>
+            </a:r>
+            <a:r>
+              <a:rPr lang="en-US" dirty="0" err="1"/>
+              <a:t>webapplikasjons</a:t>
+            </a:r>
+            <a:r>
+              <a:rPr lang="en-US" dirty="0"/>
+              <a:t> </a:t>
+            </a:r>
+            <a:r>
+              <a:rPr lang="en-US" dirty="0" err="1"/>
+              <a:t>prosjekt</a:t>
+            </a:r>
+            <a:r>
+              <a:rPr lang="en-US" dirty="0"/>
+              <a:t> er det </a:t>
+            </a:r>
+            <a:r>
+              <a:rPr lang="en-US" dirty="0" err="1"/>
+              <a:t>veldig</a:t>
+            </a:r>
+            <a:r>
+              <a:rPr lang="en-US" dirty="0"/>
+              <a:t> </a:t>
+            </a:r>
+            <a:r>
+              <a:rPr lang="en-US" dirty="0" err="1"/>
+              <a:t>typisk</a:t>
+            </a:r>
+            <a:r>
+              <a:rPr lang="en-US" dirty="0"/>
+              <a:t> at </a:t>
+            </a:r>
+            <a:r>
+              <a:rPr lang="en-US" dirty="0" err="1"/>
+              <a:t>disse</a:t>
+            </a:r>
+            <a:r>
+              <a:rPr lang="en-US" dirty="0"/>
+              <a:t> connection </a:t>
+            </a:r>
+            <a:r>
+              <a:rPr lang="en-US" dirty="0" err="1"/>
+              <a:t>stringsene</a:t>
+            </a:r>
+            <a:r>
+              <a:rPr lang="en-US" dirty="0"/>
+              <a:t> ligger I </a:t>
+            </a:r>
+            <a:r>
+              <a:rPr lang="en-US" dirty="0" err="1"/>
+              <a:t>Appsettings.json</a:t>
+            </a:r>
+            <a:r>
+              <a:rPr lang="en-US" dirty="0"/>
+              <a:t>.</a:t>
+            </a:r>
+          </a:p>
+          <a:p>
+            <a:endParaRPr lang="en-US" dirty="0"/>
+          </a:p>
+          <a:p>
+            <a:r>
+              <a:rPr lang="en-US" dirty="0"/>
+              <a:t>Det man heller </a:t>
+            </a:r>
+            <a:r>
+              <a:rPr lang="en-US" dirty="0" err="1"/>
+              <a:t>kan</a:t>
+            </a:r>
+            <a:r>
+              <a:rPr lang="en-US" dirty="0"/>
+              <a:t> </a:t>
+            </a:r>
+            <a:r>
+              <a:rPr lang="en-US" dirty="0" err="1"/>
+              <a:t>gjøre</a:t>
+            </a:r>
+            <a:r>
+              <a:rPr lang="en-US" dirty="0"/>
+              <a:t>, er å </a:t>
+            </a:r>
+            <a:r>
+              <a:rPr lang="en-US" dirty="0" err="1"/>
+              <a:t>flytte</a:t>
+            </a:r>
+            <a:r>
+              <a:rPr lang="en-US" dirty="0"/>
+              <a:t> </a:t>
+            </a:r>
+            <a:r>
+              <a:rPr lang="en-US" dirty="0" err="1"/>
+              <a:t>disse</a:t>
+            </a:r>
+            <a:r>
+              <a:rPr lang="en-US" dirty="0"/>
+              <a:t> </a:t>
+            </a:r>
+            <a:r>
+              <a:rPr lang="en-US" dirty="0" err="1"/>
+              <a:t>hemmelig</a:t>
+            </a:r>
+            <a:r>
+              <a:rPr lang="en-US" dirty="0"/>
+              <a:t> </a:t>
+            </a:r>
+            <a:r>
+              <a:rPr lang="en-US" dirty="0" err="1"/>
+              <a:t>nøklene</a:t>
+            </a:r>
+            <a:r>
+              <a:rPr lang="en-US" dirty="0"/>
+              <a:t>, </a:t>
+            </a:r>
+            <a:r>
+              <a:rPr lang="en-US" dirty="0" err="1"/>
+              <a:t>til</a:t>
+            </a:r>
+            <a:r>
+              <a:rPr lang="en-US" dirty="0"/>
+              <a:t> et Key Vault. </a:t>
+            </a:r>
+            <a:r>
+              <a:rPr lang="en-US" dirty="0" err="1"/>
+              <a:t>Slik</a:t>
+            </a:r>
+            <a:r>
+              <a:rPr lang="en-US" dirty="0"/>
+              <a:t> at </a:t>
+            </a:r>
+            <a:r>
+              <a:rPr lang="en-US" dirty="0" err="1"/>
+              <a:t>connectionstringsene</a:t>
+            </a:r>
+            <a:r>
+              <a:rPr lang="en-US" dirty="0"/>
+              <a:t> er </a:t>
+            </a:r>
+            <a:r>
+              <a:rPr lang="en-US" dirty="0" err="1"/>
+              <a:t>beskyttet</a:t>
+            </a:r>
+            <a:r>
+              <a:rPr lang="en-US" dirty="0"/>
+              <a:t>, og </a:t>
+            </a:r>
+            <a:r>
+              <a:rPr lang="en-US" dirty="0" err="1"/>
+              <a:t>ikke</a:t>
+            </a:r>
+            <a:r>
+              <a:rPr lang="en-US" dirty="0"/>
+              <a:t> </a:t>
+            </a:r>
+            <a:r>
+              <a:rPr lang="en-US" dirty="0" err="1"/>
+              <a:t>synlig</a:t>
+            </a:r>
+            <a:r>
+              <a:rPr lang="en-US" dirty="0"/>
+              <a:t> </a:t>
+            </a:r>
+            <a:r>
+              <a:rPr lang="en-US" dirty="0" err="1"/>
+              <a:t>direkte</a:t>
+            </a:r>
+            <a:r>
+              <a:rPr lang="en-US" dirty="0"/>
               <a:t> I </a:t>
             </a:r>
             <a:r>
-              <a:rPr lang="en-US" err="1"/>
-              <a:t>en</a:t>
-            </a:r>
-            <a:r>
-              <a:rPr lang="en-US"/>
-              <a:t> web </a:t>
-            </a:r>
-            <a:r>
-              <a:rPr lang="en-US" err="1"/>
-              <a:t>applikasjon</a:t>
-            </a:r>
-            <a:r>
-              <a:rPr lang="en-US"/>
+              <a:rPr lang="en-US" dirty="0" err="1"/>
+              <a:t>portalen</a:t>
+            </a:r>
+            <a:r>
+              <a:rPr lang="en-US" dirty="0"/>
+              <a:t> og </a:t>
+            </a:r>
+            <a:r>
+              <a:rPr lang="en-US" dirty="0" err="1"/>
+              <a:t>eller</a:t>
+            </a:r>
+            <a:r>
+              <a:rPr lang="en-US" dirty="0"/>
+              <a:t> I </a:t>
+            </a:r>
+            <a:r>
+              <a:rPr lang="en-US" dirty="0" err="1"/>
+              <a:t>versjonskontrollerings</a:t>
+            </a:r>
+            <a:r>
+              <a:rPr lang="en-US" dirty="0"/>
               <a:t> </a:t>
             </a:r>
             <a:r>
-              <a:rPr lang="en-US" err="1"/>
-              <a:t>kobler</a:t>
-            </a:r>
-            <a:r>
-              <a:rPr lang="en-US"/>
-              <a:t> man seg </a:t>
-            </a:r>
-            <a:r>
-              <a:rPr lang="en-US" err="1"/>
-              <a:t>til</a:t>
-            </a:r>
-            <a:r>
-              <a:rPr lang="en-US"/>
+              <a:rPr lang="en-US" dirty="0" err="1"/>
+              <a:t>verktøyet</a:t>
+            </a:r>
+            <a:r>
+              <a:rPr lang="en-US" dirty="0"/>
+              <a:t>.</a:t>
+            </a:r>
+          </a:p>
+          <a:p>
+            <a:endParaRPr lang="en-US" dirty="0"/>
+          </a:p>
+          <a:p>
+            <a:r>
+              <a:rPr lang="nb-NO" dirty="0"/>
+              <a:t>Det er ulike måter man </a:t>
+            </a:r>
+            <a:r>
+              <a:rPr lang="nb-NO" dirty="0" err="1"/>
+              <a:t>man</a:t>
+            </a:r>
+            <a:r>
+              <a:rPr lang="nb-NO" dirty="0"/>
+              <a:t> kan hente ut disse hemmelighetene på, vi skal være litt </a:t>
+            </a:r>
+            <a:r>
+              <a:rPr lang="nb-NO" dirty="0" err="1"/>
+              <a:t>hands-on</a:t>
+            </a:r>
+            <a:r>
+              <a:rPr lang="nb-NO" dirty="0"/>
+              <a:t> og implementere noe kode for å hente ut en </a:t>
+            </a:r>
+            <a:r>
+              <a:rPr lang="nb-NO" dirty="0" err="1"/>
+              <a:t>connection</a:t>
+            </a:r>
+            <a:r>
+              <a:rPr lang="nb-NO" dirty="0"/>
               <a:t> </a:t>
             </a:r>
             <a:r>
-              <a:rPr lang="en-US" err="1"/>
-              <a:t>en</a:t>
-            </a:r>
-            <a:r>
-              <a:rPr lang="en-US"/>
-              <a:t> SQL database </a:t>
-            </a:r>
-            <a:r>
-              <a:rPr lang="en-US" err="1"/>
-              <a:t>ved</a:t>
-            </a:r>
-            <a:r>
-              <a:rPr lang="en-US"/>
-              <a:t> </a:t>
-            </a:r>
-            <a:r>
-              <a:rPr lang="en-US" err="1"/>
-              <a:t>bruk</a:t>
-            </a:r>
-            <a:r>
-              <a:rPr lang="en-US"/>
-              <a:t> av </a:t>
-            </a:r>
-            <a:r>
-              <a:rPr lang="en-US" err="1"/>
-              <a:t>en</a:t>
-            </a:r>
-            <a:r>
-              <a:rPr lang="en-US"/>
-              <a:t> connection string. I </a:t>
-            </a:r>
-            <a:r>
-              <a:rPr lang="en-US" err="1"/>
-              <a:t>f.eks</a:t>
-            </a:r>
-            <a:r>
-              <a:rPr lang="en-US"/>
-              <a:t> et C# </a:t>
-            </a:r>
-            <a:r>
-              <a:rPr lang="en-US" err="1"/>
-              <a:t>webapplikasjons</a:t>
-            </a:r>
-            <a:r>
-              <a:rPr lang="en-US"/>
-              <a:t> </a:t>
-            </a:r>
-            <a:r>
-              <a:rPr lang="en-US" err="1"/>
-              <a:t>prosjekt</a:t>
-            </a:r>
-            <a:r>
-              <a:rPr lang="en-US"/>
-              <a:t> er det </a:t>
-            </a:r>
-            <a:r>
-              <a:rPr lang="en-US" err="1"/>
-              <a:t>veldig</a:t>
-            </a:r>
-            <a:r>
-              <a:rPr lang="en-US"/>
-              <a:t> </a:t>
-            </a:r>
-            <a:r>
-              <a:rPr lang="en-US" err="1"/>
-              <a:t>typisk</a:t>
-            </a:r>
-            <a:r>
-              <a:rPr lang="en-US"/>
-              <a:t> at </a:t>
-            </a:r>
-            <a:r>
-              <a:rPr lang="en-US" err="1"/>
-              <a:t>disse</a:t>
-            </a:r>
-            <a:r>
-              <a:rPr lang="en-US"/>
-              <a:t> connection </a:t>
-            </a:r>
-            <a:r>
-              <a:rPr lang="en-US" err="1"/>
-              <a:t>stringsene</a:t>
-            </a:r>
-            <a:r>
-              <a:rPr lang="en-US"/>
-              <a:t> ligger I Appsettings.json.</a:t>
-            </a:r>
-          </a:p>
-          <a:p>
-            <a:endParaRPr lang="en-US"/>
-          </a:p>
-          <a:p>
-            <a:r>
-              <a:rPr lang="en-US"/>
-              <a:t>Det man heller </a:t>
-            </a:r>
-            <a:r>
-              <a:rPr lang="en-US" err="1"/>
-              <a:t>kan</a:t>
-            </a:r>
-            <a:r>
-              <a:rPr lang="en-US"/>
-              <a:t> </a:t>
-            </a:r>
-            <a:r>
-              <a:rPr lang="en-US" err="1"/>
-              <a:t>gjøre</a:t>
-            </a:r>
-            <a:r>
-              <a:rPr lang="en-US"/>
-              <a:t>, er å </a:t>
-            </a:r>
-            <a:r>
-              <a:rPr lang="en-US" err="1"/>
-              <a:t>flytte</a:t>
-            </a:r>
-            <a:r>
-              <a:rPr lang="en-US"/>
-              <a:t> </a:t>
-            </a:r>
-            <a:r>
-              <a:rPr lang="en-US" err="1"/>
-              <a:t>disse</a:t>
-            </a:r>
-            <a:r>
-              <a:rPr lang="en-US"/>
-              <a:t> </a:t>
-            </a:r>
-            <a:r>
-              <a:rPr lang="en-US" err="1"/>
-              <a:t>hemmelig</a:t>
-            </a:r>
-            <a:r>
-              <a:rPr lang="en-US"/>
-              <a:t> </a:t>
-            </a:r>
-            <a:r>
-              <a:rPr lang="en-US" err="1"/>
-              <a:t>nøklene</a:t>
-            </a:r>
-            <a:r>
-              <a:rPr lang="en-US"/>
-              <a:t>, </a:t>
-            </a:r>
-            <a:r>
-              <a:rPr lang="en-US" err="1"/>
-              <a:t>til</a:t>
-            </a:r>
-            <a:r>
-              <a:rPr lang="en-US"/>
-              <a:t> et Key Vault. </a:t>
-            </a:r>
-            <a:r>
-              <a:rPr lang="en-US" err="1"/>
-              <a:t>Slik</a:t>
-            </a:r>
-            <a:r>
-              <a:rPr lang="en-US"/>
-              <a:t> at </a:t>
-            </a:r>
-            <a:r>
-              <a:rPr lang="en-US" err="1"/>
-              <a:t>connectionstringsene</a:t>
-            </a:r>
-            <a:r>
-              <a:rPr lang="en-US"/>
-              <a:t> er </a:t>
-            </a:r>
-            <a:r>
-              <a:rPr lang="en-US" err="1"/>
-              <a:t>beskyttet</a:t>
-            </a:r>
-            <a:r>
-              <a:rPr lang="en-US"/>
-              <a:t>, </a:t>
-            </a:r>
-            <a:r>
-              <a:rPr lang="en-US" err="1"/>
-              <a:t>og</a:t>
-            </a:r>
-            <a:r>
-              <a:rPr lang="en-US"/>
-              <a:t> </a:t>
-            </a:r>
-            <a:r>
-              <a:rPr lang="en-US" err="1"/>
-              <a:t>ikke</a:t>
-            </a:r>
-            <a:r>
-              <a:rPr lang="en-US"/>
-              <a:t> </a:t>
-            </a:r>
-            <a:r>
-              <a:rPr lang="en-US" err="1"/>
-              <a:t>synlig</a:t>
-            </a:r>
-            <a:r>
-              <a:rPr lang="en-US"/>
-              <a:t> </a:t>
-            </a:r>
-            <a:r>
-              <a:rPr lang="en-US" err="1"/>
-              <a:t>direkte</a:t>
-            </a:r>
-            <a:r>
-              <a:rPr lang="en-US"/>
-              <a:t> I </a:t>
-            </a:r>
-            <a:r>
-              <a:rPr lang="en-US" err="1"/>
-              <a:t>portalen</a:t>
-            </a:r>
-            <a:r>
-              <a:rPr lang="en-US"/>
-              <a:t> </a:t>
-            </a:r>
-            <a:r>
-              <a:rPr lang="en-US" err="1"/>
-              <a:t>og</a:t>
-            </a:r>
-            <a:r>
-              <a:rPr lang="en-US"/>
-              <a:t> </a:t>
-            </a:r>
-            <a:r>
-              <a:rPr lang="en-US" err="1"/>
-              <a:t>eller</a:t>
-            </a:r>
-            <a:r>
-              <a:rPr lang="en-US"/>
-              <a:t> I </a:t>
-            </a:r>
-            <a:r>
-              <a:rPr lang="en-US" err="1"/>
-              <a:t>versjonskontrollerings</a:t>
-            </a:r>
-            <a:r>
-              <a:rPr lang="en-US"/>
-              <a:t> </a:t>
-            </a:r>
-            <a:r>
-              <a:rPr lang="en-US" err="1"/>
-              <a:t>verktøyet</a:t>
-            </a:r>
-            <a:r>
-              <a:rPr lang="en-US"/>
-              <a:t>.</a:t>
-            </a:r>
-          </a:p>
-          <a:p>
-            <a:endParaRPr lang="en-US"/>
-          </a:p>
-          <a:p>
-            <a:r>
-              <a:rPr lang="nb-NO"/>
-              <a:t>Det er ulike måter man </a:t>
-            </a:r>
-            <a:r>
-              <a:rPr lang="nb-NO" err="1"/>
-              <a:t>man</a:t>
-            </a:r>
-            <a:r>
-              <a:rPr lang="nb-NO"/>
-              <a:t> kan hente ut disse hemmelighetene på, vi skal være litt </a:t>
-            </a:r>
-            <a:r>
-              <a:rPr lang="nb-NO" err="1"/>
-              <a:t>hands-on</a:t>
-            </a:r>
-            <a:r>
-              <a:rPr lang="nb-NO"/>
-              <a:t> og implementere noe kode for å hente ut en </a:t>
-            </a:r>
-            <a:r>
-              <a:rPr lang="nb-NO" err="1"/>
-              <a:t>connection</a:t>
-            </a:r>
-            <a:r>
-              <a:rPr lang="nb-NO"/>
-              <a:t> </a:t>
-            </a:r>
-            <a:r>
-              <a:rPr lang="nb-NO" err="1"/>
+              <a:rPr lang="nb-NO" dirty="0" err="1"/>
               <a:t>string</a:t>
             </a:r>
             <a:r>
-              <a:rPr lang="nb-NO"/>
+              <a:rPr lang="nb-NO" dirty="0"/>
               <a:t> i neste leksjon.</a:t>
             </a:r>
           </a:p>
           <a:p>
-            <a:endParaRPr lang="nb-NO"/>
-          </a:p>
-          <a:p>
-            <a:endParaRPr lang="nb-NO"/>
-          </a:p>
-          <a:p>
-            <a:r>
-              <a:rPr lang="nb-NO"/>
-              <a:t>Et annet scenario for bruk av Azure Key </a:t>
-            </a:r>
-            <a:r>
-              <a:rPr lang="nb-NO" err="1"/>
+            <a:endParaRPr lang="nb-NO" dirty="0"/>
+          </a:p>
+          <a:p>
+            <a:endParaRPr lang="nb-NO" dirty="0"/>
+          </a:p>
+          <a:p>
+            <a:r>
+              <a:rPr lang="nb-NO" dirty="0"/>
+              <a:t>Et annet scenario for bruk av </a:t>
+            </a:r>
+            <a:r>
+              <a:rPr lang="nb-NO" dirty="0" err="1"/>
+              <a:t>Azure</a:t>
+            </a:r>
+            <a:r>
+              <a:rPr lang="nb-NO" dirty="0"/>
+              <a:t> Key </a:t>
+            </a:r>
+            <a:r>
+              <a:rPr lang="nb-NO" dirty="0" err="1"/>
               <a:t>Vault</a:t>
             </a:r>
             <a:r>
-              <a:rPr lang="nb-NO"/>
+              <a:rPr lang="nb-NO" dirty="0"/>
               <a:t> er å sentralisere </a:t>
             </a:r>
             <a:r>
-              <a:rPr lang="nb-NO" err="1"/>
+              <a:rPr lang="nb-NO" dirty="0" err="1"/>
               <a:t>hemmlighetene</a:t>
             </a:r>
             <a:r>
-              <a:rPr lang="nb-NO"/>
+              <a:rPr lang="nb-NO" dirty="0"/>
               <a:t> dine på ett sted. </a:t>
             </a:r>
           </a:p>
           <a:p>
             <a:r>
-              <a:rPr lang="nb-NO"/>
-              <a:t>Så om du har flere tjenester som bruker de samme hemmelighetene, kan man bruke Azure Key </a:t>
-            </a:r>
-            <a:r>
-              <a:rPr lang="nb-NO" err="1"/>
+              <a:rPr lang="nb-NO" dirty="0"/>
+              <a:t>Så om du har flere tjenester som bruker de samme hemmelighetene, kan man bruke </a:t>
+            </a:r>
+            <a:r>
+              <a:rPr lang="nb-NO" dirty="0" err="1"/>
+              <a:t>Azure</a:t>
+            </a:r>
+            <a:r>
+              <a:rPr lang="nb-NO" dirty="0"/>
+              <a:t> Key </a:t>
+            </a:r>
+            <a:r>
+              <a:rPr lang="nb-NO" dirty="0" err="1"/>
               <a:t>Vault</a:t>
             </a:r>
             <a:r>
-              <a:rPr lang="nb-NO"/>
+              <a:rPr lang="nb-NO" dirty="0"/>
               <a:t> for å sentralisere hemmelighetene. </a:t>
             </a:r>
           </a:p>
           <a:p>
-            <a:endParaRPr lang="nb-NO"/>
-          </a:p>
-          <a:p>
-            <a:r>
-              <a:rPr lang="nb-NO"/>
+            <a:endParaRPr lang="nb-NO" dirty="0"/>
+          </a:p>
+          <a:p>
+            <a:r>
+              <a:rPr lang="nb-NO" dirty="0"/>
               <a:t>Dette er veldig fordelaktig for de som skal drifte løsningen ved et senere tidspunkt skal skifte ut  Connection </a:t>
             </a:r>
             <a:r>
-              <a:rPr lang="nb-NO" err="1"/>
+              <a:rPr lang="nb-NO" dirty="0" err="1"/>
               <a:t>Stringen</a:t>
             </a:r>
             <a:r>
-              <a:rPr lang="nb-NO"/>
+              <a:rPr lang="nb-NO" dirty="0"/>
               <a:t> til databasen f.eks. Da kan de gjøre dette ett sted i </a:t>
             </a:r>
             <a:r>
-              <a:rPr lang="nb-NO" err="1"/>
+              <a:rPr lang="nb-NO" dirty="0" err="1"/>
               <a:t>stedenfor</a:t>
             </a:r>
             <a:r>
-              <a:rPr lang="nb-NO"/>
+              <a:rPr lang="nb-NO" dirty="0"/>
               <a:t> å gjøre det i vær tjeneste.</a:t>
             </a:r>
           </a:p>
@@ -17766,61 +17726,57 @@
           <a:lstStyle/>
           <a:p>
             <a:r>
-              <a:rPr lang="nb-NO">
+              <a:rPr lang="nb-NO" dirty="0">
                 <a:hlinkClick r:id="rId3"/>
               </a:rPr>
               <a:t>https://azure.microsoft.com/en/services/</a:t>
             </a:r>
-            <a:endParaRPr lang="nb-NO"/>
-          </a:p>
-          <a:p>
-            <a:endParaRPr lang="nb-NO"/>
-          </a:p>
-          <a:p>
-            <a:r>
-              <a:rPr lang="nb-NO"/>
-              <a:t>Architecture BluePrints: </a:t>
-            </a:r>
-            <a:r>
-              <a:rPr lang="nb-NO">
+            <a:endParaRPr lang="nb-NO" dirty="0"/>
+          </a:p>
+          <a:p>
+            <a:endParaRPr lang="nb-NO" dirty="0"/>
+          </a:p>
+          <a:p>
+            <a:r>
+              <a:rPr lang="nb-NO" dirty="0"/>
+              <a:t>Architecture </a:t>
+            </a:r>
+            <a:r>
+              <a:rPr lang="nb-NO" dirty="0" err="1"/>
+              <a:t>BluePrints</a:t>
+            </a:r>
+            <a:r>
+              <a:rPr lang="nb-NO" dirty="0"/>
+              <a:t>: </a:t>
+            </a:r>
+            <a:r>
+              <a:rPr lang="nb-NO" dirty="0">
                 <a:hlinkClick r:id="rId4"/>
               </a:rPr>
               <a:t>https://azure.microsoft.com/en-us/solutions/architecture/</a:t>
             </a:r>
-            <a:endParaRPr lang="nb-NO"/>
-          </a:p>
-          <a:p>
-            <a:endParaRPr lang="nb-NO"/>
-          </a:p>
-          <a:p>
-            <a:r>
-              <a:rPr lang="nb-NO">
-                <a:hlinkClick r:id="rId5"/>
-              </a:rPr>
-              <a:t>https://azure-overview.com/Home/Index</a:t>
-            </a:r>
-            <a:endParaRPr lang="nb-NO"/>
-          </a:p>
-          <a:p>
-            <a:endParaRPr lang="nb-NO"/>
-          </a:p>
-          <a:p>
-            <a:endParaRPr lang="nb-NO"/>
-          </a:p>
-          <a:p>
-            <a:endParaRPr lang="nb-NO"/>
-          </a:p>
-          <a:p>
-            <a:endParaRPr lang="nb-NO"/>
+            <a:endParaRPr lang="nb-NO" dirty="0"/>
+          </a:p>
+          <a:p>
+            <a:endParaRPr lang="nb-NO" dirty="0"/>
+          </a:p>
+          <a:p>
+            <a:endParaRPr lang="nb-NO" dirty="0"/>
+          </a:p>
+          <a:p>
+            <a:endParaRPr lang="nb-NO" dirty="0"/>
+          </a:p>
+          <a:p>
+            <a:endParaRPr lang="nb-NO" dirty="0"/>
           </a:p>
           <a:p>
             <a:pPr marL="0" indent="0">
               <a:buNone/>
             </a:pPr>
-            <a:endParaRPr lang="nb-NO"/>
-          </a:p>
-          <a:p>
-            <a:endParaRPr lang="nb-NO"/>
+            <a:endParaRPr lang="nb-NO" dirty="0"/>
+          </a:p>
+          <a:p>
+            <a:endParaRPr lang="nb-NO" dirty="0"/>
           </a:p>
         </p:txBody>
       </p:sp>
@@ -18654,85 +18610,102 @@
           <a:lstStyle/>
           <a:p>
             <a:r>
-              <a:rPr lang="nb-NO"/>
+              <a:rPr lang="nb-NO" dirty="0"/>
               <a:t>Portalen:</a:t>
             </a:r>
           </a:p>
           <a:p>
             <a:pPr lvl="1"/>
             <a:r>
-              <a:rPr lang="nb-NO" err="1"/>
+              <a:rPr lang="nb-NO" dirty="0" err="1"/>
               <a:t>Pek&amp;Klikk</a:t>
             </a:r>
-            <a:endParaRPr lang="nb-NO"/>
-          </a:p>
-          <a:p>
-            <a:r>
-              <a:rPr lang="nb-NO" err="1"/>
+            <a:endParaRPr lang="nb-NO" dirty="0"/>
+          </a:p>
+          <a:p>
+            <a:r>
+              <a:rPr lang="nb-NO" dirty="0" err="1"/>
               <a:t>Powershell</a:t>
             </a:r>
-            <a:endParaRPr lang="nb-NO"/>
+            <a:endParaRPr lang="nb-NO" dirty="0"/>
           </a:p>
           <a:p>
             <a:pPr lvl="1"/>
             <a:r>
-              <a:rPr lang="nb-NO"/>
-              <a:t>Også tilgjengelig i Azure Shell (portalen)</a:t>
-            </a:r>
-          </a:p>
-          <a:p>
-            <a:r>
-              <a:rPr lang="nb-NO"/>
-              <a:t>Azure CLI</a:t>
+              <a:rPr lang="nb-NO" dirty="0"/>
+              <a:t>Også tilgjengelig i </a:t>
+            </a:r>
+            <a:r>
+              <a:rPr lang="nb-NO" dirty="0" err="1"/>
+              <a:t>Azure</a:t>
+            </a:r>
+            <a:r>
+              <a:rPr lang="nb-NO" dirty="0"/>
+              <a:t> Shell (portalen)</a:t>
+            </a:r>
+          </a:p>
+          <a:p>
+            <a:r>
+              <a:rPr lang="nb-NO" dirty="0" err="1"/>
+              <a:t>Azure</a:t>
+            </a:r>
+            <a:r>
+              <a:rPr lang="nb-NO" dirty="0"/>
+              <a:t> CLI</a:t>
             </a:r>
           </a:p>
           <a:p>
             <a:pPr lvl="1"/>
             <a:r>
-              <a:rPr lang="nb-NO"/>
+              <a:rPr lang="nb-NO" dirty="0"/>
               <a:t>Kommandolinjebasert – Kryss-</a:t>
             </a:r>
             <a:r>
-              <a:rPr lang="nb-NO" err="1"/>
+              <a:rPr lang="nb-NO" dirty="0" err="1"/>
               <a:t>platform</a:t>
             </a:r>
             <a:r>
-              <a:rPr lang="nb-NO"/>
+              <a:rPr lang="nb-NO" dirty="0"/>
               <a:t>. </a:t>
             </a:r>
           </a:p>
           <a:p>
             <a:pPr lvl="1"/>
             <a:r>
-              <a:rPr lang="nb-NO"/>
+              <a:rPr lang="nb-NO" dirty="0"/>
               <a:t>Tilgjengelig </a:t>
             </a:r>
           </a:p>
           <a:p>
             <a:r>
-              <a:rPr lang="nb-NO"/>
+              <a:rPr lang="nb-NO" dirty="0"/>
               <a:t>ARM-</a:t>
             </a:r>
             <a:r>
-              <a:rPr lang="nb-NO" err="1"/>
+              <a:rPr lang="nb-NO" dirty="0" err="1"/>
               <a:t>templates</a:t>
             </a:r>
             <a:r>
-              <a:rPr lang="nb-NO"/>
-              <a:t> </a:t>
-            </a:r>
+              <a:rPr lang="nb-NO" dirty="0"/>
+              <a:t> / </a:t>
+            </a:r>
+            <a:r>
+              <a:rPr lang="nb-NO" dirty="0" err="1"/>
+              <a:t>Bicep</a:t>
+            </a:r>
+            <a:endParaRPr lang="nb-NO" dirty="0"/>
           </a:p>
           <a:p>
             <a:pPr lvl="1"/>
             <a:r>
-              <a:rPr lang="nb-NO"/>
+              <a:rPr lang="nb-NO" dirty="0"/>
               <a:t>Deklarativt</a:t>
             </a:r>
           </a:p>
           <a:p>
             <a:pPr lvl="1"/>
             <a:r>
-              <a:rPr lang="nb-NO"/>
+              <a:rPr lang="nb-NO" dirty="0"/>
               <a:t>Inkrementell</a:t>
             </a:r>
           </a:p>
@@ -22924,56 +22897,6 @@
       </p:grpSpPr>
       <p:sp>
         <p:nvSpPr>
-          <p:cNvPr id="2" name="Content Placeholder 1">
-            <a:extLst>
-              <a:ext uri="{FF2B5EF4-FFF2-40B4-BE49-F238E27FC236}">
-                <a16:creationId xmlns:a16="http://schemas.microsoft.com/office/drawing/2014/main" id="{B30B91A4-AB72-4A94-BC5E-92A57CF75A85}"/>
-              </a:ext>
-            </a:extLst>
-          </p:cNvPr>
-          <p:cNvSpPr>
-            <a:spLocks noGrp="1"/>
-          </p:cNvSpPr>
-          <p:nvPr>
-            <p:ph idx="1"/>
-          </p:nvPr>
-        </p:nvSpPr>
-        <p:spPr/>
-        <p:txBody>
-          <a:bodyPr/>
-          <a:lstStyle/>
-          <a:p>
-            <a:endParaRPr lang="nb-NO"/>
-          </a:p>
-        </p:txBody>
-      </p:sp>
-      <p:sp>
-        <p:nvSpPr>
-          <p:cNvPr id="3" name="Title 2">
-            <a:extLst>
-              <a:ext uri="{FF2B5EF4-FFF2-40B4-BE49-F238E27FC236}">
-                <a16:creationId xmlns:a16="http://schemas.microsoft.com/office/drawing/2014/main" id="{67BAA3A3-966B-4BDB-B4EE-93F148EB2CD8}"/>
-              </a:ext>
-            </a:extLst>
-          </p:cNvPr>
-          <p:cNvSpPr>
-            <a:spLocks noGrp="1"/>
-          </p:cNvSpPr>
-          <p:nvPr>
-            <p:ph type="title"/>
-          </p:nvPr>
-        </p:nvSpPr>
-        <p:spPr/>
-        <p:txBody>
-          <a:bodyPr/>
-          <a:lstStyle/>
-          <a:p>
-            <a:endParaRPr lang="nb-NO"/>
-          </a:p>
-        </p:txBody>
-      </p:sp>
-      <p:sp>
-        <p:nvSpPr>
           <p:cNvPr id="4" name="Title 2">
             <a:extLst>
               <a:ext uri="{FF2B5EF4-FFF2-40B4-BE49-F238E27FC236}">
@@ -23923,14 +23846,14 @@
           </a:ln>
           <a:extLst>
             <a:ext uri="{909E8E84-426E-40dd-AFC4-6F175D3DCCD1}">
-              <a14:hiddenFill xmlns:a14="http://schemas.microsoft.com/office/drawing/2010/main" xmlns:lc="http://schemas.openxmlformats.org/drawingml/2006/lockedCanvas" xmlns="">
+              <a14:hiddenFill xmlns="" xmlns:lc="http://schemas.openxmlformats.org/drawingml/2006/lockedCanvas" xmlns:a14="http://schemas.microsoft.com/office/drawing/2010/main">
                 <a:solidFill>
                   <a:srgbClr val="FFFFFF"/>
                 </a:solidFill>
               </a14:hiddenFill>
             </a:ext>
             <a:ext uri="{91240B29-F687-4f45-9708-019B960494DF}">
-              <a14:hiddenLine xmlns:a14="http://schemas.microsoft.com/office/drawing/2010/main" xmlns:lc="http://schemas.openxmlformats.org/drawingml/2006/lockedCanvas" xmlns="" w="9525">
+              <a14:hiddenLine xmlns="" xmlns:lc="http://schemas.openxmlformats.org/drawingml/2006/lockedCanvas" xmlns:a14="http://schemas.microsoft.com/office/drawing/2010/main" w="9525">
                 <a:solidFill>
                   <a:srgbClr val="000000"/>
                 </a:solidFill>
@@ -24119,14 +24042,14 @@
           </a:ln>
           <a:extLst>
             <a:ext uri="{909E8E84-426E-40dd-AFC4-6F175D3DCCD1}">
-              <a14:hiddenFill xmlns:a14="http://schemas.microsoft.com/office/drawing/2010/main" xmlns:lc="http://schemas.openxmlformats.org/drawingml/2006/lockedCanvas" xmlns="">
+              <a14:hiddenFill xmlns="" xmlns:lc="http://schemas.openxmlformats.org/drawingml/2006/lockedCanvas" xmlns:a14="http://schemas.microsoft.com/office/drawing/2010/main">
                 <a:solidFill>
                   <a:srgbClr val="FFFFFF"/>
                 </a:solidFill>
               </a14:hiddenFill>
             </a:ext>
             <a:ext uri="{91240B29-F687-4f45-9708-019B960494DF}">
-              <a14:hiddenLine xmlns:a14="http://schemas.microsoft.com/office/drawing/2010/main" xmlns:lc="http://schemas.openxmlformats.org/drawingml/2006/lockedCanvas" xmlns="" w="9525">
+              <a14:hiddenLine xmlns="" xmlns:lc="http://schemas.openxmlformats.org/drawingml/2006/lockedCanvas" xmlns:a14="http://schemas.microsoft.com/office/drawing/2010/main" w="9525">
                 <a:solidFill>
                   <a:srgbClr val="000000"/>
                 </a:solidFill>
@@ -24587,14 +24510,14 @@
           </a:ln>
           <a:extLst>
             <a:ext uri="{909E8E84-426E-40dd-AFC4-6F175D3DCCD1}">
-              <a14:hiddenFill xmlns:a14="http://schemas.microsoft.com/office/drawing/2010/main" xmlns:lc="http://schemas.openxmlformats.org/drawingml/2006/lockedCanvas" xmlns="">
+              <a14:hiddenFill xmlns="" xmlns:lc="http://schemas.openxmlformats.org/drawingml/2006/lockedCanvas" xmlns:a14="http://schemas.microsoft.com/office/drawing/2010/main">
                 <a:solidFill>
                   <a:srgbClr val="FFFFFF"/>
                 </a:solidFill>
               </a14:hiddenFill>
             </a:ext>
             <a:ext uri="{91240B29-F687-4f45-9708-019B960494DF}">
-              <a14:hiddenLine xmlns:a14="http://schemas.microsoft.com/office/drawing/2010/main" xmlns:lc="http://schemas.openxmlformats.org/drawingml/2006/lockedCanvas" xmlns="" w="9525">
+              <a14:hiddenLine xmlns="" xmlns:lc="http://schemas.openxmlformats.org/drawingml/2006/lockedCanvas" xmlns:a14="http://schemas.microsoft.com/office/drawing/2010/main" w="9525">
                 <a:solidFill>
                   <a:srgbClr val="000000"/>
                 </a:solidFill>
@@ -25300,14 +25223,14 @@
           </a:ln>
           <a:extLst>
             <a:ext uri="{909E8E84-426E-40dd-AFC4-6F175D3DCCD1}">
-              <a14:hiddenFill xmlns:a14="http://schemas.microsoft.com/office/drawing/2010/main" xmlns:lc="http://schemas.openxmlformats.org/drawingml/2006/lockedCanvas" xmlns="">
+              <a14:hiddenFill xmlns="" xmlns:lc="http://schemas.openxmlformats.org/drawingml/2006/lockedCanvas" xmlns:a14="http://schemas.microsoft.com/office/drawing/2010/main">
                 <a:solidFill>
                   <a:srgbClr val="FFFFFF"/>
                 </a:solidFill>
               </a14:hiddenFill>
             </a:ext>
             <a:ext uri="{91240B29-F687-4f45-9708-019B960494DF}">
-              <a14:hiddenLine xmlns:a14="http://schemas.microsoft.com/office/drawing/2010/main" xmlns:lc="http://schemas.openxmlformats.org/drawingml/2006/lockedCanvas" xmlns="" w="9525">
+              <a14:hiddenLine xmlns="" xmlns:lc="http://schemas.openxmlformats.org/drawingml/2006/lockedCanvas" xmlns:a14="http://schemas.microsoft.com/office/drawing/2010/main" w="9525">
                 <a:solidFill>
                   <a:srgbClr val="000000"/>
                 </a:solidFill>
@@ -25360,14 +25283,14 @@
           </a:ln>
           <a:extLst>
             <a:ext uri="{909E8E84-426E-40dd-AFC4-6F175D3DCCD1}">
-              <a14:hiddenFill xmlns:a14="http://schemas.microsoft.com/office/drawing/2010/main" xmlns:lc="http://schemas.openxmlformats.org/drawingml/2006/lockedCanvas" xmlns="">
+              <a14:hiddenFill xmlns="" xmlns:lc="http://schemas.openxmlformats.org/drawingml/2006/lockedCanvas" xmlns:a14="http://schemas.microsoft.com/office/drawing/2010/main">
                 <a:solidFill>
                   <a:srgbClr val="FFFFFF"/>
                 </a:solidFill>
               </a14:hiddenFill>
             </a:ext>
             <a:ext uri="{91240B29-F687-4f45-9708-019B960494DF}">
-              <a14:hiddenLine xmlns:a14="http://schemas.microsoft.com/office/drawing/2010/main" xmlns:lc="http://schemas.openxmlformats.org/drawingml/2006/lockedCanvas" xmlns="" w="9525">
+              <a14:hiddenLine xmlns="" xmlns:lc="http://schemas.openxmlformats.org/drawingml/2006/lockedCanvas" xmlns:a14="http://schemas.microsoft.com/office/drawing/2010/main" w="9525">
                 <a:solidFill>
                   <a:srgbClr val="000000"/>
                 </a:solidFill>
@@ -26237,69 +26160,69 @@
           <a:lstStyle/>
           <a:p>
             <a:r>
-              <a:rPr lang="nb-NO"/>
+              <a:rPr lang="nb-NO" dirty="0"/>
               <a:t>En Storage </a:t>
             </a:r>
             <a:r>
-              <a:rPr lang="nb-NO" err="1"/>
+              <a:rPr lang="nb-NO" dirty="0" err="1"/>
               <a:t>Account</a:t>
             </a:r>
             <a:r>
-              <a:rPr lang="nb-NO"/>
+              <a:rPr lang="nb-NO" dirty="0"/>
               <a:t> kan inneholde</a:t>
             </a:r>
           </a:p>
           <a:p>
             <a:pPr lvl="1"/>
             <a:r>
-              <a:rPr lang="nb-NO"/>
+              <a:rPr lang="nb-NO" dirty="0"/>
               <a:t>Files</a:t>
             </a:r>
           </a:p>
           <a:p>
             <a:pPr lvl="1"/>
             <a:r>
-              <a:rPr lang="nb-NO"/>
+              <a:rPr lang="nb-NO" dirty="0"/>
               <a:t>Queues</a:t>
             </a:r>
           </a:p>
           <a:p>
             <a:pPr lvl="1"/>
             <a:r>
-              <a:rPr lang="nb-NO" err="1"/>
+              <a:rPr lang="nb-NO" dirty="0" err="1"/>
               <a:t>Tables</a:t>
             </a:r>
-            <a:endParaRPr lang="nb-NO"/>
+            <a:endParaRPr lang="nb-NO" dirty="0"/>
           </a:p>
           <a:p>
             <a:pPr lvl="1"/>
             <a:r>
-              <a:rPr lang="nb-NO" err="1"/>
+              <a:rPr lang="nb-NO" dirty="0" err="1"/>
               <a:t>Blobs</a:t>
             </a:r>
-            <a:endParaRPr lang="nb-NO"/>
-          </a:p>
-          <a:p>
-            <a:r>
-              <a:rPr lang="nb-NO"/>
-              <a:t>Holdbar</a:t>
-            </a:r>
-          </a:p>
-          <a:p>
-            <a:r>
-              <a:rPr lang="nb-NO"/>
+            <a:endParaRPr lang="nb-NO" dirty="0"/>
+          </a:p>
+          <a:p>
+            <a:r>
+              <a:rPr lang="nb-NO" dirty="0"/>
+              <a:t>Robust</a:t>
+            </a:r>
+          </a:p>
+          <a:p>
+            <a:r>
+              <a:rPr lang="nb-NO" dirty="0"/>
               <a:t>Sikker</a:t>
             </a:r>
           </a:p>
           <a:p>
             <a:r>
-              <a:rPr lang="nb-NO"/>
+              <a:rPr lang="nb-NO" dirty="0"/>
               <a:t>Skalerbar</a:t>
             </a:r>
           </a:p>
           <a:p>
             <a:r>
-              <a:rPr lang="nb-NO"/>
+              <a:rPr lang="nb-NO" dirty="0"/>
               <a:t>Tilgjengelig</a:t>
             </a:r>
           </a:p>
@@ -26307,11 +26230,11 @@
             <a:pPr marL="0" indent="0">
               <a:buNone/>
             </a:pPr>
-            <a:endParaRPr lang="nb-NO"/>
+            <a:endParaRPr lang="nb-NO" dirty="0"/>
           </a:p>
           <a:p>
             <a:pPr lvl="1"/>
-            <a:endParaRPr lang="nb-NO"/>
+            <a:endParaRPr lang="nb-NO" dirty="0"/>
           </a:p>
         </p:txBody>
       </p:sp>
@@ -26690,86 +26613,86 @@
           <a:bodyPr/>
           <a:lstStyle/>
           <a:p>
-            <a:endParaRPr lang="nb-NO"/>
-          </a:p>
-          <a:p>
-            <a:r>
-              <a:rPr lang="nb-NO" err="1"/>
+            <a:endParaRPr lang="nb-NO" dirty="0"/>
+          </a:p>
+          <a:p>
+            <a:r>
+              <a:rPr lang="nb-NO" dirty="0" err="1"/>
               <a:t>NoSQL</a:t>
             </a:r>
             <a:r>
-              <a:rPr lang="nb-NO"/>
+              <a:rPr lang="nb-NO" dirty="0"/>
               <a:t>  - No </a:t>
             </a:r>
             <a:r>
-              <a:rPr lang="nb-NO" err="1"/>
+              <a:rPr lang="nb-NO" dirty="0" err="1"/>
               <a:t>Schema</a:t>
             </a:r>
             <a:r>
-              <a:rPr lang="nb-NO"/>
+              <a:rPr lang="nb-NO" dirty="0"/>
               <a:t>.</a:t>
             </a:r>
           </a:p>
           <a:p>
             <a:r>
-              <a:rPr lang="nb-NO"/>
+              <a:rPr lang="nb-NO" dirty="0"/>
               <a:t>Ingen relasjoner mellom tabellene.</a:t>
             </a:r>
           </a:p>
           <a:p>
             <a:r>
-              <a:rPr lang="nb-NO" err="1"/>
+              <a:rPr lang="nb-NO" dirty="0" err="1"/>
               <a:t>PartitionKey</a:t>
             </a:r>
             <a:r>
-              <a:rPr lang="nb-NO"/>
+              <a:rPr lang="nb-NO" dirty="0"/>
               <a:t> og </a:t>
             </a:r>
             <a:r>
-              <a:rPr lang="nb-NO" err="1"/>
+              <a:rPr lang="nb-NO" dirty="0" err="1"/>
               <a:t>RowKey</a:t>
             </a:r>
             <a:r>
-              <a:rPr lang="nb-NO"/>
+              <a:rPr lang="nb-NO" dirty="0"/>
               <a:t> eneste indekserte kolonner.</a:t>
             </a:r>
           </a:p>
           <a:p>
             <a:r>
-              <a:rPr lang="nb-NO" err="1"/>
+              <a:rPr lang="nb-NO" dirty="0" err="1"/>
               <a:t>PartitionKey</a:t>
             </a:r>
             <a:r>
-              <a:rPr lang="nb-NO"/>
+              <a:rPr lang="nb-NO" dirty="0"/>
               <a:t> viktig for skalering.</a:t>
             </a:r>
           </a:p>
           <a:p>
             <a:r>
-              <a:rPr lang="nb-NO"/>
+              <a:rPr lang="nb-NO" dirty="0"/>
               <a:t>Hvis brukt riktig, veldig kjapt og rimelig.</a:t>
             </a:r>
           </a:p>
           <a:p>
             <a:r>
-              <a:rPr lang="nb-NO"/>
+              <a:rPr lang="nb-NO" dirty="0"/>
               <a:t>Haveibeenpwned.com</a:t>
             </a:r>
           </a:p>
           <a:p>
-            <a:endParaRPr lang="nb-NO"/>
-          </a:p>
-          <a:p>
-            <a:endParaRPr lang="nb-NO"/>
-          </a:p>
-          <a:p>
-            <a:endParaRPr lang="nb-NO"/>
-          </a:p>
-          <a:p>
-            <a:endParaRPr lang="nb-NO"/>
-          </a:p>
-          <a:p>
-            <a:endParaRPr lang="nb-NO"/>
+            <a:endParaRPr lang="nb-NO" dirty="0"/>
+          </a:p>
+          <a:p>
+            <a:endParaRPr lang="nb-NO" dirty="0"/>
+          </a:p>
+          <a:p>
+            <a:endParaRPr lang="nb-NO" dirty="0"/>
+          </a:p>
+          <a:p>
+            <a:endParaRPr lang="nb-NO" dirty="0"/>
+          </a:p>
+          <a:p>
+            <a:endParaRPr lang="nb-NO" dirty="0"/>
           </a:p>
         </p:txBody>
       </p:sp>
@@ -36390,18 +36313,18 @@
 </file>
 
 <file path=customXml/item1.xml><?xml version="1.0" encoding="utf-8"?>
-<p:properties xmlns:p="http://schemas.microsoft.com/office/2006/metadata/properties" xmlns:xsi="http://www.w3.org/2001/XMLSchema-instance" xmlns:pc="http://schemas.microsoft.com/office/infopath/2007/PartnerControls">
-  <documentManagement/>
-</p:properties>
-</file>
-
-<file path=customXml/item2.xml><?xml version="1.0" encoding="utf-8"?>
 <?mso-contentType ?>
 <FormTemplates xmlns="http://schemas.microsoft.com/sharepoint/v3/contenttype/forms">
   <Display>DocumentLibraryForm</Display>
   <Edit>DocumentLibraryForm</Edit>
   <New>DocumentLibraryForm</New>
 </FormTemplates>
+</file>
+
+<file path=customXml/item2.xml><?xml version="1.0" encoding="utf-8"?>
+<p:properties xmlns:p="http://schemas.microsoft.com/office/2006/metadata/properties" xmlns:xsi="http://www.w3.org/2001/XMLSchema-instance" xmlns:pc="http://schemas.microsoft.com/office/infopath/2007/PartnerControls">
+  <documentManagement/>
+</p:properties>
 </file>
 
 <file path=customXml/item3.xml><?xml version="1.0" encoding="utf-8"?>
@@ -36614,6 +36537,14 @@
 </file>
 
 <file path=customXml/itemProps1.xml><?xml version="1.0" encoding="utf-8"?>
+<ds:datastoreItem xmlns:ds="http://schemas.openxmlformats.org/officeDocument/2006/customXml" ds:itemID="{BB82CC63-55FC-4D22-9ED3-DB88AF6228E1}">
+  <ds:schemaRefs>
+    <ds:schemaRef ds:uri="http://schemas.microsoft.com/sharepoint/v3/contenttype/forms"/>
+  </ds:schemaRefs>
+</ds:datastoreItem>
+</file>
+
+<file path=customXml/itemProps2.xml><?xml version="1.0" encoding="utf-8"?>
 <ds:datastoreItem xmlns:ds="http://schemas.openxmlformats.org/officeDocument/2006/customXml" ds:itemID="{9D2CB842-18D5-4EEF-9009-B0CAFCE7AC3E}">
   <ds:schemaRefs>
     <ds:schemaRef ds:uri="7ba49632-979e-4ee1-aefd-7896aa63ba9e"/>
@@ -36626,14 +36557,6 @@
     <ds:schemaRef ds:uri="http://schemas.microsoft.com/office/infopath/2007/PartnerControls"/>
     <ds:schemaRef ds:uri="http://schemas.openxmlformats.org/package/2006/metadata/core-properties"/>
     <ds:schemaRef ds:uri="http://www.w3.org/XML/1998/namespace"/>
-  </ds:schemaRefs>
-</ds:datastoreItem>
-</file>
-
-<file path=customXml/itemProps2.xml><?xml version="1.0" encoding="utf-8"?>
-<ds:datastoreItem xmlns:ds="http://schemas.openxmlformats.org/officeDocument/2006/customXml" ds:itemID="{BB82CC63-55FC-4D22-9ED3-DB88AF6228E1}">
-  <ds:schemaRefs>
-    <ds:schemaRef ds:uri="http://schemas.microsoft.com/sharepoint/v3/contenttype/forms"/>
   </ds:schemaRefs>
 </ds:datastoreItem>
 </file>

</xml_diff>